<commit_message>
Updated elapsed time in presentation
</commit_message>
<xml_diff>
--- a/docs/Презентация v0.8.1.pptx
+++ b/docs/Презентация v0.8.1.pptx
@@ -251,7 +251,7 @@
           <a:p>
             <a:fld id="{2F7BDC20-999D-4259-B6C3-F40ECC5C4406}" type="datetimeFigureOut">
               <a:rPr lang="ru-RU" smtClean="0"/>
-              <a:t>10.12.2017</a:t>
+              <a:t>11.12.2017</a:t>
             </a:fld>
             <a:endParaRPr lang="ru-RU"/>
           </a:p>
@@ -1706,7 +1706,7 @@
           <a:p>
             <a:fld id="{8F045AFB-DE82-40CD-9223-121836DEA27A}" type="datetimeFigureOut">
               <a:rPr lang="ru-RU" smtClean="0"/>
-              <a:t>10.12.2017</a:t>
+              <a:t>11.12.2017</a:t>
             </a:fld>
             <a:endParaRPr lang="ru-RU"/>
           </a:p>
@@ -1876,7 +1876,7 @@
           <a:p>
             <a:fld id="{8F045AFB-DE82-40CD-9223-121836DEA27A}" type="datetimeFigureOut">
               <a:rPr lang="ru-RU" smtClean="0"/>
-              <a:t>10.12.2017</a:t>
+              <a:t>11.12.2017</a:t>
             </a:fld>
             <a:endParaRPr lang="ru-RU"/>
           </a:p>
@@ -2056,7 +2056,7 @@
           <a:p>
             <a:fld id="{8F045AFB-DE82-40CD-9223-121836DEA27A}" type="datetimeFigureOut">
               <a:rPr lang="ru-RU" smtClean="0"/>
-              <a:t>10.12.2017</a:t>
+              <a:t>11.12.2017</a:t>
             </a:fld>
             <a:endParaRPr lang="ru-RU"/>
           </a:p>
@@ -2226,7 +2226,7 @@
           <a:p>
             <a:fld id="{8F045AFB-DE82-40CD-9223-121836DEA27A}" type="datetimeFigureOut">
               <a:rPr lang="ru-RU" smtClean="0"/>
-              <a:t>10.12.2017</a:t>
+              <a:t>11.12.2017</a:t>
             </a:fld>
             <a:endParaRPr lang="ru-RU"/>
           </a:p>
@@ -2472,7 +2472,7 @@
           <a:p>
             <a:fld id="{8F045AFB-DE82-40CD-9223-121836DEA27A}" type="datetimeFigureOut">
               <a:rPr lang="ru-RU" smtClean="0"/>
-              <a:t>10.12.2017</a:t>
+              <a:t>11.12.2017</a:t>
             </a:fld>
             <a:endParaRPr lang="ru-RU"/>
           </a:p>
@@ -2704,7 +2704,7 @@
           <a:p>
             <a:fld id="{8F045AFB-DE82-40CD-9223-121836DEA27A}" type="datetimeFigureOut">
               <a:rPr lang="ru-RU" smtClean="0"/>
-              <a:t>10.12.2017</a:t>
+              <a:t>11.12.2017</a:t>
             </a:fld>
             <a:endParaRPr lang="ru-RU"/>
           </a:p>
@@ -3071,7 +3071,7 @@
           <a:p>
             <a:fld id="{8F045AFB-DE82-40CD-9223-121836DEA27A}" type="datetimeFigureOut">
               <a:rPr lang="ru-RU" smtClean="0"/>
-              <a:t>10.12.2017</a:t>
+              <a:t>11.12.2017</a:t>
             </a:fld>
             <a:endParaRPr lang="ru-RU"/>
           </a:p>
@@ -3189,7 +3189,7 @@
           <a:p>
             <a:fld id="{8F045AFB-DE82-40CD-9223-121836DEA27A}" type="datetimeFigureOut">
               <a:rPr lang="ru-RU" smtClean="0"/>
-              <a:t>10.12.2017</a:t>
+              <a:t>11.12.2017</a:t>
             </a:fld>
             <a:endParaRPr lang="ru-RU"/>
           </a:p>
@@ -3284,7 +3284,7 @@
           <a:p>
             <a:fld id="{8F045AFB-DE82-40CD-9223-121836DEA27A}" type="datetimeFigureOut">
               <a:rPr lang="ru-RU" smtClean="0"/>
-              <a:t>10.12.2017</a:t>
+              <a:t>11.12.2017</a:t>
             </a:fld>
             <a:endParaRPr lang="ru-RU"/>
           </a:p>
@@ -3561,7 +3561,7 @@
           <a:p>
             <a:fld id="{8F045AFB-DE82-40CD-9223-121836DEA27A}" type="datetimeFigureOut">
               <a:rPr lang="ru-RU" smtClean="0"/>
-              <a:t>10.12.2017</a:t>
+              <a:t>11.12.2017</a:t>
             </a:fld>
             <a:endParaRPr lang="ru-RU"/>
           </a:p>
@@ -3814,7 +3814,7 @@
           <a:p>
             <a:fld id="{8F045AFB-DE82-40CD-9223-121836DEA27A}" type="datetimeFigureOut">
               <a:rPr lang="ru-RU" smtClean="0"/>
-              <a:t>10.12.2017</a:t>
+              <a:t>11.12.2017</a:t>
             </a:fld>
             <a:endParaRPr lang="ru-RU"/>
           </a:p>
@@ -4027,7 +4027,7 @@
           <a:p>
             <a:fld id="{8F045AFB-DE82-40CD-9223-121836DEA27A}" type="datetimeFigureOut">
               <a:rPr lang="ru-RU" smtClean="0"/>
-              <a:t>10.12.2017</a:t>
+              <a:t>11.12.2017</a:t>
             </a:fld>
             <a:endParaRPr lang="ru-RU"/>
           </a:p>
@@ -7901,7 +7901,6 @@
               <a:rPr lang="ru-RU" sz="2800" dirty="0"/>
               <a:t>Если не удалось пронумеровать, то возвращаемся, меняем индекс и проходим заново.</a:t>
             </a:r>
-            <a:endParaRPr lang="ru-RU" sz="2800" dirty="0"/>
           </a:p>
         </p:txBody>
       </p:sp>
@@ -8080,7 +8079,6 @@
               <a:rPr lang="ru-RU" sz="2800" dirty="0"/>
               <a:t>Если не удалось пронумеровать, то возвращаемся, меняем индекс и проходим заново.</a:t>
             </a:r>
-            <a:endParaRPr lang="ru-RU" sz="2800" dirty="0"/>
           </a:p>
         </p:txBody>
       </p:sp>
@@ -8888,7 +8886,6 @@
               <a:rPr lang="ru-RU" sz="2800" dirty="0"/>
               <a:t>Один из соседей не имеет непронумерованных соседей кроме текущей вершины.</a:t>
             </a:r>
-            <a:endParaRPr lang="ru-RU" sz="2800" dirty="0"/>
           </a:p>
         </p:txBody>
       </p:sp>
@@ -9136,7 +9133,6 @@
               <a:rPr lang="ru-RU" sz="2800" dirty="0"/>
               <a:t>Если не удалось пронумеровать, то возвращаемся, меняем индекс и проходим заново.</a:t>
             </a:r>
-            <a:endParaRPr lang="ru-RU" sz="2800" dirty="0"/>
           </a:p>
         </p:txBody>
       </p:sp>
@@ -10152,7 +10148,7 @@
           <p:nvPr>
             <p:extLst>
               <p:ext uri="{D42A27DB-BD31-4B8C-83A1-F6EECF244321}">
-                <p14:modId xmlns:p14="http://schemas.microsoft.com/office/powerpoint/2010/main" val="2585293851"/>
+                <p14:modId xmlns:p14="http://schemas.microsoft.com/office/powerpoint/2010/main" val="84437839"/>
               </p:ext>
             </p:extLst>
           </p:nvPr>
@@ -10171,56 +10167,56 @@
                 <a:gridCol w="1711711">
                   <a:extLst>
                     <a:ext uri="{9D8B030D-6E8A-4147-A177-3AD203B41FA5}">
-                      <a16:colId xmlns:a16="http://schemas.microsoft.com/office/drawing/2014/main" xmlns="" val="1171950682"/>
+                      <a16:colId xmlns="" xmlns:a16="http://schemas.microsoft.com/office/drawing/2014/main" val="1171950682"/>
                     </a:ext>
                   </a:extLst>
                 </a:gridCol>
                 <a:gridCol w="848102">
                   <a:extLst>
                     <a:ext uri="{9D8B030D-6E8A-4147-A177-3AD203B41FA5}">
-                      <a16:colId xmlns:a16="http://schemas.microsoft.com/office/drawing/2014/main" xmlns="" val="2713623616"/>
+                      <a16:colId xmlns="" xmlns:a16="http://schemas.microsoft.com/office/drawing/2014/main" val="2713623616"/>
                     </a:ext>
                   </a:extLst>
                 </a:gridCol>
                 <a:gridCol w="1358137">
                   <a:extLst>
                     <a:ext uri="{9D8B030D-6E8A-4147-A177-3AD203B41FA5}">
-                      <a16:colId xmlns:a16="http://schemas.microsoft.com/office/drawing/2014/main" xmlns="" val="4214117398"/>
+                      <a16:colId xmlns="" xmlns:a16="http://schemas.microsoft.com/office/drawing/2014/main" val="4214117398"/>
                     </a:ext>
                   </a:extLst>
                 </a:gridCol>
                 <a:gridCol w="1358137">
                   <a:extLst>
                     <a:ext uri="{9D8B030D-6E8A-4147-A177-3AD203B41FA5}">
-                      <a16:colId xmlns:a16="http://schemas.microsoft.com/office/drawing/2014/main" xmlns="" val="3936630454"/>
+                      <a16:colId xmlns="" xmlns:a16="http://schemas.microsoft.com/office/drawing/2014/main" val="3936630454"/>
                     </a:ext>
                   </a:extLst>
                 </a:gridCol>
                 <a:gridCol w="1357073">
                   <a:extLst>
                     <a:ext uri="{9D8B030D-6E8A-4147-A177-3AD203B41FA5}">
-                      <a16:colId xmlns:a16="http://schemas.microsoft.com/office/drawing/2014/main" xmlns="" val="3619060530"/>
+                      <a16:colId xmlns="" xmlns:a16="http://schemas.microsoft.com/office/drawing/2014/main" val="3619060530"/>
                     </a:ext>
                   </a:extLst>
                 </a:gridCol>
-                <a:gridCol w="1509277">
+                <a:gridCol w="1388332">
                   <a:extLst>
                     <a:ext uri="{9D8B030D-6E8A-4147-A177-3AD203B41FA5}">
-                      <a16:colId xmlns:a16="http://schemas.microsoft.com/office/drawing/2014/main" xmlns="" val="3962761656"/>
+                      <a16:colId xmlns="" xmlns:a16="http://schemas.microsoft.com/office/drawing/2014/main" val="3962761656"/>
                     </a:ext>
                   </a:extLst>
                 </a:gridCol>
-                <a:gridCol w="1150406">
+                <a:gridCol w="1271351">
                   <a:extLst>
                     <a:ext uri="{9D8B030D-6E8A-4147-A177-3AD203B41FA5}">
-                      <a16:colId xmlns:a16="http://schemas.microsoft.com/office/drawing/2014/main" xmlns="" val="2897370512"/>
+                      <a16:colId xmlns="" xmlns:a16="http://schemas.microsoft.com/office/drawing/2014/main" val="2897370512"/>
                     </a:ext>
                   </a:extLst>
                 </a:gridCol>
                 <a:gridCol w="1553208">
                   <a:extLst>
                     <a:ext uri="{9D8B030D-6E8A-4147-A177-3AD203B41FA5}">
-                      <a16:colId xmlns:a16="http://schemas.microsoft.com/office/drawing/2014/main" xmlns="" val="2623348019"/>
+                      <a16:colId xmlns="" xmlns:a16="http://schemas.microsoft.com/office/drawing/2014/main" val="2623348019"/>
                     </a:ext>
                   </a:extLst>
                 </a:gridCol>
@@ -10428,7 +10424,7 @@
                 </a:tc>
                 <a:extLst>
                   <a:ext uri="{0D108BD9-81ED-4DB2-BD59-A6C34878D82A}">
-                    <a16:rowId xmlns:a16="http://schemas.microsoft.com/office/drawing/2014/main" xmlns="" val="396192681"/>
+                    <a16:rowId xmlns="" xmlns:a16="http://schemas.microsoft.com/office/drawing/2014/main" val="396192681"/>
                   </a:ext>
                 </a:extLst>
               </a:tr>
@@ -10580,7 +10576,7 @@
                     <a:p>
                       <a:pPr algn="r" fontAlgn="b"/>
                       <a:r>
-                        <a:rPr lang="ru-RU" sz="1200" b="0" i="0" u="none" strike="noStrike">
+                        <a:rPr lang="ru-RU" sz="1200" b="0" i="0" u="none" strike="noStrike" dirty="0">
                           <a:solidFill>
                             <a:srgbClr val="000000"/>
                           </a:solidFill>
@@ -10595,7 +10591,7 @@
                 </a:tc>
                 <a:extLst>
                   <a:ext uri="{0D108BD9-81ED-4DB2-BD59-A6C34878D82A}">
-                    <a16:rowId xmlns:a16="http://schemas.microsoft.com/office/drawing/2014/main" xmlns="" val="658754578"/>
+                    <a16:rowId xmlns="" xmlns:a16="http://schemas.microsoft.com/office/drawing/2014/main" val="658754578"/>
                   </a:ext>
                 </a:extLst>
               </a:tr>
@@ -10769,7 +10765,7 @@
                 </a:tc>
                 <a:extLst>
                   <a:ext uri="{0D108BD9-81ED-4DB2-BD59-A6C34878D82A}">
-                    <a16:rowId xmlns:a16="http://schemas.microsoft.com/office/drawing/2014/main" xmlns="" val="2775249390"/>
+                    <a16:rowId xmlns="" xmlns:a16="http://schemas.microsoft.com/office/drawing/2014/main" val="2775249390"/>
                   </a:ext>
                 </a:extLst>
               </a:tr>
@@ -10921,7 +10917,7 @@
                     <a:p>
                       <a:pPr algn="r" fontAlgn="b"/>
                       <a:r>
-                        <a:rPr lang="ru-RU" sz="1200" b="0" i="0" u="none" strike="noStrike">
+                        <a:rPr lang="ru-RU" sz="1200" b="0" i="0" u="none" strike="noStrike" dirty="0">
                           <a:solidFill>
                             <a:srgbClr val="000000"/>
                           </a:solidFill>
@@ -10936,7 +10932,7 @@
                 </a:tc>
                 <a:extLst>
                   <a:ext uri="{0D108BD9-81ED-4DB2-BD59-A6C34878D82A}">
-                    <a16:rowId xmlns:a16="http://schemas.microsoft.com/office/drawing/2014/main" xmlns="" val="351305436"/>
+                    <a16:rowId xmlns="" xmlns:a16="http://schemas.microsoft.com/office/drawing/2014/main" val="351305436"/>
                   </a:ext>
                 </a:extLst>
               </a:tr>
@@ -11110,7 +11106,7 @@
                 </a:tc>
                 <a:extLst>
                   <a:ext uri="{0D108BD9-81ED-4DB2-BD59-A6C34878D82A}">
-                    <a16:rowId xmlns:a16="http://schemas.microsoft.com/office/drawing/2014/main" xmlns="" val="743266472"/>
+                    <a16:rowId xmlns="" xmlns:a16="http://schemas.microsoft.com/office/drawing/2014/main" val="743266472"/>
                   </a:ext>
                 </a:extLst>
               </a:tr>
@@ -11269,7 +11265,7 @@
                           <a:effectLst/>
                           <a:latin typeface="Calibri" panose="020F0502020204030204" pitchFamily="34" charset="0"/>
                         </a:rPr>
-                        <a:t>1</a:t>
+                        <a:t>0</a:t>
                       </a:r>
                     </a:p>
                   </a:txBody>
@@ -11277,7 +11273,7 @@
                 </a:tc>
                 <a:extLst>
                   <a:ext uri="{0D108BD9-81ED-4DB2-BD59-A6C34878D82A}">
-                    <a16:rowId xmlns:a16="http://schemas.microsoft.com/office/drawing/2014/main" xmlns="" val="3253733328"/>
+                    <a16:rowId xmlns="" xmlns:a16="http://schemas.microsoft.com/office/drawing/2014/main" val="3253733328"/>
                   </a:ext>
                 </a:extLst>
               </a:tr>
@@ -11444,7 +11440,7 @@
                 </a:tc>
                 <a:extLst>
                   <a:ext uri="{0D108BD9-81ED-4DB2-BD59-A6C34878D82A}">
-                    <a16:rowId xmlns:a16="http://schemas.microsoft.com/office/drawing/2014/main" xmlns="" val="4155944330"/>
+                    <a16:rowId xmlns="" xmlns:a16="http://schemas.microsoft.com/office/drawing/2014/main" val="4155944330"/>
                   </a:ext>
                 </a:extLst>
               </a:tr>
@@ -11603,7 +11599,7 @@
                     <a:p>
                       <a:pPr algn="r" fontAlgn="b"/>
                       <a:r>
-                        <a:rPr lang="ru-RU" sz="1200" b="0" i="0" u="none" strike="noStrike">
+                        <a:rPr lang="ru-RU" sz="1200" b="0" i="0" u="none" strike="noStrike" dirty="0">
                           <a:solidFill>
                             <a:srgbClr val="000000"/>
                           </a:solidFill>
@@ -11618,7 +11614,7 @@
                 </a:tc>
                 <a:extLst>
                   <a:ext uri="{0D108BD9-81ED-4DB2-BD59-A6C34878D82A}">
-                    <a16:rowId xmlns:a16="http://schemas.microsoft.com/office/drawing/2014/main" xmlns="" val="232013355"/>
+                    <a16:rowId xmlns="" xmlns:a16="http://schemas.microsoft.com/office/drawing/2014/main" val="232013355"/>
                   </a:ext>
                 </a:extLst>
               </a:tr>
@@ -11770,7 +11766,7 @@
                     <a:p>
                       <a:pPr algn="r" fontAlgn="b"/>
                       <a:r>
-                        <a:rPr lang="ru-RU" sz="1200" b="0" i="0" u="none" strike="noStrike">
+                        <a:rPr lang="ru-RU" sz="1200" b="0" i="0" u="none" strike="noStrike" dirty="0">
                           <a:solidFill>
                             <a:srgbClr val="000000"/>
                           </a:solidFill>
@@ -12270,7 +12266,7 @@
                     <a:p>
                       <a:pPr algn="r" fontAlgn="b"/>
                       <a:r>
-                        <a:rPr lang="ru-RU" sz="1200" b="0" i="0" u="none" strike="noStrike">
+                        <a:rPr lang="ru-RU" sz="1200" b="0" i="0" u="none" strike="noStrike" dirty="0">
                           <a:solidFill>
                             <a:srgbClr val="000000"/>
                           </a:solidFill>
@@ -12439,7 +12435,7 @@
                           <a:effectLst/>
                           <a:latin typeface="Calibri" panose="020F0502020204030204" pitchFamily="34" charset="0"/>
                         </a:rPr>
-                        <a:t>467</a:t>
+                        <a:t>309233</a:t>
                       </a:r>
                     </a:p>
                   </a:txBody>
@@ -12601,7 +12597,7 @@
                     <a:p>
                       <a:pPr algn="r" fontAlgn="b"/>
                       <a:r>
-                        <a:rPr lang="ru-RU" sz="1200" b="0" i="0" u="none" strike="noStrike" dirty="0">
+                        <a:rPr lang="ru-RU" sz="1200" b="0" i="0" u="none" strike="noStrike">
                           <a:solidFill>
                             <a:srgbClr val="000000"/>
                           </a:solidFill>
@@ -12925,7 +12921,7 @@
                     <a:p>
                       <a:pPr algn="r" fontAlgn="b"/>
                       <a:r>
-                        <a:rPr lang="ru-RU" sz="1200" b="0" i="0" u="none" strike="noStrike">
+                        <a:rPr lang="ru-RU" sz="1200" b="0" i="0" u="none" strike="noStrike" dirty="0">
                           <a:solidFill>
                             <a:srgbClr val="000000"/>
                           </a:solidFill>
@@ -13087,7 +13083,7 @@
                     <a:p>
                       <a:pPr algn="r" fontAlgn="b"/>
                       <a:r>
-                        <a:rPr lang="ru-RU" sz="1200" b="0" i="0" u="none" strike="noStrike">
+                        <a:rPr lang="ru-RU" sz="1200" b="0" i="0" u="none" strike="noStrike" dirty="0">
                           <a:solidFill>
                             <a:srgbClr val="000000"/>
                           </a:solidFill>
@@ -13256,7 +13252,7 @@
                     <a:p>
                       <a:pPr algn="r" fontAlgn="b"/>
                       <a:r>
-                        <a:rPr lang="ru-RU" sz="1200" b="0" i="0" u="none" strike="noStrike">
+                        <a:rPr lang="ru-RU" sz="1200" b="0" i="0" u="none" strike="noStrike" dirty="0">
                           <a:solidFill>
                             <a:srgbClr val="000000"/>
                           </a:solidFill>
@@ -13551,7 +13547,7 @@
           <p:nvPr>
             <p:extLst>
               <p:ext uri="{D42A27DB-BD31-4B8C-83A1-F6EECF244321}">
-                <p14:modId xmlns:p14="http://schemas.microsoft.com/office/powerpoint/2010/main" val="1288266568"/>
+                <p14:modId xmlns:p14="http://schemas.microsoft.com/office/powerpoint/2010/main" val="890307860"/>
               </p:ext>
             </p:extLst>
           </p:nvPr>
@@ -13570,56 +13566,56 @@
                 <a:gridCol w="1711711">
                   <a:extLst>
                     <a:ext uri="{9D8B030D-6E8A-4147-A177-3AD203B41FA5}">
-                      <a16:colId xmlns:a16="http://schemas.microsoft.com/office/drawing/2014/main" xmlns="" val="1171950682"/>
+                      <a16:colId xmlns="" xmlns:a16="http://schemas.microsoft.com/office/drawing/2014/main" val="1171950682"/>
                     </a:ext>
                   </a:extLst>
                 </a:gridCol>
                 <a:gridCol w="848102">
                   <a:extLst>
                     <a:ext uri="{9D8B030D-6E8A-4147-A177-3AD203B41FA5}">
-                      <a16:colId xmlns:a16="http://schemas.microsoft.com/office/drawing/2014/main" xmlns="" val="2713623616"/>
+                      <a16:colId xmlns="" xmlns:a16="http://schemas.microsoft.com/office/drawing/2014/main" val="2713623616"/>
                     </a:ext>
                   </a:extLst>
                 </a:gridCol>
                 <a:gridCol w="1358137">
                   <a:extLst>
                     <a:ext uri="{9D8B030D-6E8A-4147-A177-3AD203B41FA5}">
-                      <a16:colId xmlns:a16="http://schemas.microsoft.com/office/drawing/2014/main" xmlns="" val="4214117398"/>
+                      <a16:colId xmlns="" xmlns:a16="http://schemas.microsoft.com/office/drawing/2014/main" val="4214117398"/>
                     </a:ext>
                   </a:extLst>
                 </a:gridCol>
                 <a:gridCol w="1358137">
                   <a:extLst>
                     <a:ext uri="{9D8B030D-6E8A-4147-A177-3AD203B41FA5}">
-                      <a16:colId xmlns:a16="http://schemas.microsoft.com/office/drawing/2014/main" xmlns="" val="3936630454"/>
+                      <a16:colId xmlns="" xmlns:a16="http://schemas.microsoft.com/office/drawing/2014/main" val="3936630454"/>
                     </a:ext>
                   </a:extLst>
                 </a:gridCol>
                 <a:gridCol w="1357073">
                   <a:extLst>
                     <a:ext uri="{9D8B030D-6E8A-4147-A177-3AD203B41FA5}">
-                      <a16:colId xmlns:a16="http://schemas.microsoft.com/office/drawing/2014/main" xmlns="" val="3619060530"/>
+                      <a16:colId xmlns="" xmlns:a16="http://schemas.microsoft.com/office/drawing/2014/main" val="3619060530"/>
                     </a:ext>
                   </a:extLst>
                 </a:gridCol>
-                <a:gridCol w="1509277">
+                <a:gridCol w="1434323">
                   <a:extLst>
                     <a:ext uri="{9D8B030D-6E8A-4147-A177-3AD203B41FA5}">
-                      <a16:colId xmlns:a16="http://schemas.microsoft.com/office/drawing/2014/main" xmlns="" val="3962761656"/>
+                      <a16:colId xmlns="" xmlns:a16="http://schemas.microsoft.com/office/drawing/2014/main" val="3962761656"/>
                     </a:ext>
                   </a:extLst>
                 </a:gridCol>
-                <a:gridCol w="1150406">
+                <a:gridCol w="1225360">
                   <a:extLst>
                     <a:ext uri="{9D8B030D-6E8A-4147-A177-3AD203B41FA5}">
-                      <a16:colId xmlns:a16="http://schemas.microsoft.com/office/drawing/2014/main" xmlns="" val="2897370512"/>
+                      <a16:colId xmlns="" xmlns:a16="http://schemas.microsoft.com/office/drawing/2014/main" val="2897370512"/>
                     </a:ext>
                   </a:extLst>
                 </a:gridCol>
                 <a:gridCol w="1553208">
                   <a:extLst>
                     <a:ext uri="{9D8B030D-6E8A-4147-A177-3AD203B41FA5}">
-                      <a16:colId xmlns:a16="http://schemas.microsoft.com/office/drawing/2014/main" xmlns="" val="2623348019"/>
+                      <a16:colId xmlns="" xmlns:a16="http://schemas.microsoft.com/office/drawing/2014/main" val="2623348019"/>
                     </a:ext>
                   </a:extLst>
                 </a:gridCol>
@@ -13827,7 +13823,7 @@
                 </a:tc>
                 <a:extLst>
                   <a:ext uri="{0D108BD9-81ED-4DB2-BD59-A6C34878D82A}">
-                    <a16:rowId xmlns:a16="http://schemas.microsoft.com/office/drawing/2014/main" xmlns="" val="396192681"/>
+                    <a16:rowId xmlns="" xmlns:a16="http://schemas.microsoft.com/office/drawing/2014/main" val="396192681"/>
                   </a:ext>
                 </a:extLst>
               </a:tr>
@@ -13979,7 +13975,7 @@
                     <a:p>
                       <a:pPr algn="r" fontAlgn="b"/>
                       <a:r>
-                        <a:rPr lang="ru-RU" sz="1200" b="0" i="0" u="none" strike="noStrike">
+                        <a:rPr lang="ru-RU" sz="1200" b="0" i="0" u="none" strike="noStrike" dirty="0">
                           <a:solidFill>
                             <a:srgbClr val="000000"/>
                           </a:solidFill>
@@ -13994,7 +13990,7 @@
                 </a:tc>
                 <a:extLst>
                   <a:ext uri="{0D108BD9-81ED-4DB2-BD59-A6C34878D82A}">
-                    <a16:rowId xmlns:a16="http://schemas.microsoft.com/office/drawing/2014/main" xmlns="" val="3253733328"/>
+                    <a16:rowId xmlns="" xmlns:a16="http://schemas.microsoft.com/office/drawing/2014/main" val="3253733328"/>
                   </a:ext>
                 </a:extLst>
               </a:tr>
@@ -14161,7 +14157,7 @@
                 </a:tc>
                 <a:extLst>
                   <a:ext uri="{0D108BD9-81ED-4DB2-BD59-A6C34878D82A}">
-                    <a16:rowId xmlns:a16="http://schemas.microsoft.com/office/drawing/2014/main" xmlns="" val="4155944330"/>
+                    <a16:rowId xmlns="" xmlns:a16="http://schemas.microsoft.com/office/drawing/2014/main" val="4155944330"/>
                   </a:ext>
                 </a:extLst>
               </a:tr>
@@ -14313,7 +14309,7 @@
                     <a:p>
                       <a:pPr algn="r" fontAlgn="b"/>
                       <a:r>
-                        <a:rPr lang="ru-RU" sz="1200" b="0" i="0" u="none" strike="noStrike">
+                        <a:rPr lang="ru-RU" sz="1200" b="0" i="0" u="none" strike="noStrike" dirty="0">
                           <a:solidFill>
                             <a:srgbClr val="000000"/>
                           </a:solidFill>
@@ -14328,7 +14324,7 @@
                 </a:tc>
                 <a:extLst>
                   <a:ext uri="{0D108BD9-81ED-4DB2-BD59-A6C34878D82A}">
-                    <a16:rowId xmlns:a16="http://schemas.microsoft.com/office/drawing/2014/main" xmlns="" val="232013355"/>
+                    <a16:rowId xmlns="" xmlns:a16="http://schemas.microsoft.com/office/drawing/2014/main" val="232013355"/>
                   </a:ext>
                 </a:extLst>
               </a:tr>
@@ -14480,7 +14476,7 @@
                     <a:p>
                       <a:pPr algn="r" fontAlgn="b"/>
                       <a:r>
-                        <a:rPr lang="ru-RU" sz="1200" b="0" i="0" u="none" strike="noStrike">
+                        <a:rPr lang="ru-RU" sz="1200" b="0" i="0" u="none" strike="noStrike" dirty="0">
                           <a:solidFill>
                             <a:srgbClr val="000000"/>
                           </a:solidFill>
@@ -14642,14 +14638,14 @@
                     <a:p>
                       <a:pPr algn="r" fontAlgn="b"/>
                       <a:r>
-                        <a:rPr lang="ru-RU" sz="1200" b="0" i="0" u="none" strike="noStrike">
-                          <a:solidFill>
-                            <a:srgbClr val="000000"/>
-                          </a:solidFill>
-                          <a:effectLst/>
-                          <a:latin typeface="Calibri" panose="020F0502020204030204" pitchFamily="34" charset="0"/>
-                        </a:rPr>
-                        <a:t>1</a:t>
+                        <a:rPr lang="ru-RU" sz="1200" b="0" i="0" u="none" strike="noStrike" dirty="0">
+                          <a:solidFill>
+                            <a:srgbClr val="000000"/>
+                          </a:solidFill>
+                          <a:effectLst/>
+                          <a:latin typeface="Calibri" panose="020F0502020204030204" pitchFamily="34" charset="0"/>
+                        </a:rPr>
+                        <a:t>0</a:t>
                       </a:r>
                     </a:p>
                   </a:txBody>
@@ -14811,7 +14807,7 @@
                           <a:effectLst/>
                           <a:latin typeface="Calibri" panose="020F0502020204030204" pitchFamily="34" charset="0"/>
                         </a:rPr>
-                        <a:t>1</a:t>
+                        <a:t>0</a:t>
                       </a:r>
                     </a:p>
                   </a:txBody>
@@ -14973,7 +14969,7 @@
                           <a:effectLst/>
                           <a:latin typeface="Calibri" panose="020F0502020204030204" pitchFamily="34" charset="0"/>
                         </a:rPr>
-                        <a:t>0</a:t>
+                        <a:t>2</a:t>
                       </a:r>
                     </a:p>
                   </a:txBody>
@@ -15135,7 +15131,7 @@
                           <a:effectLst/>
                           <a:latin typeface="Calibri" panose="020F0502020204030204" pitchFamily="34" charset="0"/>
                         </a:rPr>
-                        <a:t>2</a:t>
+                        <a:t>1</a:t>
                       </a:r>
                     </a:p>
                   </a:txBody>
@@ -15297,7 +15293,7 @@
                           <a:effectLst/>
                           <a:latin typeface="Calibri" panose="020F0502020204030204" pitchFamily="34" charset="0"/>
                         </a:rPr>
-                        <a:t>2</a:t>
+                        <a:t>1</a:t>
                       </a:r>
                     </a:p>
                   </a:txBody>
@@ -15622,14 +15618,14 @@
                     <a:p>
                       <a:pPr algn="r" fontAlgn="b"/>
                       <a:r>
-                        <a:rPr lang="ru-RU" sz="1200" b="0" i="0" u="none" strike="noStrike">
-                          <a:solidFill>
-                            <a:srgbClr val="000000"/>
-                          </a:solidFill>
-                          <a:effectLst/>
-                          <a:latin typeface="Calibri" panose="020F0502020204030204" pitchFamily="34" charset="0"/>
-                        </a:rPr>
-                        <a:t>387</a:t>
+                        <a:rPr lang="ru-RU" sz="1200" b="0" i="0" u="none" strike="noStrike" dirty="0">
+                          <a:solidFill>
+                            <a:srgbClr val="000000"/>
+                          </a:solidFill>
+                          <a:effectLst/>
+                          <a:latin typeface="Calibri" panose="020F0502020204030204" pitchFamily="34" charset="0"/>
+                        </a:rPr>
+                        <a:t>3432</a:t>
                       </a:r>
                     </a:p>
                   </a:txBody>
@@ -15795,7 +15791,7 @@
                           <a:effectLst/>
                           <a:latin typeface="Calibri" panose="020F0502020204030204" pitchFamily="34" charset="0"/>
                         </a:rPr>
-                        <a:t>980</a:t>
+                        <a:t>1879</a:t>
                       </a:r>
                     </a:p>
                   </a:txBody>
@@ -16120,7 +16116,7 @@
                           <a:effectLst/>
                           <a:latin typeface="Calibri" panose="020F0502020204030204" pitchFamily="34" charset="0"/>
                         </a:rPr>
-                        <a:t>2</a:t>
+                        <a:t>1</a:t>
                       </a:r>
                     </a:p>
                   </a:txBody>
@@ -16279,7 +16275,7 @@
                           <a:effectLst/>
                           <a:latin typeface="Calibri" panose="020F0502020204030204" pitchFamily="34" charset="0"/>
                         </a:rPr>
-                        <a:t>31</a:t>
+                        <a:t>29</a:t>
                       </a:r>
                     </a:p>
                   </a:txBody>
@@ -16445,7 +16441,7 @@
                           <a:effectLst/>
                           <a:latin typeface="Calibri" panose="020F0502020204030204" pitchFamily="34" charset="0"/>
                         </a:rPr>
-                        <a:t>55</a:t>
+                        <a:t>57</a:t>
                       </a:r>
                     </a:p>
                   </a:txBody>
@@ -16611,7 +16607,7 @@
                           <a:effectLst/>
                           <a:latin typeface="Calibri" panose="020F0502020204030204" pitchFamily="34" charset="0"/>
                         </a:rPr>
-                        <a:t>52</a:t>
+                        <a:t>46</a:t>
                       </a:r>
                     </a:p>
                   </a:txBody>
@@ -17088,7 +17084,7 @@
                           <a:effectLst/>
                           <a:latin typeface="Calibri" panose="020F0502020204030204" pitchFamily="34" charset="0"/>
                         </a:rPr>
-                        <a:t>683</a:t>
+                        <a:t>11570</a:t>
                       </a:r>
                     </a:p>
                   </a:txBody>
@@ -17247,7 +17243,7 @@
                     <a:p>
                       <a:pPr algn="r" fontAlgn="b"/>
                       <a:r>
-                        <a:rPr lang="ru-RU" sz="1200" b="0" i="0" u="none" strike="noStrike">
+                        <a:rPr lang="ru-RU" sz="1200" b="0" i="0" u="none" strike="noStrike" dirty="0">
                           <a:solidFill>
                             <a:srgbClr val="000000"/>
                           </a:solidFill>
@@ -17413,7 +17409,7 @@
                           <a:effectLst/>
                           <a:latin typeface="Calibri" panose="020F0502020204030204" pitchFamily="34" charset="0"/>
                         </a:rPr>
-                        <a:t>13</a:t>
+                        <a:t>11</a:t>
                       </a:r>
                     </a:p>
                   </a:txBody>
@@ -17565,14 +17561,14 @@
                     <a:p>
                       <a:pPr algn="r" fontAlgn="b"/>
                       <a:r>
-                        <a:rPr lang="ru-RU" sz="1200" b="0" i="0" u="none" strike="noStrike">
-                          <a:solidFill>
-                            <a:srgbClr val="000000"/>
-                          </a:solidFill>
-                          <a:effectLst/>
-                          <a:latin typeface="Calibri" panose="020F0502020204030204" pitchFamily="34" charset="0"/>
-                        </a:rPr>
-                        <a:t>364</a:t>
+                        <a:rPr lang="ru-RU" sz="1200" b="0" i="0" u="none" strike="noStrike" dirty="0">
+                          <a:solidFill>
+                            <a:srgbClr val="000000"/>
+                          </a:solidFill>
+                          <a:effectLst/>
+                          <a:latin typeface="Calibri" panose="020F0502020204030204" pitchFamily="34" charset="0"/>
+                        </a:rPr>
+                        <a:t>373</a:t>
                       </a:r>
                     </a:p>
                   </a:txBody>
@@ -17724,7 +17720,7 @@
                     <a:p>
                       <a:pPr algn="r" fontAlgn="b"/>
                       <a:r>
-                        <a:rPr lang="ru-RU" sz="1200" b="0" i="0" u="none" strike="noStrike">
+                        <a:rPr lang="ru-RU" sz="1200" b="0" i="0" u="none" strike="noStrike" dirty="0">
                           <a:solidFill>
                             <a:srgbClr val="000000"/>
                           </a:solidFill>

</xml_diff>

<commit_message>
Fix presentation: added input and ouput info
</commit_message>
<xml_diff>
--- a/docs/Презентация v0.8.1.pptx
+++ b/docs/Презентация v0.8.1.pptx
@@ -16,14 +16,14 @@
     <p:sldId id="315" r:id="rId7"/>
     <p:sldId id="317" r:id="rId8"/>
     <p:sldId id="320" r:id="rId9"/>
-    <p:sldId id="340" r:id="rId10"/>
-    <p:sldId id="341" r:id="rId11"/>
-    <p:sldId id="321" r:id="rId12"/>
-    <p:sldId id="322" r:id="rId13"/>
-    <p:sldId id="324" r:id="rId14"/>
-    <p:sldId id="332" r:id="rId15"/>
-    <p:sldId id="336" r:id="rId16"/>
-    <p:sldId id="337" r:id="rId17"/>
+    <p:sldId id="321" r:id="rId10"/>
+    <p:sldId id="322" r:id="rId11"/>
+    <p:sldId id="324" r:id="rId12"/>
+    <p:sldId id="332" r:id="rId13"/>
+    <p:sldId id="336" r:id="rId14"/>
+    <p:sldId id="337" r:id="rId15"/>
+    <p:sldId id="340" r:id="rId16"/>
+    <p:sldId id="341" r:id="rId17"/>
     <p:sldId id="342" r:id="rId18"/>
     <p:sldId id="343" r:id="rId19"/>
     <p:sldId id="325" r:id="rId20"/>
@@ -251,7 +251,7 @@
           <a:p>
             <a:fld id="{2F7BDC20-999D-4259-B6C3-F40ECC5C4406}" type="datetimeFigureOut">
               <a:rPr lang="ru-RU" smtClean="0"/>
-              <a:t>11.12.2017</a:t>
+              <a:t>13.12.2017</a:t>
             </a:fld>
             <a:endParaRPr lang="ru-RU"/>
           </a:p>
@@ -1706,7 +1706,7 @@
           <a:p>
             <a:fld id="{8F045AFB-DE82-40CD-9223-121836DEA27A}" type="datetimeFigureOut">
               <a:rPr lang="ru-RU" smtClean="0"/>
-              <a:t>11.12.2017</a:t>
+              <a:t>13.12.2017</a:t>
             </a:fld>
             <a:endParaRPr lang="ru-RU"/>
           </a:p>
@@ -1876,7 +1876,7 @@
           <a:p>
             <a:fld id="{8F045AFB-DE82-40CD-9223-121836DEA27A}" type="datetimeFigureOut">
               <a:rPr lang="ru-RU" smtClean="0"/>
-              <a:t>11.12.2017</a:t>
+              <a:t>13.12.2017</a:t>
             </a:fld>
             <a:endParaRPr lang="ru-RU"/>
           </a:p>
@@ -2056,7 +2056,7 @@
           <a:p>
             <a:fld id="{8F045AFB-DE82-40CD-9223-121836DEA27A}" type="datetimeFigureOut">
               <a:rPr lang="ru-RU" smtClean="0"/>
-              <a:t>11.12.2017</a:t>
+              <a:t>13.12.2017</a:t>
             </a:fld>
             <a:endParaRPr lang="ru-RU"/>
           </a:p>
@@ -2226,7 +2226,7 @@
           <a:p>
             <a:fld id="{8F045AFB-DE82-40CD-9223-121836DEA27A}" type="datetimeFigureOut">
               <a:rPr lang="ru-RU" smtClean="0"/>
-              <a:t>11.12.2017</a:t>
+              <a:t>13.12.2017</a:t>
             </a:fld>
             <a:endParaRPr lang="ru-RU"/>
           </a:p>
@@ -2472,7 +2472,7 @@
           <a:p>
             <a:fld id="{8F045AFB-DE82-40CD-9223-121836DEA27A}" type="datetimeFigureOut">
               <a:rPr lang="ru-RU" smtClean="0"/>
-              <a:t>11.12.2017</a:t>
+              <a:t>13.12.2017</a:t>
             </a:fld>
             <a:endParaRPr lang="ru-RU"/>
           </a:p>
@@ -2704,7 +2704,7 @@
           <a:p>
             <a:fld id="{8F045AFB-DE82-40CD-9223-121836DEA27A}" type="datetimeFigureOut">
               <a:rPr lang="ru-RU" smtClean="0"/>
-              <a:t>11.12.2017</a:t>
+              <a:t>13.12.2017</a:t>
             </a:fld>
             <a:endParaRPr lang="ru-RU"/>
           </a:p>
@@ -3071,7 +3071,7 @@
           <a:p>
             <a:fld id="{8F045AFB-DE82-40CD-9223-121836DEA27A}" type="datetimeFigureOut">
               <a:rPr lang="ru-RU" smtClean="0"/>
-              <a:t>11.12.2017</a:t>
+              <a:t>13.12.2017</a:t>
             </a:fld>
             <a:endParaRPr lang="ru-RU"/>
           </a:p>
@@ -3189,7 +3189,7 @@
           <a:p>
             <a:fld id="{8F045AFB-DE82-40CD-9223-121836DEA27A}" type="datetimeFigureOut">
               <a:rPr lang="ru-RU" smtClean="0"/>
-              <a:t>11.12.2017</a:t>
+              <a:t>13.12.2017</a:t>
             </a:fld>
             <a:endParaRPr lang="ru-RU"/>
           </a:p>
@@ -3284,7 +3284,7 @@
           <a:p>
             <a:fld id="{8F045AFB-DE82-40CD-9223-121836DEA27A}" type="datetimeFigureOut">
               <a:rPr lang="ru-RU" smtClean="0"/>
-              <a:t>11.12.2017</a:t>
+              <a:t>13.12.2017</a:t>
             </a:fld>
             <a:endParaRPr lang="ru-RU"/>
           </a:p>
@@ -3561,7 +3561,7 @@
           <a:p>
             <a:fld id="{8F045AFB-DE82-40CD-9223-121836DEA27A}" type="datetimeFigureOut">
               <a:rPr lang="ru-RU" smtClean="0"/>
-              <a:t>11.12.2017</a:t>
+              <a:t>13.12.2017</a:t>
             </a:fld>
             <a:endParaRPr lang="ru-RU"/>
           </a:p>
@@ -3814,7 +3814,7 @@
           <a:p>
             <a:fld id="{8F045AFB-DE82-40CD-9223-121836DEA27A}" type="datetimeFigureOut">
               <a:rPr lang="ru-RU" smtClean="0"/>
-              <a:t>11.12.2017</a:t>
+              <a:t>13.12.2017</a:t>
             </a:fld>
             <a:endParaRPr lang="ru-RU"/>
           </a:p>
@@ -4027,7 +4027,7 @@
           <a:p>
             <a:fld id="{8F045AFB-DE82-40CD-9223-121836DEA27A}" type="datetimeFigureOut">
               <a:rPr lang="ru-RU" smtClean="0"/>
-              <a:t>11.12.2017</a:t>
+              <a:t>13.12.2017</a:t>
             </a:fld>
             <a:endParaRPr lang="ru-RU"/>
           </a:p>
@@ -4511,116 +4511,245 @@
       </p:grpSpPr>
       <p:sp>
         <p:nvSpPr>
-          <p:cNvPr id="6" name="Заголовок 1"/>
-          <p:cNvSpPr txBox="1">
-            <a:spLocks/>
-          </p:cNvSpPr>
+          <p:cNvPr id="11" name="TextBox 10"/>
+          <p:cNvSpPr txBox="1"/>
           <p:nvPr/>
         </p:nvSpPr>
         <p:spPr>
           <a:xfrm>
-            <a:off x="0" y="203440"/>
-            <a:ext cx="12192000" cy="732126"/>
+            <a:off x="792480" y="472440"/>
+            <a:ext cx="4128053" cy="769441"/>
           </a:xfrm>
           <a:prstGeom prst="rect">
             <a:avLst/>
           </a:prstGeom>
+          <a:noFill/>
         </p:spPr>
         <p:txBody>
-          <a:bodyPr vert="horz" lIns="91440" tIns="45720" rIns="91440" bIns="45720" rtlCol="0" anchor="ctr">
-            <a:noAutofit/>
+          <a:bodyPr wrap="none" rtlCol="0">
+            <a:spAutoFit/>
           </a:bodyPr>
-          <a:lstStyle>
-            <a:lvl1pPr algn="l" defTabSz="914400" rtl="0" eaLnBrk="1" latinLnBrk="0" hangingPunct="1">
-              <a:lnSpc>
-                <a:spcPct val="90000"/>
-              </a:lnSpc>
-              <a:spcBef>
-                <a:spcPct val="0"/>
-              </a:spcBef>
-              <a:buNone/>
-              <a:defRPr sz="4400" kern="1200">
-                <a:solidFill>
-                  <a:schemeClr val="tx1"/>
-                </a:solidFill>
-                <a:latin typeface="+mj-lt"/>
-                <a:ea typeface="+mj-ea"/>
-                <a:cs typeface="+mj-cs"/>
-              </a:defRPr>
-            </a:lvl1pPr>
-          </a:lstStyle>
+          <a:lstStyle/>
           <a:p>
-            <a:pPr algn="ctr"/>
-            <a:r>
-              <a:rPr lang="ru-RU" dirty="0" smtClean="0">
+            <a:r>
+              <a:rPr lang="ru-RU" sz="4400" dirty="0">
                 <a:solidFill>
                   <a:schemeClr val="accent1">
                     <a:lumMod val="50000"/>
                   </a:schemeClr>
                 </a:solidFill>
+                <a:latin typeface="+mj-lt"/>
+                <a:ea typeface="+mj-ea"/>
+                <a:cs typeface="+mj-cs"/>
               </a:rPr>
-              <a:t>Сетка с восстановленной нумерацией (</a:t>
-            </a:r>
-            <a:r>
-              <a:rPr lang="en-US" dirty="0" smtClean="0">
+              <a:t>Входные</a:t>
+            </a:r>
+            <a:r>
+              <a:rPr lang="ru-RU" dirty="0" smtClean="0"/>
+              <a:t> </a:t>
+            </a:r>
+            <a:r>
+              <a:rPr lang="ru-RU" sz="4400" dirty="0">
                 <a:solidFill>
                   <a:schemeClr val="accent1">
                     <a:lumMod val="50000"/>
                   </a:schemeClr>
                 </a:solidFill>
+                <a:latin typeface="+mj-lt"/>
+                <a:ea typeface="+mj-ea"/>
+                <a:cs typeface="+mj-cs"/>
               </a:rPr>
-              <a:t>3D)</a:t>
-            </a:r>
-            <a:endParaRPr lang="ru-RU" dirty="0">
+              <a:t>данные</a:t>
+            </a:r>
+            <a:endParaRPr lang="ru-RU" sz="4400" dirty="0">
               <a:solidFill>
                 <a:schemeClr val="accent1">
                   <a:lumMod val="50000"/>
                 </a:schemeClr>
               </a:solidFill>
+              <a:latin typeface="+mj-lt"/>
+              <a:ea typeface="+mj-ea"/>
+              <a:cs typeface="+mj-cs"/>
             </a:endParaRPr>
           </a:p>
         </p:txBody>
       </p:sp>
-      <p:pic>
-        <p:nvPicPr>
-          <p:cNvPr id="2" name="Рисунок 1"/>
-          <p:cNvPicPr>
-            <a:picLocks noChangeAspect="1"/>
-          </p:cNvPicPr>
+      <p:sp>
+        <p:nvSpPr>
+          <p:cNvPr id="12" name="TextBox 11"/>
+          <p:cNvSpPr txBox="1"/>
           <p:nvPr/>
-        </p:nvPicPr>
-        <p:blipFill rotWithShape="1">
-          <a:blip r:embed="rId2">
-            <a:biLevel thresh="75000"/>
-            <a:extLst>
-              <a:ext uri="{28A0092B-C50C-407E-A947-70E740481C1C}">
-                <a14:useLocalDpi xmlns:a14="http://schemas.microsoft.com/office/drawing/2010/main" val="0"/>
-              </a:ext>
-            </a:extLst>
-          </a:blip>
-          <a:srcRect t="1090"/>
-          <a:stretch/>
-        </p:blipFill>
+        </p:nvSpPr>
         <p:spPr>
           <a:xfrm>
-            <a:off x="3232913" y="1000124"/>
-            <a:ext cx="5001799" cy="5857875"/>
+            <a:off x="792480" y="2118360"/>
+            <a:ext cx="4565673" cy="769441"/>
           </a:xfrm>
           <a:prstGeom prst="rect">
             <a:avLst/>
           </a:prstGeom>
+          <a:noFill/>
         </p:spPr>
-      </p:pic>
+        <p:txBody>
+          <a:bodyPr wrap="none" rtlCol="0">
+            <a:spAutoFit/>
+          </a:bodyPr>
+          <a:lstStyle/>
+          <a:p>
+            <a:r>
+              <a:rPr lang="ru-RU" sz="4400" dirty="0" smtClean="0">
+                <a:solidFill>
+                  <a:schemeClr val="accent1">
+                    <a:lumMod val="50000"/>
+                  </a:schemeClr>
+                </a:solidFill>
+                <a:latin typeface="+mj-lt"/>
+                <a:ea typeface="+mj-ea"/>
+                <a:cs typeface="+mj-cs"/>
+              </a:rPr>
+              <a:t>Выходные данные</a:t>
+            </a:r>
+            <a:endParaRPr lang="ru-RU" sz="4400" dirty="0">
+              <a:solidFill>
+                <a:schemeClr val="accent1">
+                  <a:lumMod val="50000"/>
+                </a:schemeClr>
+              </a:solidFill>
+              <a:latin typeface="+mj-lt"/>
+              <a:ea typeface="+mj-ea"/>
+              <a:cs typeface="+mj-cs"/>
+            </a:endParaRPr>
+          </a:p>
+        </p:txBody>
+      </p:sp>
+      <p:sp>
+        <p:nvSpPr>
+          <p:cNvPr id="13" name="TextBox 12"/>
+          <p:cNvSpPr txBox="1"/>
+          <p:nvPr/>
+        </p:nvSpPr>
+        <p:spPr>
+          <a:xfrm>
+            <a:off x="792480" y="1299150"/>
+            <a:ext cx="6787436" cy="523220"/>
+          </a:xfrm>
+          <a:prstGeom prst="rect">
+            <a:avLst/>
+          </a:prstGeom>
+          <a:noFill/>
+        </p:spPr>
+        <p:txBody>
+          <a:bodyPr wrap="none" rtlCol="0">
+            <a:spAutoFit/>
+          </a:bodyPr>
+          <a:lstStyle/>
+          <a:p>
+            <a:pPr marL="457200" indent="-457200">
+              <a:buFont typeface="Arial" panose="020B0604020202020204" pitchFamily="34" charset="0"/>
+              <a:buChar char="•"/>
+            </a:pPr>
+            <a:r>
+              <a:rPr lang="ru-RU" sz="2800" dirty="0" smtClean="0"/>
+              <a:t>Неориентированный помеченный граф.</a:t>
+            </a:r>
+            <a:endParaRPr lang="ru-RU" sz="2800" dirty="0"/>
+          </a:p>
+        </p:txBody>
+      </p:sp>
+      <p:sp>
+        <p:nvSpPr>
+          <p:cNvPr id="14" name="TextBox 13"/>
+          <p:cNvSpPr txBox="1"/>
+          <p:nvPr/>
+        </p:nvSpPr>
+        <p:spPr>
+          <a:xfrm>
+            <a:off x="792480" y="3182422"/>
+            <a:ext cx="10096225" cy="1815882"/>
+          </a:xfrm>
+          <a:prstGeom prst="rect">
+            <a:avLst/>
+          </a:prstGeom>
+          <a:noFill/>
+        </p:spPr>
+        <p:txBody>
+          <a:bodyPr wrap="none" rtlCol="0">
+            <a:spAutoFit/>
+          </a:bodyPr>
+          <a:lstStyle/>
+          <a:p>
+            <a:pPr marL="457200" indent="-457200">
+              <a:buFont typeface="Arial" panose="020B0604020202020204" pitchFamily="34" charset="0"/>
+              <a:buChar char="•"/>
+            </a:pPr>
+            <a:r>
+              <a:rPr lang="ru-RU" sz="2800" dirty="0" smtClean="0"/>
+              <a:t>Координаты</a:t>
+            </a:r>
+            <a:r>
+              <a:rPr lang="ru-RU" sz="2800" dirty="0"/>
+              <a:t> на регулярной </a:t>
+            </a:r>
+            <a:r>
+              <a:rPr lang="ru-RU" sz="2800" dirty="0" smtClean="0"/>
+              <a:t>сетке определенной размерности</a:t>
+            </a:r>
+          </a:p>
+          <a:p>
+            <a:r>
+              <a:rPr lang="ru-RU" sz="2800" dirty="0" smtClean="0"/>
+              <a:t>для </a:t>
+            </a:r>
+            <a:r>
+              <a:rPr lang="ru-RU" sz="2800" dirty="0"/>
+              <a:t>каждой </a:t>
+            </a:r>
+            <a:r>
+              <a:rPr lang="ru-RU" sz="2800" dirty="0" smtClean="0"/>
+              <a:t>вершины графа</a:t>
+            </a:r>
+          </a:p>
+          <a:p>
+            <a:pPr marL="457200" indent="-457200">
+              <a:buFont typeface="Arial" panose="020B0604020202020204" pitchFamily="34" charset="0"/>
+              <a:buChar char="•"/>
+            </a:pPr>
+            <a:r>
+              <a:rPr lang="ru-RU" sz="2800" dirty="0" smtClean="0"/>
+              <a:t>Сообщение об ошибке, если не удалось найти подходящие </a:t>
+            </a:r>
+          </a:p>
+          <a:p>
+            <a:r>
+              <a:rPr lang="ru-RU" sz="2800" dirty="0" smtClean="0"/>
+              <a:t>координаты</a:t>
+            </a:r>
+            <a:endParaRPr lang="ru-RU" sz="2800" dirty="0"/>
+          </a:p>
+        </p:txBody>
+      </p:sp>
     </p:spTree>
     <p:extLst>
       <p:ext uri="{BB962C8B-B14F-4D97-AF65-F5344CB8AC3E}">
-        <p14:creationId xmlns:p14="http://schemas.microsoft.com/office/powerpoint/2010/main" val="3230243968"/>
+        <p14:creationId xmlns:p14="http://schemas.microsoft.com/office/powerpoint/2010/main" val="2608972873"/>
       </p:ext>
     </p:extLst>
   </p:cSld>
   <p:clrMapOvr>
     <a:masterClrMapping/>
   </p:clrMapOvr>
+  <mc:AlternateContent xmlns:mc="http://schemas.openxmlformats.org/markup-compatibility/2006" xmlns:p14="http://schemas.microsoft.com/office/powerpoint/2010/main">
+    <mc:Choice Requires="p14">
+      <p:transition spd="med" p14:dur="700">
+        <p:fade/>
+      </p:transition>
+    </mc:Choice>
+    <mc:Fallback xmlns="">
+      <p:transition spd="med">
+        <p:fade/>
+      </p:transition>
+    </mc:Fallback>
+  </mc:AlternateContent>
   <p:timing>
     <p:tnLst>
       <p:par>
@@ -4698,202 +4827,6 @@
                   </a:schemeClr>
                 </a:solidFill>
               </a:rPr>
-              <a:t>Постановка задачи</a:t>
-            </a:r>
-            <a:endParaRPr lang="ru-RU" sz="7200" dirty="0">
-              <a:solidFill>
-                <a:schemeClr val="accent1">
-                  <a:lumMod val="50000"/>
-                </a:schemeClr>
-              </a:solidFill>
-            </a:endParaRPr>
-          </a:p>
-        </p:txBody>
-      </p:sp>
-    </p:spTree>
-    <p:extLst>
-      <p:ext uri="{BB962C8B-B14F-4D97-AF65-F5344CB8AC3E}">
-        <p14:creationId xmlns:p14="http://schemas.microsoft.com/office/powerpoint/2010/main" val="4024909480"/>
-      </p:ext>
-    </p:extLst>
-  </p:cSld>
-  <p:clrMapOvr>
-    <a:masterClrMapping/>
-  </p:clrMapOvr>
-  <mc:AlternateContent xmlns:mc="http://schemas.openxmlformats.org/markup-compatibility/2006" xmlns:p14="http://schemas.microsoft.com/office/powerpoint/2010/main">
-    <mc:Choice Requires="p14">
-      <p:transition spd="med" p14:dur="700">
-        <p:fade/>
-      </p:transition>
-    </mc:Choice>
-    <mc:Fallback xmlns="">
-      <p:transition spd="med">
-        <p:fade/>
-      </p:transition>
-    </mc:Fallback>
-  </mc:AlternateContent>
-  <p:timing>
-    <p:tnLst>
-      <p:par>
-        <p:cTn id="1" dur="indefinite" restart="never" nodeType="tmRoot"/>
-      </p:par>
-    </p:tnLst>
-  </p:timing>
-</p:sld>
-</file>
-
-<file path=ppt/slides/slide12.xml><?xml version="1.0" encoding="utf-8"?>
-<p:sld xmlns:a="http://schemas.openxmlformats.org/drawingml/2006/main" xmlns:r="http://schemas.openxmlformats.org/officeDocument/2006/relationships" xmlns:p="http://schemas.openxmlformats.org/presentationml/2006/main">
-  <p:cSld>
-    <p:spTree>
-      <p:nvGrpSpPr>
-        <p:cNvPr id="1" name=""/>
-        <p:cNvGrpSpPr/>
-        <p:nvPr/>
-      </p:nvGrpSpPr>
-      <p:grpSpPr>
-        <a:xfrm>
-          <a:off x="0" y="0"/>
-          <a:ext cx="0" cy="0"/>
-          <a:chOff x="0" y="0"/>
-          <a:chExt cx="0" cy="0"/>
-        </a:xfrm>
-      </p:grpSpPr>
-      <p:sp>
-        <p:nvSpPr>
-          <p:cNvPr id="2" name="Заголовок 1"/>
-          <p:cNvSpPr>
-            <a:spLocks noGrp="1"/>
-          </p:cNvSpPr>
-          <p:nvPr>
-            <p:ph type="title"/>
-          </p:nvPr>
-        </p:nvSpPr>
-        <p:spPr>
-          <a:xfrm>
-            <a:off x="1000124" y="365125"/>
-            <a:ext cx="10353675" cy="1325563"/>
-          </a:xfrm>
-        </p:spPr>
-        <p:txBody>
-          <a:bodyPr/>
-          <a:lstStyle/>
-          <a:p>
-            <a:r>
-              <a:rPr lang="ru-RU" dirty="0" smtClean="0">
-                <a:solidFill>
-                  <a:srgbClr val="FF0000"/>
-                </a:solidFill>
-              </a:rPr>
-              <a:t>КАКАЯ ДОЛЖНА БЫТЬ НУМЕРАЦИЯ И СЕТКА</a:t>
-            </a:r>
-            <a:endParaRPr lang="ru-RU" dirty="0">
-              <a:solidFill>
-                <a:srgbClr val="FF0000"/>
-              </a:solidFill>
-            </a:endParaRPr>
-          </a:p>
-        </p:txBody>
-      </p:sp>
-    </p:spTree>
-    <p:extLst>
-      <p:ext uri="{BB962C8B-B14F-4D97-AF65-F5344CB8AC3E}">
-        <p14:creationId xmlns:p14="http://schemas.microsoft.com/office/powerpoint/2010/main" val="2608972873"/>
-      </p:ext>
-    </p:extLst>
-  </p:cSld>
-  <p:clrMapOvr>
-    <a:masterClrMapping/>
-  </p:clrMapOvr>
-  <mc:AlternateContent xmlns:mc="http://schemas.openxmlformats.org/markup-compatibility/2006" xmlns:p14="http://schemas.microsoft.com/office/powerpoint/2010/main">
-    <mc:Choice Requires="p14">
-      <p:transition spd="med" p14:dur="700">
-        <p:fade/>
-      </p:transition>
-    </mc:Choice>
-    <mc:Fallback xmlns="">
-      <p:transition spd="med">
-        <p:fade/>
-      </p:transition>
-    </mc:Fallback>
-  </mc:AlternateContent>
-  <p:timing>
-    <p:tnLst>
-      <p:par>
-        <p:cTn id="1" dur="indefinite" restart="never" nodeType="tmRoot"/>
-      </p:par>
-    </p:tnLst>
-  </p:timing>
-</p:sld>
-</file>
-
-<file path=ppt/slides/slide13.xml><?xml version="1.0" encoding="utf-8"?>
-<p:sld xmlns:a="http://schemas.openxmlformats.org/drawingml/2006/main" xmlns:r="http://schemas.openxmlformats.org/officeDocument/2006/relationships" xmlns:p="http://schemas.openxmlformats.org/presentationml/2006/main">
-  <p:cSld>
-    <p:spTree>
-      <p:nvGrpSpPr>
-        <p:cNvPr id="1" name=""/>
-        <p:cNvGrpSpPr/>
-        <p:nvPr/>
-      </p:nvGrpSpPr>
-      <p:grpSpPr>
-        <a:xfrm>
-          <a:off x="0" y="0"/>
-          <a:ext cx="0" cy="0"/>
-          <a:chOff x="0" y="0"/>
-          <a:chExt cx="0" cy="0"/>
-        </a:xfrm>
-      </p:grpSpPr>
-      <p:sp>
-        <p:nvSpPr>
-          <p:cNvPr id="5" name="Заголовок 1"/>
-          <p:cNvSpPr txBox="1">
-            <a:spLocks/>
-          </p:cNvSpPr>
-          <p:nvPr/>
-        </p:nvSpPr>
-        <p:spPr>
-          <a:xfrm>
-            <a:off x="2563091" y="2313708"/>
-            <a:ext cx="6456219" cy="1704543"/>
-          </a:xfrm>
-          <a:prstGeom prst="rect">
-            <a:avLst/>
-          </a:prstGeom>
-        </p:spPr>
-        <p:txBody>
-          <a:bodyPr vert="horz" lIns="91440" tIns="45720" rIns="91440" bIns="45720" rtlCol="0" anchor="ctr">
-            <a:noAutofit/>
-          </a:bodyPr>
-          <a:lstStyle>
-            <a:lvl1pPr algn="l" defTabSz="914400" rtl="0" eaLnBrk="1" latinLnBrk="0" hangingPunct="1">
-              <a:lnSpc>
-                <a:spcPct val="90000"/>
-              </a:lnSpc>
-              <a:spcBef>
-                <a:spcPct val="0"/>
-              </a:spcBef>
-              <a:buNone/>
-              <a:defRPr sz="4400" kern="1200">
-                <a:solidFill>
-                  <a:schemeClr val="tx1"/>
-                </a:solidFill>
-                <a:latin typeface="+mj-lt"/>
-                <a:ea typeface="+mj-ea"/>
-                <a:cs typeface="+mj-cs"/>
-              </a:defRPr>
-            </a:lvl1pPr>
-          </a:lstStyle>
-          <a:p>
-            <a:pPr algn="ctr"/>
-            <a:r>
-              <a:rPr lang="ru-RU" sz="7200" dirty="0" smtClean="0">
-                <a:solidFill>
-                  <a:schemeClr val="accent1">
-                    <a:lumMod val="50000"/>
-                  </a:schemeClr>
-                </a:solidFill>
-              </a:rPr>
               <a:t>Формальная постановка задачи</a:t>
             </a:r>
             <a:endParaRPr lang="ru-RU" sz="7200" dirty="0">
@@ -4938,7 +4871,7 @@
 </p:sld>
 </file>
 
-<file path=ppt/slides/slide14.xml><?xml version="1.0" encoding="utf-8"?>
+<file path=ppt/slides/slide12.xml><?xml version="1.0" encoding="utf-8"?>
 <p:sld xmlns:a="http://schemas.openxmlformats.org/drawingml/2006/main" xmlns:r="http://schemas.openxmlformats.org/officeDocument/2006/relationships" xmlns:p="http://schemas.openxmlformats.org/presentationml/2006/main">
   <p:cSld>
     <p:spTree>
@@ -5784,7 +5717,7 @@
 </p:sld>
 </file>
 
-<file path=ppt/slides/slide15.xml><?xml version="1.0" encoding="utf-8"?>
+<file path=ppt/slides/slide13.xml><?xml version="1.0" encoding="utf-8"?>
 <p:sld xmlns:a="http://schemas.openxmlformats.org/drawingml/2006/main" xmlns:r="http://schemas.openxmlformats.org/officeDocument/2006/relationships" xmlns:p="http://schemas.openxmlformats.org/presentationml/2006/main">
   <p:cSld>
     <p:spTree>
@@ -6957,7 +6890,7 @@
 </p:sld>
 </file>
 
-<file path=ppt/slides/slide16.xml><?xml version="1.0" encoding="utf-8"?>
+<file path=ppt/slides/slide14.xml><?xml version="1.0" encoding="utf-8"?>
 <p:sld xmlns:a="http://schemas.openxmlformats.org/drawingml/2006/main" xmlns:r="http://schemas.openxmlformats.org/officeDocument/2006/relationships" xmlns:p="http://schemas.openxmlformats.org/presentationml/2006/main">
   <p:cSld>
     <p:spTree>
@@ -8001,6 +7934,284 @@
 </p:sld>
 </file>
 
+<file path=ppt/slides/slide15.xml><?xml version="1.0" encoding="utf-8"?>
+<p:sld xmlns:a="http://schemas.openxmlformats.org/drawingml/2006/main" xmlns:r="http://schemas.openxmlformats.org/officeDocument/2006/relationships" xmlns:p="http://schemas.openxmlformats.org/presentationml/2006/main">
+  <p:cSld>
+    <p:spTree>
+      <p:nvGrpSpPr>
+        <p:cNvPr id="1" name=""/>
+        <p:cNvGrpSpPr/>
+        <p:nvPr/>
+      </p:nvGrpSpPr>
+      <p:grpSpPr>
+        <a:xfrm>
+          <a:off x="0" y="0"/>
+          <a:ext cx="0" cy="0"/>
+          <a:chOff x="0" y="0"/>
+          <a:chExt cx="0" cy="0"/>
+        </a:xfrm>
+      </p:grpSpPr>
+      <p:pic>
+        <p:nvPicPr>
+          <p:cNvPr id="4" name="Рисунок 3"/>
+          <p:cNvPicPr>
+            <a:picLocks noChangeAspect="1"/>
+          </p:cNvPicPr>
+          <p:nvPr/>
+        </p:nvPicPr>
+        <p:blipFill>
+          <a:blip r:embed="rId2">
+            <a:extLst>
+              <a:ext uri="{28A0092B-C50C-407E-A947-70E740481C1C}">
+                <a14:useLocalDpi xmlns:a14="http://schemas.microsoft.com/office/drawing/2010/main" val="0"/>
+              </a:ext>
+            </a:extLst>
+          </a:blip>
+          <a:stretch>
+            <a:fillRect/>
+          </a:stretch>
+        </p:blipFill>
+        <p:spPr>
+          <a:xfrm>
+            <a:off x="2304300" y="850130"/>
+            <a:ext cx="7268326" cy="6007870"/>
+          </a:xfrm>
+          <a:prstGeom prst="rect">
+            <a:avLst/>
+          </a:prstGeom>
+        </p:spPr>
+      </p:pic>
+      <p:sp>
+        <p:nvSpPr>
+          <p:cNvPr id="6" name="Заголовок 1"/>
+          <p:cNvSpPr txBox="1">
+            <a:spLocks/>
+          </p:cNvSpPr>
+          <p:nvPr/>
+        </p:nvSpPr>
+        <p:spPr>
+          <a:xfrm>
+            <a:off x="0" y="203440"/>
+            <a:ext cx="12192000" cy="732126"/>
+          </a:xfrm>
+          <a:prstGeom prst="rect">
+            <a:avLst/>
+          </a:prstGeom>
+        </p:spPr>
+        <p:txBody>
+          <a:bodyPr vert="horz" lIns="91440" tIns="45720" rIns="91440" bIns="45720" rtlCol="0" anchor="ctr">
+            <a:noAutofit/>
+          </a:bodyPr>
+          <a:lstStyle>
+            <a:lvl1pPr algn="l" defTabSz="914400" rtl="0" eaLnBrk="1" latinLnBrk="0" hangingPunct="1">
+              <a:lnSpc>
+                <a:spcPct val="90000"/>
+              </a:lnSpc>
+              <a:spcBef>
+                <a:spcPct val="0"/>
+              </a:spcBef>
+              <a:buNone/>
+              <a:defRPr sz="4400" kern="1200">
+                <a:solidFill>
+                  <a:schemeClr val="tx1"/>
+                </a:solidFill>
+                <a:latin typeface="+mj-lt"/>
+                <a:ea typeface="+mj-ea"/>
+                <a:cs typeface="+mj-cs"/>
+              </a:defRPr>
+            </a:lvl1pPr>
+          </a:lstStyle>
+          <a:p>
+            <a:pPr algn="ctr"/>
+            <a:r>
+              <a:rPr lang="ru-RU" dirty="0" smtClean="0">
+                <a:solidFill>
+                  <a:schemeClr val="accent1">
+                    <a:lumMod val="50000"/>
+                  </a:schemeClr>
+                </a:solidFill>
+              </a:rPr>
+              <a:t>Сетка с восстановленной нумерацией (2</a:t>
+            </a:r>
+            <a:r>
+              <a:rPr lang="en-US" dirty="0" smtClean="0">
+                <a:solidFill>
+                  <a:schemeClr val="accent1">
+                    <a:lumMod val="50000"/>
+                  </a:schemeClr>
+                </a:solidFill>
+              </a:rPr>
+              <a:t>D)</a:t>
+            </a:r>
+            <a:endParaRPr lang="ru-RU" dirty="0">
+              <a:solidFill>
+                <a:schemeClr val="accent1">
+                  <a:lumMod val="50000"/>
+                </a:schemeClr>
+              </a:solidFill>
+            </a:endParaRPr>
+          </a:p>
+        </p:txBody>
+      </p:sp>
+    </p:spTree>
+    <p:extLst>
+      <p:ext uri="{BB962C8B-B14F-4D97-AF65-F5344CB8AC3E}">
+        <p14:creationId xmlns:p14="http://schemas.microsoft.com/office/powerpoint/2010/main" val="2860695980"/>
+      </p:ext>
+    </p:extLst>
+  </p:cSld>
+  <p:clrMapOvr>
+    <a:masterClrMapping/>
+  </p:clrMapOvr>
+  <p:timing>
+    <p:tnLst>
+      <p:par>
+        <p:cTn id="1" dur="indefinite" restart="never" nodeType="tmRoot"/>
+      </p:par>
+    </p:tnLst>
+  </p:timing>
+</p:sld>
+</file>
+
+<file path=ppt/slides/slide16.xml><?xml version="1.0" encoding="utf-8"?>
+<p:sld xmlns:a="http://schemas.openxmlformats.org/drawingml/2006/main" xmlns:r="http://schemas.openxmlformats.org/officeDocument/2006/relationships" xmlns:p="http://schemas.openxmlformats.org/presentationml/2006/main">
+  <p:cSld>
+    <p:spTree>
+      <p:nvGrpSpPr>
+        <p:cNvPr id="1" name=""/>
+        <p:cNvGrpSpPr/>
+        <p:nvPr/>
+      </p:nvGrpSpPr>
+      <p:grpSpPr>
+        <a:xfrm>
+          <a:off x="0" y="0"/>
+          <a:ext cx="0" cy="0"/>
+          <a:chOff x="0" y="0"/>
+          <a:chExt cx="0" cy="0"/>
+        </a:xfrm>
+      </p:grpSpPr>
+      <p:sp>
+        <p:nvSpPr>
+          <p:cNvPr id="6" name="Заголовок 1"/>
+          <p:cNvSpPr txBox="1">
+            <a:spLocks/>
+          </p:cNvSpPr>
+          <p:nvPr/>
+        </p:nvSpPr>
+        <p:spPr>
+          <a:xfrm>
+            <a:off x="0" y="203440"/>
+            <a:ext cx="12192000" cy="732126"/>
+          </a:xfrm>
+          <a:prstGeom prst="rect">
+            <a:avLst/>
+          </a:prstGeom>
+        </p:spPr>
+        <p:txBody>
+          <a:bodyPr vert="horz" lIns="91440" tIns="45720" rIns="91440" bIns="45720" rtlCol="0" anchor="ctr">
+            <a:noAutofit/>
+          </a:bodyPr>
+          <a:lstStyle>
+            <a:lvl1pPr algn="l" defTabSz="914400" rtl="0" eaLnBrk="1" latinLnBrk="0" hangingPunct="1">
+              <a:lnSpc>
+                <a:spcPct val="90000"/>
+              </a:lnSpc>
+              <a:spcBef>
+                <a:spcPct val="0"/>
+              </a:spcBef>
+              <a:buNone/>
+              <a:defRPr sz="4400" kern="1200">
+                <a:solidFill>
+                  <a:schemeClr val="tx1"/>
+                </a:solidFill>
+                <a:latin typeface="+mj-lt"/>
+                <a:ea typeface="+mj-ea"/>
+                <a:cs typeface="+mj-cs"/>
+              </a:defRPr>
+            </a:lvl1pPr>
+          </a:lstStyle>
+          <a:p>
+            <a:pPr algn="ctr"/>
+            <a:r>
+              <a:rPr lang="ru-RU" dirty="0" smtClean="0">
+                <a:solidFill>
+                  <a:schemeClr val="accent1">
+                    <a:lumMod val="50000"/>
+                  </a:schemeClr>
+                </a:solidFill>
+              </a:rPr>
+              <a:t>Сетка с восстановленной нумерацией (</a:t>
+            </a:r>
+            <a:r>
+              <a:rPr lang="en-US" dirty="0" smtClean="0">
+                <a:solidFill>
+                  <a:schemeClr val="accent1">
+                    <a:lumMod val="50000"/>
+                  </a:schemeClr>
+                </a:solidFill>
+              </a:rPr>
+              <a:t>3D)</a:t>
+            </a:r>
+            <a:endParaRPr lang="ru-RU" dirty="0">
+              <a:solidFill>
+                <a:schemeClr val="accent1">
+                  <a:lumMod val="50000"/>
+                </a:schemeClr>
+              </a:solidFill>
+            </a:endParaRPr>
+          </a:p>
+        </p:txBody>
+      </p:sp>
+      <p:pic>
+        <p:nvPicPr>
+          <p:cNvPr id="2" name="Рисунок 1"/>
+          <p:cNvPicPr>
+            <a:picLocks noChangeAspect="1"/>
+          </p:cNvPicPr>
+          <p:nvPr/>
+        </p:nvPicPr>
+        <p:blipFill rotWithShape="1">
+          <a:blip r:embed="rId2">
+            <a:biLevel thresh="75000"/>
+            <a:extLst>
+              <a:ext uri="{28A0092B-C50C-407E-A947-70E740481C1C}">
+                <a14:useLocalDpi xmlns:a14="http://schemas.microsoft.com/office/drawing/2010/main" val="0"/>
+              </a:ext>
+            </a:extLst>
+          </a:blip>
+          <a:srcRect t="1090"/>
+          <a:stretch/>
+        </p:blipFill>
+        <p:spPr>
+          <a:xfrm>
+            <a:off x="3232913" y="1000124"/>
+            <a:ext cx="5001799" cy="5857875"/>
+          </a:xfrm>
+          <a:prstGeom prst="rect">
+            <a:avLst/>
+          </a:prstGeom>
+        </p:spPr>
+      </p:pic>
+    </p:spTree>
+    <p:extLst>
+      <p:ext uri="{BB962C8B-B14F-4D97-AF65-F5344CB8AC3E}">
+        <p14:creationId xmlns:p14="http://schemas.microsoft.com/office/powerpoint/2010/main" val="3230243968"/>
+      </p:ext>
+    </p:extLst>
+  </p:cSld>
+  <p:clrMapOvr>
+    <a:masterClrMapping/>
+  </p:clrMapOvr>
+  <p:timing>
+    <p:tnLst>
+      <p:par>
+        <p:cTn id="1" dur="indefinite" restart="never" nodeType="tmRoot"/>
+      </p:par>
+    </p:tnLst>
+  </p:timing>
+</p:sld>
+</file>
+
 <file path=ppt/slides/slide17.xml><?xml version="1.0" encoding="utf-8"?>
 <p:sld xmlns:a="http://schemas.openxmlformats.org/drawingml/2006/main" xmlns:r="http://schemas.openxmlformats.org/officeDocument/2006/relationships" xmlns:p="http://schemas.openxmlformats.org/presentationml/2006/main">
   <p:cSld>
@@ -8263,15 +8474,7 @@
                 <a:ea typeface="Calibri" panose="020F0502020204030204" pitchFamily="34" charset="0"/>
                 <a:cs typeface="Times New Roman" panose="02020603050405020304" pitchFamily="18" charset="0"/>
               </a:rPr>
-              <a:t>Проверяем, что д</a:t>
-            </a:r>
-            <a:r>
-              <a:rPr lang="ru-RU" sz="2800" dirty="0" smtClean="0">
-                <a:latin typeface="Calibri" panose="020F0502020204030204" pitchFamily="34" charset="0"/>
-                <a:ea typeface="Calibri" panose="020F0502020204030204" pitchFamily="34" charset="0"/>
-                <a:cs typeface="Times New Roman" panose="02020603050405020304" pitchFamily="18" charset="0"/>
-              </a:rPr>
-              <a:t>ве вершины графа имеют степень 1, а все остальные – 2</a:t>
+              <a:t>Проверяем, что две вершины графа имеют степень 1, а все остальные – 2</a:t>
             </a:r>
           </a:p>
           <a:p>
@@ -20843,39 +21046,9 @@
           <a:chExt cx="0" cy="0"/>
         </a:xfrm>
       </p:grpSpPr>
-      <p:pic>
-        <p:nvPicPr>
-          <p:cNvPr id="4" name="Рисунок 3"/>
-          <p:cNvPicPr>
-            <a:picLocks noChangeAspect="1"/>
-          </p:cNvPicPr>
-          <p:nvPr/>
-        </p:nvPicPr>
-        <p:blipFill>
-          <a:blip r:embed="rId2">
-            <a:extLst>
-              <a:ext uri="{28A0092B-C50C-407E-A947-70E740481C1C}">
-                <a14:useLocalDpi xmlns:a14="http://schemas.microsoft.com/office/drawing/2010/main" val="0"/>
-              </a:ext>
-            </a:extLst>
-          </a:blip>
-          <a:stretch>
-            <a:fillRect/>
-          </a:stretch>
-        </p:blipFill>
-        <p:spPr>
-          <a:xfrm>
-            <a:off x="2304300" y="850130"/>
-            <a:ext cx="7268326" cy="6007870"/>
-          </a:xfrm>
-          <a:prstGeom prst="rect">
-            <a:avLst/>
-          </a:prstGeom>
-        </p:spPr>
-      </p:pic>
       <p:sp>
         <p:nvSpPr>
-          <p:cNvPr id="6" name="Заголовок 1"/>
+          <p:cNvPr id="5" name="Заголовок 1"/>
           <p:cNvSpPr txBox="1">
             <a:spLocks/>
           </p:cNvSpPr>
@@ -20883,8 +21056,8 @@
         </p:nvSpPr>
         <p:spPr>
           <a:xfrm>
-            <a:off x="0" y="203440"/>
-            <a:ext cx="12192000" cy="732126"/>
+            <a:off x="2563091" y="2313708"/>
+            <a:ext cx="6456219" cy="1704543"/>
           </a:xfrm>
           <a:prstGeom prst="rect">
             <a:avLst/>
@@ -20916,26 +21089,16 @@
           <a:p>
             <a:pPr algn="ctr"/>
             <a:r>
-              <a:rPr lang="ru-RU" dirty="0" smtClean="0">
+              <a:rPr lang="ru-RU" sz="7200" dirty="0" smtClean="0">
                 <a:solidFill>
                   <a:schemeClr val="accent1">
                     <a:lumMod val="50000"/>
                   </a:schemeClr>
                 </a:solidFill>
               </a:rPr>
-              <a:t>Сетка с восстановленной нумерацией (2</a:t>
-            </a:r>
-            <a:r>
-              <a:rPr lang="en-US" dirty="0" smtClean="0">
-                <a:solidFill>
-                  <a:schemeClr val="accent1">
-                    <a:lumMod val="50000"/>
-                  </a:schemeClr>
-                </a:solidFill>
-              </a:rPr>
-              <a:t>D)</a:t>
-            </a:r>
-            <a:endParaRPr lang="ru-RU" dirty="0">
+              <a:t>Постановка задачи</a:t>
+            </a:r>
+            <a:endParaRPr lang="ru-RU" sz="7200" dirty="0">
               <a:solidFill>
                 <a:schemeClr val="accent1">
                   <a:lumMod val="50000"/>
@@ -20948,13 +21111,25 @@
     </p:spTree>
     <p:extLst>
       <p:ext uri="{BB962C8B-B14F-4D97-AF65-F5344CB8AC3E}">
-        <p14:creationId xmlns:p14="http://schemas.microsoft.com/office/powerpoint/2010/main" val="2860695980"/>
+        <p14:creationId xmlns:p14="http://schemas.microsoft.com/office/powerpoint/2010/main" val="4024909480"/>
       </p:ext>
     </p:extLst>
   </p:cSld>
   <p:clrMapOvr>
     <a:masterClrMapping/>
   </p:clrMapOvr>
+  <mc:AlternateContent xmlns:mc="http://schemas.openxmlformats.org/markup-compatibility/2006" xmlns:p14="http://schemas.microsoft.com/office/powerpoint/2010/main">
+    <mc:Choice Requires="p14">
+      <p:transition spd="med" p14:dur="700">
+        <p:fade/>
+      </p:transition>
+    </mc:Choice>
+    <mc:Fallback xmlns="">
+      <p:transition spd="med">
+        <p:fade/>
+      </p:transition>
+    </mc:Fallback>
+  </mc:AlternateContent>
   <p:timing>
     <p:tnLst>
       <p:par>

</xml_diff>

<commit_message>
Refactor algotithm slides. Added ideas at the top
</commit_message>
<xml_diff>
--- a/docs/Презентация v0.8.1.pptx
+++ b/docs/Презентация v0.8.1.pptx
@@ -5,7 +5,7 @@
     <p:sldMasterId id="2147483648" r:id="rId1"/>
   </p:sldMasterIdLst>
   <p:notesMasterIdLst>
-    <p:notesMasterId r:id="rId45"/>
+    <p:notesMasterId r:id="rId46"/>
   </p:notesMasterIdLst>
   <p:sldIdLst>
     <p:sldId id="256" r:id="rId2"/>
@@ -38,19 +38,20 @@
     <p:sldId id="357" r:id="rId29"/>
     <p:sldId id="358" r:id="rId30"/>
     <p:sldId id="359" r:id="rId31"/>
-    <p:sldId id="349" r:id="rId32"/>
-    <p:sldId id="350" r:id="rId33"/>
-    <p:sldId id="351" r:id="rId34"/>
-    <p:sldId id="352" r:id="rId35"/>
-    <p:sldId id="353" r:id="rId36"/>
-    <p:sldId id="354" r:id="rId37"/>
-    <p:sldId id="338" r:id="rId38"/>
-    <p:sldId id="339" r:id="rId39"/>
-    <p:sldId id="347" r:id="rId40"/>
-    <p:sldId id="348" r:id="rId41"/>
-    <p:sldId id="344" r:id="rId42"/>
-    <p:sldId id="345" r:id="rId43"/>
-    <p:sldId id="346" r:id="rId44"/>
+    <p:sldId id="360" r:id="rId32"/>
+    <p:sldId id="349" r:id="rId33"/>
+    <p:sldId id="350" r:id="rId34"/>
+    <p:sldId id="351" r:id="rId35"/>
+    <p:sldId id="352" r:id="rId36"/>
+    <p:sldId id="353" r:id="rId37"/>
+    <p:sldId id="354" r:id="rId38"/>
+    <p:sldId id="338" r:id="rId39"/>
+    <p:sldId id="339" r:id="rId40"/>
+    <p:sldId id="347" r:id="rId41"/>
+    <p:sldId id="348" r:id="rId42"/>
+    <p:sldId id="344" r:id="rId43"/>
+    <p:sldId id="345" r:id="rId44"/>
+    <p:sldId id="346" r:id="rId45"/>
   </p:sldIdLst>
   <p:sldSz cx="12192000" cy="6858000"/>
   <p:notesSz cx="6858000" cy="9144000"/>
@@ -251,7 +252,7 @@
           <a:p>
             <a:fld id="{2F7BDC20-999D-4259-B6C3-F40ECC5C4406}" type="datetimeFigureOut">
               <a:rPr lang="ru-RU" smtClean="0"/>
-              <a:t>13.12.2017</a:t>
+              <a:t>14.12.2017</a:t>
             </a:fld>
             <a:endParaRPr lang="ru-RU"/>
           </a:p>
@@ -672,7 +673,7 @@
           <a:p>
             <a:fld id="{9C466FCC-2ADF-469F-864C-91669074506B}" type="slidenum">
               <a:rPr lang="ru-RU" smtClean="0"/>
-              <a:t>37</a:t>
+              <a:t>38</a:t>
             </a:fld>
             <a:endParaRPr lang="ru-RU"/>
           </a:p>
@@ -756,7 +757,7 @@
           <a:p>
             <a:fld id="{9C466FCC-2ADF-469F-864C-91669074506B}" type="slidenum">
               <a:rPr lang="ru-RU" smtClean="0"/>
-              <a:t>38</a:t>
+              <a:t>39</a:t>
             </a:fld>
             <a:endParaRPr lang="ru-RU"/>
           </a:p>
@@ -848,7 +849,7 @@
           <a:p>
             <a:fld id="{9C466FCC-2ADF-469F-864C-91669074506B}" type="slidenum">
               <a:rPr lang="ru-RU" smtClean="0"/>
-              <a:t>42</a:t>
+              <a:t>43</a:t>
             </a:fld>
             <a:endParaRPr lang="ru-RU"/>
           </a:p>
@@ -1706,7 +1707,7 @@
           <a:p>
             <a:fld id="{8F045AFB-DE82-40CD-9223-121836DEA27A}" type="datetimeFigureOut">
               <a:rPr lang="ru-RU" smtClean="0"/>
-              <a:t>13.12.2017</a:t>
+              <a:t>14.12.2017</a:t>
             </a:fld>
             <a:endParaRPr lang="ru-RU"/>
           </a:p>
@@ -1876,7 +1877,7 @@
           <a:p>
             <a:fld id="{8F045AFB-DE82-40CD-9223-121836DEA27A}" type="datetimeFigureOut">
               <a:rPr lang="ru-RU" smtClean="0"/>
-              <a:t>13.12.2017</a:t>
+              <a:t>14.12.2017</a:t>
             </a:fld>
             <a:endParaRPr lang="ru-RU"/>
           </a:p>
@@ -2056,7 +2057,7 @@
           <a:p>
             <a:fld id="{8F045AFB-DE82-40CD-9223-121836DEA27A}" type="datetimeFigureOut">
               <a:rPr lang="ru-RU" smtClean="0"/>
-              <a:t>13.12.2017</a:t>
+              <a:t>14.12.2017</a:t>
             </a:fld>
             <a:endParaRPr lang="ru-RU"/>
           </a:p>
@@ -2226,7 +2227,7 @@
           <a:p>
             <a:fld id="{8F045AFB-DE82-40CD-9223-121836DEA27A}" type="datetimeFigureOut">
               <a:rPr lang="ru-RU" smtClean="0"/>
-              <a:t>13.12.2017</a:t>
+              <a:t>14.12.2017</a:t>
             </a:fld>
             <a:endParaRPr lang="ru-RU"/>
           </a:p>
@@ -2472,7 +2473,7 @@
           <a:p>
             <a:fld id="{8F045AFB-DE82-40CD-9223-121836DEA27A}" type="datetimeFigureOut">
               <a:rPr lang="ru-RU" smtClean="0"/>
-              <a:t>13.12.2017</a:t>
+              <a:t>14.12.2017</a:t>
             </a:fld>
             <a:endParaRPr lang="ru-RU"/>
           </a:p>
@@ -2704,7 +2705,7 @@
           <a:p>
             <a:fld id="{8F045AFB-DE82-40CD-9223-121836DEA27A}" type="datetimeFigureOut">
               <a:rPr lang="ru-RU" smtClean="0"/>
-              <a:t>13.12.2017</a:t>
+              <a:t>14.12.2017</a:t>
             </a:fld>
             <a:endParaRPr lang="ru-RU"/>
           </a:p>
@@ -3071,7 +3072,7 @@
           <a:p>
             <a:fld id="{8F045AFB-DE82-40CD-9223-121836DEA27A}" type="datetimeFigureOut">
               <a:rPr lang="ru-RU" smtClean="0"/>
-              <a:t>13.12.2017</a:t>
+              <a:t>14.12.2017</a:t>
             </a:fld>
             <a:endParaRPr lang="ru-RU"/>
           </a:p>
@@ -3189,7 +3190,7 @@
           <a:p>
             <a:fld id="{8F045AFB-DE82-40CD-9223-121836DEA27A}" type="datetimeFigureOut">
               <a:rPr lang="ru-RU" smtClean="0"/>
-              <a:t>13.12.2017</a:t>
+              <a:t>14.12.2017</a:t>
             </a:fld>
             <a:endParaRPr lang="ru-RU"/>
           </a:p>
@@ -3284,7 +3285,7 @@
           <a:p>
             <a:fld id="{8F045AFB-DE82-40CD-9223-121836DEA27A}" type="datetimeFigureOut">
               <a:rPr lang="ru-RU" smtClean="0"/>
-              <a:t>13.12.2017</a:t>
+              <a:t>14.12.2017</a:t>
             </a:fld>
             <a:endParaRPr lang="ru-RU"/>
           </a:p>
@@ -3561,7 +3562,7 @@
           <a:p>
             <a:fld id="{8F045AFB-DE82-40CD-9223-121836DEA27A}" type="datetimeFigureOut">
               <a:rPr lang="ru-RU" smtClean="0"/>
-              <a:t>13.12.2017</a:t>
+              <a:t>14.12.2017</a:t>
             </a:fld>
             <a:endParaRPr lang="ru-RU"/>
           </a:p>
@@ -3814,7 +3815,7 @@
           <a:p>
             <a:fld id="{8F045AFB-DE82-40CD-9223-121836DEA27A}" type="datetimeFigureOut">
               <a:rPr lang="ru-RU" smtClean="0"/>
-              <a:t>13.12.2017</a:t>
+              <a:t>14.12.2017</a:t>
             </a:fld>
             <a:endParaRPr lang="ru-RU"/>
           </a:p>
@@ -4027,7 +4028,7 @@
           <a:p>
             <a:fld id="{8F045AFB-DE82-40CD-9223-121836DEA27A}" type="datetimeFigureOut">
               <a:rPr lang="ru-RU" smtClean="0"/>
-              <a:t>13.12.2017</a:t>
+              <a:t>14.12.2017</a:t>
             </a:fld>
             <a:endParaRPr lang="ru-RU"/>
           </a:p>
@@ -4561,16 +4562,6 @@
               </a:rPr>
               <a:t>данные</a:t>
             </a:r>
-            <a:endParaRPr lang="ru-RU" sz="4400" dirty="0">
-              <a:solidFill>
-                <a:schemeClr val="accent1">
-                  <a:lumMod val="50000"/>
-                </a:schemeClr>
-              </a:solidFill>
-              <a:latin typeface="+mj-lt"/>
-              <a:ea typeface="+mj-ea"/>
-              <a:cs typeface="+mj-cs"/>
-            </a:endParaRPr>
           </a:p>
         </p:txBody>
       </p:sp>
@@ -4684,15 +4675,11 @@
             </a:pPr>
             <a:r>
               <a:rPr lang="ru-RU" sz="2800" dirty="0" smtClean="0"/>
-              <a:t>Координаты</a:t>
-            </a:r>
-            <a:r>
-              <a:rPr lang="ru-RU" sz="2800" dirty="0"/>
-              <a:t> на регулярной </a:t>
+              <a:t>Индексы регулярной сетки </a:t>
             </a:r>
             <a:r>
               <a:rPr lang="ru-RU" sz="2800" dirty="0" smtClean="0"/>
-              <a:t>сетке определенной размерности</a:t>
+              <a:t>определенной размерности</a:t>
             </a:r>
           </a:p>
           <a:p>
@@ -4721,8 +4708,8 @@
           </a:p>
           <a:p>
             <a:r>
-              <a:rPr lang="ru-RU" sz="2800" dirty="0" smtClean="0"/>
-              <a:t>координаты</a:t>
+              <a:rPr lang="ru-RU" sz="2800" smtClean="0"/>
+              <a:t>индексы</a:t>
             </a:r>
             <a:endParaRPr lang="ru-RU" sz="2800" dirty="0"/>
           </a:p>
@@ -8362,7 +8349,7 @@
         </p:blipFill>
         <p:spPr>
           <a:xfrm>
-            <a:off x="748823" y="3916680"/>
+            <a:off x="748822" y="3931422"/>
             <a:ext cx="10599253" cy="1233942"/>
           </a:xfrm>
           <a:prstGeom prst="rect">
@@ -8381,7 +8368,7 @@
         </p:nvSpPr>
         <p:spPr>
           <a:xfrm>
-            <a:off x="276225" y="1066626"/>
+            <a:off x="793029" y="1328786"/>
             <a:ext cx="10510838" cy="2602636"/>
           </a:xfrm>
           <a:prstGeom prst="rect">
@@ -8519,7 +8506,7 @@
               <a:t>Вершине со степенью 1 присваиваем номер </a:t>
             </a:r>
             <a:r>
-              <a:rPr lang="en-US" sz="2800" smtClean="0">
+              <a:rPr lang="en-US" sz="2800" dirty="0" smtClean="0">
                 <a:latin typeface="Calibri" panose="020F0502020204030204" pitchFamily="34" charset="0"/>
                 <a:ea typeface="Calibri" panose="020F0502020204030204" pitchFamily="34" charset="0"/>
                 <a:cs typeface="Times New Roman" panose="02020603050405020304" pitchFamily="18" charset="0"/>
@@ -8527,20 +8514,12 @@
               <a:t>1</a:t>
             </a:r>
             <a:r>
-              <a:rPr lang="ru-RU" sz="2800" smtClean="0">
-                <a:latin typeface="Calibri" panose="020F0502020204030204" pitchFamily="34" charset="0"/>
-                <a:ea typeface="Calibri" panose="020F0502020204030204" pitchFamily="34" charset="0"/>
-                <a:cs typeface="Times New Roman" panose="02020603050405020304" pitchFamily="18" charset="0"/>
-              </a:rPr>
-              <a:t> </a:t>
-            </a:r>
-            <a:r>
               <a:rPr lang="ru-RU" sz="2800" dirty="0" smtClean="0">
                 <a:latin typeface="Calibri" panose="020F0502020204030204" pitchFamily="34" charset="0"/>
                 <a:ea typeface="Calibri" panose="020F0502020204030204" pitchFamily="34" charset="0"/>
                 <a:cs typeface="Times New Roman" panose="02020603050405020304" pitchFamily="18" charset="0"/>
               </a:rPr>
-              <a:t>и последовательно нумеруем соседей</a:t>
+              <a:t> и последовательно нумеруем соседей</a:t>
             </a:r>
             <a:endParaRPr lang="ru-RU" sz="2800" dirty="0">
               <a:latin typeface="Calibri" panose="020F0502020204030204" pitchFamily="34" charset="0"/>
@@ -8572,14 +8551,62 @@
         </p:blipFill>
         <p:spPr>
           <a:xfrm>
-            <a:off x="666623" y="5150622"/>
-            <a:ext cx="10839578" cy="1494018"/>
+            <a:off x="628660" y="5165364"/>
+            <a:ext cx="10839577" cy="1494018"/>
           </a:xfrm>
           <a:prstGeom prst="rect">
             <a:avLst/>
           </a:prstGeom>
         </p:spPr>
       </p:pic>
+      <p:sp>
+        <p:nvSpPr>
+          <p:cNvPr id="4" name="TextBox 3"/>
+          <p:cNvSpPr txBox="1"/>
+          <p:nvPr/>
+        </p:nvSpPr>
+        <p:spPr>
+          <a:xfrm>
+            <a:off x="2494274" y="543406"/>
+            <a:ext cx="6074740" cy="523220"/>
+          </a:xfrm>
+          <a:prstGeom prst="rect">
+            <a:avLst/>
+          </a:prstGeom>
+          <a:noFill/>
+        </p:spPr>
+        <p:txBody>
+          <a:bodyPr wrap="none" rtlCol="0">
+            <a:spAutoFit/>
+          </a:bodyPr>
+          <a:lstStyle/>
+          <a:p>
+            <a:r>
+              <a:rPr lang="ru-RU" sz="2800" dirty="0">
+                <a:solidFill>
+                  <a:schemeClr val="accent1">
+                    <a:lumMod val="50000"/>
+                  </a:schemeClr>
+                </a:solidFill>
+                <a:latin typeface="Calibri" panose="020F0502020204030204" pitchFamily="34" charset="0"/>
+                <a:ea typeface="Calibri" panose="020F0502020204030204" pitchFamily="34" charset="0"/>
+                <a:cs typeface="Times New Roman" panose="02020603050405020304" pitchFamily="18" charset="0"/>
+              </a:rPr>
+              <a:t>Идея: Проверить, что граф - линейный</a:t>
+            </a:r>
+            <a:endParaRPr lang="ru-RU" sz="2800" dirty="0">
+              <a:solidFill>
+                <a:schemeClr val="accent1">
+                  <a:lumMod val="50000"/>
+                </a:schemeClr>
+              </a:solidFill>
+              <a:latin typeface="Calibri" panose="020F0502020204030204" pitchFamily="34" charset="0"/>
+              <a:ea typeface="Calibri" panose="020F0502020204030204" pitchFamily="34" charset="0"/>
+              <a:cs typeface="Times New Roman" panose="02020603050405020304" pitchFamily="18" charset="0"/>
+            </a:endParaRPr>
+          </a:p>
+        </p:txBody>
+      </p:sp>
     </p:spTree>
     <p:extLst>
       <p:ext uri="{BB962C8B-B14F-4D97-AF65-F5344CB8AC3E}">
@@ -8908,8 +8935,8 @@
         </p:nvSpPr>
         <p:spPr>
           <a:xfrm>
-            <a:off x="276225" y="1066626"/>
-            <a:ext cx="5067300" cy="3985706"/>
+            <a:off x="516513" y="1839887"/>
+            <a:ext cx="5067300" cy="2379498"/>
           </a:xfrm>
           <a:prstGeom prst="rect">
             <a:avLst/>
@@ -8930,87 +8957,6 @@
               </a:spcAft>
             </a:pPr>
             <a:r>
-              <a:rPr lang="ru-RU" sz="2800" dirty="0">
-                <a:latin typeface="Calibri" panose="020F0502020204030204" pitchFamily="34" charset="0"/>
-                <a:ea typeface="Calibri" panose="020F0502020204030204" pitchFamily="34" charset="0"/>
-                <a:cs typeface="Times New Roman" panose="02020603050405020304" pitchFamily="18" charset="0"/>
-              </a:rPr>
-              <a:t>Дан неориентированный помеченный граф </a:t>
-            </a:r>
-            <a:r>
-              <a:rPr lang="en-US" sz="2800" dirty="0">
-                <a:latin typeface="Calibri" panose="020F0502020204030204" pitchFamily="34" charset="0"/>
-                <a:ea typeface="Calibri" panose="020F0502020204030204" pitchFamily="34" charset="0"/>
-                <a:cs typeface="Times New Roman" panose="02020603050405020304" pitchFamily="18" charset="0"/>
-              </a:rPr>
-              <a:t>G</a:t>
-            </a:r>
-            <a:r>
-              <a:rPr lang="ru-RU" sz="2800" dirty="0">
-                <a:latin typeface="Calibri" panose="020F0502020204030204" pitchFamily="34" charset="0"/>
-                <a:ea typeface="Calibri" panose="020F0502020204030204" pitchFamily="34" charset="0"/>
-                <a:cs typeface="Times New Roman" panose="02020603050405020304" pitchFamily="18" charset="0"/>
-              </a:rPr>
-              <a:t>=(</a:t>
-            </a:r>
-            <a:r>
-              <a:rPr lang="en-US" sz="2800" dirty="0">
-                <a:latin typeface="Calibri" panose="020F0502020204030204" pitchFamily="34" charset="0"/>
-                <a:ea typeface="Calibri" panose="020F0502020204030204" pitchFamily="34" charset="0"/>
-                <a:cs typeface="Times New Roman" panose="02020603050405020304" pitchFamily="18" charset="0"/>
-              </a:rPr>
-              <a:t>V</a:t>
-            </a:r>
-            <a:r>
-              <a:rPr lang="ru-RU" sz="2800" dirty="0">
-                <a:latin typeface="Calibri" panose="020F0502020204030204" pitchFamily="34" charset="0"/>
-                <a:ea typeface="Calibri" panose="020F0502020204030204" pitchFamily="34" charset="0"/>
-                <a:cs typeface="Times New Roman" panose="02020603050405020304" pitchFamily="18" charset="0"/>
-              </a:rPr>
-              <a:t>,</a:t>
-            </a:r>
-            <a:r>
-              <a:rPr lang="en-US" sz="2800" dirty="0">
-                <a:latin typeface="Calibri" panose="020F0502020204030204" pitchFamily="34" charset="0"/>
-                <a:ea typeface="Calibri" panose="020F0502020204030204" pitchFamily="34" charset="0"/>
-                <a:cs typeface="Times New Roman" panose="02020603050405020304" pitchFamily="18" charset="0"/>
-              </a:rPr>
-              <a:t>E</a:t>
-            </a:r>
-            <a:r>
-              <a:rPr lang="ru-RU" sz="2800" dirty="0">
-                <a:latin typeface="Calibri" panose="020F0502020204030204" pitchFamily="34" charset="0"/>
-                <a:ea typeface="Calibri" panose="020F0502020204030204" pitchFamily="34" charset="0"/>
-                <a:cs typeface="Times New Roman" panose="02020603050405020304" pitchFamily="18" charset="0"/>
-              </a:rPr>
-              <a:t>).</a:t>
-            </a:r>
-          </a:p>
-          <a:p>
-            <a:pPr>
-              <a:lnSpc>
-                <a:spcPct val="107000"/>
-              </a:lnSpc>
-              <a:spcAft>
-                <a:spcPts val="800"/>
-              </a:spcAft>
-            </a:pPr>
-            <a:endParaRPr lang="ru-RU" sz="2800" dirty="0">
-              <a:latin typeface="Calibri" panose="020F0502020204030204" pitchFamily="34" charset="0"/>
-              <a:ea typeface="Calibri" panose="020F0502020204030204" pitchFamily="34" charset="0"/>
-              <a:cs typeface="Times New Roman" panose="02020603050405020304" pitchFamily="18" charset="0"/>
-            </a:endParaRPr>
-          </a:p>
-          <a:p>
-            <a:pPr>
-              <a:lnSpc>
-                <a:spcPct val="107000"/>
-              </a:lnSpc>
-              <a:spcAft>
-                <a:spcPts val="800"/>
-              </a:spcAft>
-            </a:pPr>
-            <a:r>
               <a:rPr lang="ru-RU" sz="2800" dirty="0" smtClean="0">
                 <a:solidFill>
                   <a:schemeClr val="accent1">
@@ -9021,60 +8967,143 @@
                 <a:ea typeface="Calibri" panose="020F0502020204030204" pitchFamily="34" charset="0"/>
                 <a:cs typeface="Times New Roman" panose="02020603050405020304" pitchFamily="18" charset="0"/>
               </a:rPr>
-              <a:t>Шаг 1.</a:t>
-            </a:r>
-            <a:r>
-              <a:rPr lang="ru-RU" sz="2800" dirty="0" smtClean="0">
+              <a:t>Шаг 1</a:t>
+            </a:r>
+            <a:endParaRPr lang="ru-RU" sz="2800" dirty="0" smtClean="0">
+              <a:latin typeface="Calibri" panose="020F0502020204030204" pitchFamily="34" charset="0"/>
+              <a:ea typeface="Calibri" panose="020F0502020204030204" pitchFamily="34" charset="0"/>
+              <a:cs typeface="Times New Roman" panose="02020603050405020304" pitchFamily="18" charset="0"/>
+            </a:endParaRPr>
+          </a:p>
+          <a:p>
+            <a:pPr marL="457200" indent="-457200">
+              <a:spcAft>
+                <a:spcPts val="800"/>
+              </a:spcAft>
+              <a:buFont typeface="Arial" panose="020B0604020202020204" pitchFamily="34" charset="0"/>
+              <a:buChar char="•"/>
+            </a:pPr>
+            <a:r>
+              <a:rPr lang="ru-RU" sz="2800" dirty="0" smtClean="0"/>
+              <a:t>Находим </a:t>
+            </a:r>
+            <a:r>
+              <a:rPr lang="ru-RU" sz="2800" dirty="0"/>
+              <a:t>вершину </a:t>
+            </a:r>
+            <a:r>
+              <a:rPr lang="ru-RU" sz="2800" dirty="0" smtClean="0"/>
+              <a:t>старшей степени </a:t>
+            </a:r>
+            <a:r>
+              <a:rPr lang="en-US" sz="2800" dirty="0" smtClean="0"/>
+              <a:t>(</a:t>
+            </a:r>
+            <a:r>
+              <a:rPr lang="ru-RU" sz="2800" dirty="0" smtClean="0"/>
+              <a:t>максимальная </a:t>
+            </a:r>
+            <a:r>
+              <a:rPr lang="ru-RU" sz="2800" dirty="0"/>
+              <a:t>степень </a:t>
+            </a:r>
+            <a:r>
+              <a:rPr lang="ru-RU" sz="2800" dirty="0" smtClean="0"/>
+              <a:t>– 4</a:t>
+            </a:r>
+            <a:r>
+              <a:rPr lang="en-US" sz="2800" dirty="0" smtClean="0"/>
+              <a:t>)</a:t>
+            </a:r>
+            <a:r>
+              <a:rPr lang="ru-RU" sz="2800" dirty="0" smtClean="0"/>
+              <a:t>, </a:t>
+            </a:r>
+            <a:r>
+              <a:rPr lang="ru-RU" sz="2800" dirty="0"/>
+              <a:t>нумеруем нулевыми значениями</a:t>
+            </a:r>
+            <a:r>
+              <a:rPr lang="ru-RU" sz="2800" dirty="0" smtClean="0"/>
+              <a:t>.</a:t>
+            </a:r>
+            <a:endParaRPr lang="ru-RU" sz="2800" dirty="0">
+              <a:latin typeface="Calibri" panose="020F0502020204030204" pitchFamily="34" charset="0"/>
+              <a:ea typeface="Calibri" panose="020F0502020204030204" pitchFamily="34" charset="0"/>
+              <a:cs typeface="Times New Roman" panose="02020603050405020304" pitchFamily="18" charset="0"/>
+            </a:endParaRPr>
+          </a:p>
+        </p:txBody>
+      </p:sp>
+      <p:sp>
+        <p:nvSpPr>
+          <p:cNvPr id="6" name="TextBox 5"/>
+          <p:cNvSpPr txBox="1"/>
+          <p:nvPr/>
+        </p:nvSpPr>
+        <p:spPr>
+          <a:xfrm>
+            <a:off x="517554" y="622980"/>
+            <a:ext cx="5066259" cy="954107"/>
+          </a:xfrm>
+          <a:prstGeom prst="rect">
+            <a:avLst/>
+          </a:prstGeom>
+          <a:noFill/>
+        </p:spPr>
+        <p:txBody>
+          <a:bodyPr wrap="none" rtlCol="0">
+            <a:spAutoFit/>
+          </a:bodyPr>
+          <a:lstStyle/>
+          <a:p>
+            <a:r>
+              <a:rPr lang="ru-RU" sz="2800" dirty="0">
+                <a:solidFill>
+                  <a:schemeClr val="accent1">
+                    <a:lumMod val="50000"/>
+                  </a:schemeClr>
+                </a:solidFill>
                 <a:latin typeface="Calibri" panose="020F0502020204030204" pitchFamily="34" charset="0"/>
                 <a:ea typeface="Calibri" panose="020F0502020204030204" pitchFamily="34" charset="0"/>
                 <a:cs typeface="Times New Roman" panose="02020603050405020304" pitchFamily="18" charset="0"/>
               </a:rPr>
-              <a:t/>
-            </a:r>
-            <a:br>
+              <a:t>Идея: </a:t>
+            </a:r>
+            <a:r>
               <a:rPr lang="ru-RU" sz="2800" dirty="0" smtClean="0">
+                <a:solidFill>
+                  <a:schemeClr val="accent1">
+                    <a:lumMod val="50000"/>
+                  </a:schemeClr>
+                </a:solidFill>
                 <a:latin typeface="Calibri" panose="020F0502020204030204" pitchFamily="34" charset="0"/>
                 <a:ea typeface="Calibri" panose="020F0502020204030204" pitchFamily="34" charset="0"/>
                 <a:cs typeface="Times New Roman" panose="02020603050405020304" pitchFamily="18" charset="0"/>
               </a:rPr>
-            </a:br>
-            <a:r>
-              <a:rPr lang="ru-RU" sz="2800" dirty="0"/>
-              <a:t>Находим вершину старшей </a:t>
-            </a:r>
-            <a:r>
-              <a:rPr lang="ru-RU" sz="2800" dirty="0" smtClean="0"/>
-              <a:t>степени</a:t>
-            </a:r>
-            <a:r>
-              <a:rPr lang="en-US" sz="2800" dirty="0" smtClean="0"/>
-              <a:t>(</a:t>
-            </a:r>
-            <a:r>
-              <a:rPr lang="ru-RU" sz="2800" dirty="0" smtClean="0"/>
-              <a:t>максимальная </a:t>
-            </a:r>
-            <a:r>
-              <a:rPr lang="ru-RU" sz="2800" dirty="0"/>
-              <a:t>степень </a:t>
-            </a:r>
-            <a:r>
-              <a:rPr lang="ru-RU" sz="2800" dirty="0" smtClean="0"/>
-              <a:t>– 4</a:t>
-            </a:r>
-            <a:r>
-              <a:rPr lang="en-US" sz="2800" dirty="0" smtClean="0"/>
-              <a:t>)</a:t>
-            </a:r>
-            <a:r>
-              <a:rPr lang="ru-RU" sz="2800" dirty="0" smtClean="0"/>
-              <a:t>, </a:t>
-            </a:r>
-            <a:r>
-              <a:rPr lang="ru-RU" sz="2800" dirty="0"/>
-              <a:t>нумеруем нулевыми значениями. </a:t>
+              <a:t>Выделяем опорную точку</a:t>
+            </a:r>
+          </a:p>
+          <a:p>
+            <a:r>
+              <a:rPr lang="ru-RU" sz="2800" dirty="0" smtClean="0">
+                <a:solidFill>
+                  <a:schemeClr val="accent1">
+                    <a:lumMod val="50000"/>
+                  </a:schemeClr>
+                </a:solidFill>
+                <a:latin typeface="Calibri" panose="020F0502020204030204" pitchFamily="34" charset="0"/>
+                <a:ea typeface="Calibri" panose="020F0502020204030204" pitchFamily="34" charset="0"/>
+                <a:cs typeface="Times New Roman" panose="02020603050405020304" pitchFamily="18" charset="0"/>
+              </a:rPr>
+              <a:t>через эвристики</a:t>
             </a:r>
             <a:endParaRPr lang="ru-RU" sz="2800" dirty="0">
+              <a:solidFill>
+                <a:schemeClr val="accent1">
+                  <a:lumMod val="50000"/>
+                </a:schemeClr>
+              </a:solidFill>
               <a:latin typeface="Calibri" panose="020F0502020204030204" pitchFamily="34" charset="0"/>
               <a:ea typeface="Calibri" panose="020F0502020204030204" pitchFamily="34" charset="0"/>
               <a:cs typeface="Times New Roman" panose="02020603050405020304" pitchFamily="18" charset="0"/>
@@ -9169,8 +9198,8 @@
         </p:nvSpPr>
         <p:spPr>
           <a:xfrm>
-            <a:off x="315315" y="1656762"/>
-            <a:ext cx="5543550" cy="4221092"/>
+            <a:off x="443866" y="1847654"/>
+            <a:ext cx="5171122" cy="4739118"/>
           </a:xfrm>
           <a:prstGeom prst="rect">
             <a:avLst/>
@@ -9183,9 +9212,6 @@
           <a:lstStyle/>
           <a:p>
             <a:pPr lvl="0">
-              <a:lnSpc>
-                <a:spcPct val="107000"/>
-              </a:lnSpc>
               <a:spcAft>
                 <a:spcPts val="800"/>
               </a:spcAft>
@@ -9201,156 +9227,260 @@
                 <a:ea typeface="Calibri" panose="020F0502020204030204" pitchFamily="34" charset="0"/>
                 <a:cs typeface="Times New Roman" panose="02020603050405020304" pitchFamily="18" charset="0"/>
               </a:rPr>
-              <a:t>Шаг 2.</a:t>
+              <a:t>Шаг </a:t>
             </a:r>
             <a:r>
               <a:rPr lang="ru-RU" sz="2800" dirty="0" smtClean="0">
-                <a:latin typeface="Calibri" panose="020F0502020204030204" pitchFamily="34" charset="0"/>
-                <a:ea typeface="Calibri" panose="020F0502020204030204" pitchFamily="34" charset="0"/>
-                <a:cs typeface="Times New Roman" panose="02020603050405020304" pitchFamily="18" charset="0"/>
-              </a:rPr>
-              <a:t/>
-            </a:r>
-            <a:br>
-              <a:rPr lang="ru-RU" sz="2800" dirty="0" smtClean="0">
-                <a:latin typeface="Calibri" panose="020F0502020204030204" pitchFamily="34" charset="0"/>
-                <a:ea typeface="Calibri" panose="020F0502020204030204" pitchFamily="34" charset="0"/>
-                <a:cs typeface="Times New Roman" panose="02020603050405020304" pitchFamily="18" charset="0"/>
-              </a:rPr>
-            </a:br>
-            <a:r>
-              <a:rPr lang="ru-RU" sz="2800" dirty="0">
-                <a:latin typeface="Calibri" panose="020F0502020204030204" pitchFamily="34" charset="0"/>
-                <a:ea typeface="Calibri" panose="020F0502020204030204" pitchFamily="34" charset="0"/>
-                <a:cs typeface="Times New Roman" panose="02020603050405020304" pitchFamily="18" charset="0"/>
-              </a:rPr>
-              <a:t>Нумеруем </a:t>
-            </a:r>
-            <a:r>
-              <a:rPr lang="ru-RU" sz="2800" dirty="0" smtClean="0">
-                <a:latin typeface="Calibri" panose="020F0502020204030204" pitchFamily="34" charset="0"/>
-                <a:ea typeface="Calibri" panose="020F0502020204030204" pitchFamily="34" charset="0"/>
-                <a:cs typeface="Times New Roman" panose="02020603050405020304" pitchFamily="18" charset="0"/>
-              </a:rPr>
-              <a:t>смежные вершины </a:t>
-            </a:r>
-            <a:r>
-              <a:rPr lang="ru-RU" sz="2800" i="1" dirty="0" smtClean="0">
-                <a:latin typeface="Calibri" panose="020F0502020204030204" pitchFamily="34" charset="0"/>
-                <a:ea typeface="Calibri" panose="020F0502020204030204" pitchFamily="34" charset="0"/>
-                <a:cs typeface="Times New Roman" panose="02020603050405020304" pitchFamily="18" charset="0"/>
-              </a:rPr>
-              <a:t>(</a:t>
-            </a:r>
-            <a:r>
-              <a:rPr lang="en-US" sz="2800" i="1" dirty="0" smtClean="0">
-                <a:latin typeface="Calibri" panose="020F0502020204030204" pitchFamily="34" charset="0"/>
-                <a:ea typeface="Calibri" panose="020F0502020204030204" pitchFamily="34" charset="0"/>
-                <a:cs typeface="Times New Roman" panose="02020603050405020304" pitchFamily="18" charset="0"/>
-              </a:rPr>
-              <a:t>P</a:t>
-            </a:r>
-            <a:r>
-              <a:rPr lang="ru-RU" sz="2800" i="1" dirty="0" smtClean="0">
-                <a:latin typeface="Calibri" panose="020F0502020204030204" pitchFamily="34" charset="0"/>
-                <a:ea typeface="Calibri" panose="020F0502020204030204" pitchFamily="34" charset="0"/>
-                <a:cs typeface="Times New Roman" panose="02020603050405020304" pitchFamily="18" charset="0"/>
-              </a:rPr>
-              <a:t>)</a:t>
-            </a:r>
-            <a:r>
-              <a:rPr lang="ru-RU" sz="2800" dirty="0" smtClean="0">
-                <a:latin typeface="Calibri" panose="020F0502020204030204" pitchFamily="34" charset="0"/>
-                <a:ea typeface="Calibri" panose="020F0502020204030204" pitchFamily="34" charset="0"/>
-                <a:cs typeface="Times New Roman" panose="02020603050405020304" pitchFamily="18" charset="0"/>
-              </a:rPr>
-              <a:t> </a:t>
-            </a:r>
-            <a:r>
-              <a:rPr lang="ru-RU" sz="2800" dirty="0">
-                <a:latin typeface="Calibri" panose="020F0502020204030204" pitchFamily="34" charset="0"/>
-                <a:ea typeface="Calibri" panose="020F0502020204030204" pitchFamily="34" charset="0"/>
-                <a:cs typeface="Times New Roman" panose="02020603050405020304" pitchFamily="18" charset="0"/>
-              </a:rPr>
-              <a:t>по очереди. Если дальнейшая нумерация не удалась, то пробуем поменять координаты вершин местами и запустить нумерацию заново. Для </a:t>
-            </a:r>
-            <a:r>
-              <a:rPr lang="en-US" sz="2800" dirty="0" smtClean="0">
+                <a:solidFill>
+                  <a:schemeClr val="accent1">
+                    <a:lumMod val="50000"/>
+                  </a:schemeClr>
+                </a:solidFill>
                 <a:latin typeface="Calibri" panose="020F0502020204030204" pitchFamily="34" charset="0"/>
                 <a:ea typeface="Calibri" panose="020F0502020204030204" pitchFamily="34" charset="0"/>
                 <a:cs typeface="Times New Roman" panose="02020603050405020304" pitchFamily="18" charset="0"/>
               </a:rPr>
               <a:t>2</a:t>
             </a:r>
+            <a:endParaRPr lang="ru-RU" sz="2800" dirty="0" smtClean="0">
+              <a:latin typeface="Calibri" panose="020F0502020204030204" pitchFamily="34" charset="0"/>
+              <a:ea typeface="Calibri" panose="020F0502020204030204" pitchFamily="34" charset="0"/>
+              <a:cs typeface="Times New Roman" panose="02020603050405020304" pitchFamily="18" charset="0"/>
+            </a:endParaRPr>
+          </a:p>
+          <a:p>
+            <a:pPr marL="457200" lvl="0" indent="-457200">
+              <a:spcAft>
+                <a:spcPts val="800"/>
+              </a:spcAft>
+              <a:buFont typeface="Arial" panose="020B0604020202020204" pitchFamily="34" charset="0"/>
+              <a:buChar char="•"/>
+            </a:pPr>
             <a:r>
               <a:rPr lang="ru-RU" sz="2800" dirty="0" smtClean="0">
+                <a:ea typeface="Calibri" panose="020F0502020204030204" pitchFamily="34" charset="0"/>
+                <a:cs typeface="Times New Roman" panose="02020603050405020304" pitchFamily="18" charset="0"/>
+              </a:rPr>
+              <a:t>Нумеруем </a:t>
+            </a:r>
+            <a:r>
+              <a:rPr lang="ru-RU" sz="2800" dirty="0" smtClean="0">
+                <a:ea typeface="Calibri" panose="020F0502020204030204" pitchFamily="34" charset="0"/>
+                <a:cs typeface="Times New Roman" panose="02020603050405020304" pitchFamily="18" charset="0"/>
+              </a:rPr>
+              <a:t>смежные вершины </a:t>
+            </a:r>
+            <a:r>
+              <a:rPr lang="ru-RU" sz="2800" i="1" dirty="0" smtClean="0">
+                <a:ea typeface="Calibri" panose="020F0502020204030204" pitchFamily="34" charset="0"/>
+                <a:cs typeface="Times New Roman" panose="02020603050405020304" pitchFamily="18" charset="0"/>
+              </a:rPr>
+              <a:t>(</a:t>
+            </a:r>
+            <a:r>
+              <a:rPr lang="en-US" sz="2800" i="1" dirty="0" smtClean="0">
+                <a:ea typeface="Calibri" panose="020F0502020204030204" pitchFamily="34" charset="0"/>
+                <a:cs typeface="Times New Roman" panose="02020603050405020304" pitchFamily="18" charset="0"/>
+              </a:rPr>
+              <a:t>P</a:t>
+            </a:r>
+            <a:r>
+              <a:rPr lang="ru-RU" sz="2800" i="1" dirty="0" smtClean="0">
+                <a:ea typeface="Calibri" panose="020F0502020204030204" pitchFamily="34" charset="0"/>
+                <a:cs typeface="Times New Roman" panose="02020603050405020304" pitchFamily="18" charset="0"/>
+              </a:rPr>
+              <a:t>)</a:t>
+            </a:r>
+            <a:r>
+              <a:rPr lang="ru-RU" sz="2800" dirty="0" smtClean="0">
+                <a:ea typeface="Calibri" panose="020F0502020204030204" pitchFamily="34" charset="0"/>
+                <a:cs typeface="Times New Roman" panose="02020603050405020304" pitchFamily="18" charset="0"/>
+              </a:rPr>
+              <a:t> </a:t>
+            </a:r>
+            <a:r>
+              <a:rPr lang="ru-RU" sz="2800" dirty="0">
+                <a:ea typeface="Calibri" panose="020F0502020204030204" pitchFamily="34" charset="0"/>
+                <a:cs typeface="Times New Roman" panose="02020603050405020304" pitchFamily="18" charset="0"/>
+              </a:rPr>
+              <a:t>по очереди. </a:t>
+            </a:r>
+            <a:endParaRPr lang="ru-RU" sz="2800" dirty="0" smtClean="0">
+              <a:ea typeface="Calibri" panose="020F0502020204030204" pitchFamily="34" charset="0"/>
+              <a:cs typeface="Times New Roman" panose="02020603050405020304" pitchFamily="18" charset="0"/>
+            </a:endParaRPr>
+          </a:p>
+          <a:p>
+            <a:pPr marL="457200" lvl="0" indent="-457200">
+              <a:spcAft>
+                <a:spcPts val="800"/>
+              </a:spcAft>
+              <a:buFont typeface="Arial" panose="020B0604020202020204" pitchFamily="34" charset="0"/>
+              <a:buChar char="•"/>
+            </a:pPr>
+            <a:r>
+              <a:rPr lang="ru-RU" sz="2800" dirty="0" smtClean="0">
+                <a:ea typeface="Calibri" panose="020F0502020204030204" pitchFamily="34" charset="0"/>
+                <a:cs typeface="Times New Roman" panose="02020603050405020304" pitchFamily="18" charset="0"/>
+              </a:rPr>
+              <a:t>Если </a:t>
+            </a:r>
+            <a:r>
+              <a:rPr lang="ru-RU" sz="2800" dirty="0">
+                <a:ea typeface="Calibri" panose="020F0502020204030204" pitchFamily="34" charset="0"/>
+                <a:cs typeface="Times New Roman" panose="02020603050405020304" pitchFamily="18" charset="0"/>
+              </a:rPr>
+              <a:t>дальнейшая нумерация не удалась, то пробуем поменять координаты вершин местами и запустить нумерацию заново. </a:t>
+            </a:r>
+            <a:endParaRPr lang="ru-RU" sz="2800" dirty="0" smtClean="0">
+              <a:ea typeface="Calibri" panose="020F0502020204030204" pitchFamily="34" charset="0"/>
+              <a:cs typeface="Times New Roman" panose="02020603050405020304" pitchFamily="18" charset="0"/>
+            </a:endParaRPr>
+          </a:p>
+          <a:p>
+            <a:pPr marL="457200" lvl="0" indent="-457200">
+              <a:spcAft>
+                <a:spcPts val="800"/>
+              </a:spcAft>
+              <a:buFont typeface="Arial" panose="020B0604020202020204" pitchFamily="34" charset="0"/>
+              <a:buChar char="•"/>
+            </a:pPr>
+            <a:r>
+              <a:rPr lang="ru-RU" sz="2800" dirty="0">
+                <a:ea typeface="Calibri" panose="020F0502020204030204" pitchFamily="34" charset="0"/>
+                <a:cs typeface="Times New Roman" panose="02020603050405020304" pitchFamily="18" charset="0"/>
+              </a:rPr>
+              <a:t>Д</a:t>
+            </a:r>
+            <a:r>
+              <a:rPr lang="ru-RU" sz="2800" dirty="0" smtClean="0">
+                <a:ea typeface="Calibri" panose="020F0502020204030204" pitchFamily="34" charset="0"/>
+                <a:cs typeface="Times New Roman" panose="02020603050405020304" pitchFamily="18" charset="0"/>
+              </a:rPr>
+              <a:t>о</a:t>
+            </a:r>
+            <a:r>
+              <a:rPr lang="en-US" sz="2800" dirty="0" smtClean="0">
+                <a:ea typeface="Calibri" panose="020F0502020204030204" pitchFamily="34" charset="0"/>
+                <a:cs typeface="Times New Roman" panose="02020603050405020304" pitchFamily="18" charset="0"/>
+              </a:rPr>
+              <a:t> </a:t>
+            </a:r>
+            <a:r>
+              <a:rPr lang="en-US" sz="2800" dirty="0" smtClean="0">
+                <a:ea typeface="Calibri" panose="020F0502020204030204" pitchFamily="34" charset="0"/>
+                <a:cs typeface="Times New Roman" panose="02020603050405020304" pitchFamily="18" charset="0"/>
+              </a:rPr>
+              <a:t>24</a:t>
+            </a:r>
+            <a:r>
+              <a:rPr lang="ru-RU" sz="2800" dirty="0" smtClean="0">
+                <a:ea typeface="Calibri" panose="020F0502020204030204" pitchFamily="34" charset="0"/>
+                <a:cs typeface="Times New Roman" panose="02020603050405020304" pitchFamily="18" charset="0"/>
+              </a:rPr>
+              <a:t> </a:t>
+            </a:r>
+            <a:r>
+              <a:rPr lang="ru-RU" sz="2800" dirty="0">
+                <a:ea typeface="Calibri" panose="020F0502020204030204" pitchFamily="34" charset="0"/>
+                <a:cs typeface="Times New Roman" panose="02020603050405020304" pitchFamily="18" charset="0"/>
+              </a:rPr>
+              <a:t>вариантов нумераций </a:t>
+            </a:r>
+            <a:r>
+              <a:rPr lang="en-US" sz="2800" i="1" dirty="0">
+                <a:ea typeface="Calibri" panose="020F0502020204030204" pitchFamily="34" charset="0"/>
+                <a:cs typeface="Times New Roman" panose="02020603050405020304" pitchFamily="18" charset="0"/>
+              </a:rPr>
+              <a:t>P</a:t>
+            </a:r>
+            <a:r>
+              <a:rPr lang="ru-RU" sz="2800" dirty="0" smtClean="0">
+                <a:ea typeface="Calibri" panose="020F0502020204030204" pitchFamily="34" charset="0"/>
+                <a:cs typeface="Times New Roman" panose="02020603050405020304" pitchFamily="18" charset="0"/>
+              </a:rPr>
+              <a:t>.</a:t>
+            </a:r>
+            <a:r>
+              <a:rPr lang="ru-RU" sz="2800" dirty="0" smtClean="0"/>
+              <a:t> </a:t>
+            </a:r>
+            <a:endParaRPr lang="ru-RU" sz="2800" dirty="0">
+              <a:ea typeface="Calibri" panose="020F0502020204030204" pitchFamily="34" charset="0"/>
+              <a:cs typeface="Times New Roman" panose="02020603050405020304" pitchFamily="18" charset="0"/>
+            </a:endParaRPr>
+          </a:p>
+        </p:txBody>
+      </p:sp>
+      <p:sp>
+        <p:nvSpPr>
+          <p:cNvPr id="4" name="TextBox 3"/>
+          <p:cNvSpPr txBox="1"/>
+          <p:nvPr/>
+        </p:nvSpPr>
+        <p:spPr>
+          <a:xfrm>
+            <a:off x="517554" y="622980"/>
+            <a:ext cx="6047938" cy="954107"/>
+          </a:xfrm>
+          <a:prstGeom prst="rect">
+            <a:avLst/>
+          </a:prstGeom>
+          <a:noFill/>
+        </p:spPr>
+        <p:txBody>
+          <a:bodyPr wrap="none" rtlCol="0">
+            <a:spAutoFit/>
+          </a:bodyPr>
+          <a:lstStyle/>
+          <a:p>
+            <a:r>
+              <a:rPr lang="ru-RU" sz="2800" dirty="0">
+                <a:solidFill>
+                  <a:schemeClr val="accent1">
+                    <a:lumMod val="50000"/>
+                  </a:schemeClr>
+                </a:solidFill>
                 <a:latin typeface="Calibri" panose="020F0502020204030204" pitchFamily="34" charset="0"/>
                 <a:ea typeface="Calibri" panose="020F0502020204030204" pitchFamily="34" charset="0"/>
                 <a:cs typeface="Times New Roman" panose="02020603050405020304" pitchFamily="18" charset="0"/>
               </a:rPr>
-              <a:t>-хмерного </a:t>
-            </a:r>
-            <a:r>
-              <a:rPr lang="ru-RU" sz="2800" dirty="0">
+              <a:t>Идея: </a:t>
+            </a:r>
+            <a:r>
+              <a:rPr lang="ru-RU" sz="2800" dirty="0" smtClean="0">
+                <a:solidFill>
+                  <a:schemeClr val="accent1">
+                    <a:lumMod val="50000"/>
+                  </a:schemeClr>
+                </a:solidFill>
                 <a:latin typeface="Calibri" panose="020F0502020204030204" pitchFamily="34" charset="0"/>
                 <a:ea typeface="Calibri" panose="020F0502020204030204" pitchFamily="34" charset="0"/>
                 <a:cs typeface="Times New Roman" panose="02020603050405020304" pitchFamily="18" charset="0"/>
               </a:rPr>
-              <a:t>случая будет </a:t>
-            </a:r>
+              <a:t>Пытаемся задать координатную</a:t>
+            </a:r>
+          </a:p>
+          <a:p>
             <a:r>
               <a:rPr lang="ru-RU" sz="2800" dirty="0" smtClean="0">
+                <a:solidFill>
+                  <a:schemeClr val="accent1">
+                    <a:lumMod val="50000"/>
+                  </a:schemeClr>
+                </a:solidFill>
                 <a:latin typeface="Calibri" panose="020F0502020204030204" pitchFamily="34" charset="0"/>
                 <a:ea typeface="Calibri" panose="020F0502020204030204" pitchFamily="34" charset="0"/>
                 <a:cs typeface="Times New Roman" panose="02020603050405020304" pitchFamily="18" charset="0"/>
               </a:rPr>
-              <a:t>до</a:t>
-            </a:r>
-            <a:r>
-              <a:rPr lang="en-US" sz="2800" dirty="0" smtClean="0">
-                <a:latin typeface="Calibri" panose="020F0502020204030204" pitchFamily="34" charset="0"/>
-                <a:ea typeface="Calibri" panose="020F0502020204030204" pitchFamily="34" charset="0"/>
-                <a:cs typeface="Times New Roman" panose="02020603050405020304" pitchFamily="18" charset="0"/>
-              </a:rPr>
-              <a:t> 24</a:t>
-            </a:r>
-            <a:r>
-              <a:rPr lang="ru-RU" sz="2800" dirty="0" smtClean="0">
-                <a:latin typeface="Calibri" panose="020F0502020204030204" pitchFamily="34" charset="0"/>
-                <a:ea typeface="Calibri" panose="020F0502020204030204" pitchFamily="34" charset="0"/>
-                <a:cs typeface="Times New Roman" panose="02020603050405020304" pitchFamily="18" charset="0"/>
-              </a:rPr>
-              <a:t> </a:t>
-            </a:r>
-            <a:r>
-              <a:rPr lang="ru-RU" sz="2800" dirty="0">
-                <a:latin typeface="Calibri" panose="020F0502020204030204" pitchFamily="34" charset="0"/>
-                <a:ea typeface="Calibri" panose="020F0502020204030204" pitchFamily="34" charset="0"/>
-                <a:cs typeface="Times New Roman" panose="02020603050405020304" pitchFamily="18" charset="0"/>
-              </a:rPr>
-              <a:t>вариантов нумераций </a:t>
-            </a:r>
-            <a:r>
-              <a:rPr lang="en-US" sz="2800" i="1" dirty="0">
-                <a:latin typeface="Calibri" panose="020F0502020204030204" pitchFamily="34" charset="0"/>
-                <a:ea typeface="Calibri" panose="020F0502020204030204" pitchFamily="34" charset="0"/>
-                <a:cs typeface="Times New Roman" panose="02020603050405020304" pitchFamily="18" charset="0"/>
-              </a:rPr>
-              <a:t>P</a:t>
-            </a:r>
-            <a:r>
-              <a:rPr lang="ru-RU" sz="2800" dirty="0" smtClean="0">
-                <a:latin typeface="Calibri" panose="020F0502020204030204" pitchFamily="34" charset="0"/>
-                <a:ea typeface="Calibri" panose="020F0502020204030204" pitchFamily="34" charset="0"/>
-                <a:cs typeface="Times New Roman" panose="02020603050405020304" pitchFamily="18" charset="0"/>
-              </a:rPr>
-              <a:t>.</a:t>
-            </a:r>
-            <a:r>
-              <a:rPr lang="ru-RU" sz="2800" dirty="0" smtClean="0"/>
-              <a:t> </a:t>
+              <a:t>систему</a:t>
             </a:r>
             <a:endParaRPr lang="ru-RU" sz="2800" dirty="0">
+              <a:solidFill>
+                <a:schemeClr val="accent1">
+                  <a:lumMod val="50000"/>
+                </a:schemeClr>
+              </a:solidFill>
               <a:latin typeface="Calibri" panose="020F0502020204030204" pitchFamily="34" charset="0"/>
               <a:ea typeface="Calibri" panose="020F0502020204030204" pitchFamily="34" charset="0"/>
               <a:cs typeface="Times New Roman" panose="02020603050405020304" pitchFamily="18" charset="0"/>
@@ -9445,8 +9575,8 @@
         </p:nvSpPr>
         <p:spPr>
           <a:xfrm>
-            <a:off x="271604" y="1638677"/>
-            <a:ext cx="5413972" cy="4401205"/>
+            <a:off x="517554" y="1870544"/>
+            <a:ext cx="5413972" cy="4832092"/>
           </a:xfrm>
           <a:prstGeom prst="rect">
             <a:avLst/>
@@ -9469,60 +9599,164 @@
                 <a:ea typeface="Calibri" panose="020F0502020204030204" pitchFamily="34" charset="0"/>
                 <a:cs typeface="Times New Roman" panose="02020603050405020304" pitchFamily="18" charset="0"/>
               </a:rPr>
-              <a:t>Шаг 3.</a:t>
+              <a:t>Шаг </a:t>
             </a:r>
             <a:r>
               <a:rPr lang="ru-RU" sz="2800" dirty="0" smtClean="0">
+                <a:solidFill>
+                  <a:schemeClr val="accent1">
+                    <a:lumMod val="50000"/>
+                  </a:schemeClr>
+                </a:solidFill>
                 <a:latin typeface="Calibri" panose="020F0502020204030204" pitchFamily="34" charset="0"/>
                 <a:ea typeface="Calibri" panose="020F0502020204030204" pitchFamily="34" charset="0"/>
                 <a:cs typeface="Times New Roman" panose="02020603050405020304" pitchFamily="18" charset="0"/>
               </a:rPr>
-              <a:t/>
-            </a:r>
-            <a:br>
-              <a:rPr lang="ru-RU" sz="2800" dirty="0" smtClean="0">
+              <a:t>3</a:t>
+            </a:r>
+            <a:endParaRPr lang="ru-RU" sz="2800" dirty="0" smtClean="0">
+              <a:latin typeface="Calibri" panose="020F0502020204030204" pitchFamily="34" charset="0"/>
+              <a:ea typeface="Calibri" panose="020F0502020204030204" pitchFamily="34" charset="0"/>
+              <a:cs typeface="Times New Roman" panose="02020603050405020304" pitchFamily="18" charset="0"/>
+            </a:endParaRPr>
+          </a:p>
+          <a:p>
+            <a:pPr marL="457200" indent="-457200">
+              <a:buFont typeface="Arial" panose="020B0604020202020204" pitchFamily="34" charset="0"/>
+              <a:buChar char="•"/>
+            </a:pPr>
+            <a:r>
+              <a:rPr lang="ru-RU" sz="2800" dirty="0" smtClean="0"/>
+              <a:t>Нумеруем </a:t>
+            </a:r>
+            <a:r>
+              <a:rPr lang="ru-RU" sz="2800" dirty="0"/>
+              <a:t>смежные вершины от </a:t>
+            </a:r>
+            <a:r>
+              <a:rPr lang="en-US" sz="2800" i="1" dirty="0"/>
+              <a:t>P</a:t>
+            </a:r>
+            <a:r>
+              <a:rPr lang="ru-RU" sz="2800" dirty="0"/>
+              <a:t> по </a:t>
+            </a:r>
+            <a:r>
+              <a:rPr lang="ru-RU" sz="2800" dirty="0" smtClean="0"/>
+              <a:t>очереди.</a:t>
+            </a:r>
+          </a:p>
+          <a:p>
+            <a:pPr marL="457200" indent="-457200">
+              <a:buFont typeface="Arial" panose="020B0604020202020204" pitchFamily="34" charset="0"/>
+              <a:buChar char="•"/>
+            </a:pPr>
+            <a:r>
+              <a:rPr lang="ru-RU" sz="2800" dirty="0" smtClean="0"/>
+              <a:t>Однозначно разрешимые случаи:</a:t>
+            </a:r>
+            <a:endParaRPr lang="ru-RU" sz="2800" dirty="0"/>
+          </a:p>
+          <a:p>
+            <a:pPr marL="914400" lvl="1" indent="-457200">
+              <a:buFont typeface="Arial" panose="020B0604020202020204" pitchFamily="34" charset="0"/>
+              <a:buChar char="•"/>
+            </a:pPr>
+            <a:r>
+              <a:rPr lang="ru-RU" sz="2800" dirty="0"/>
+              <a:t>Два и более соседей имеют индекс.</a:t>
+            </a:r>
+          </a:p>
+          <a:p>
+            <a:pPr marL="914400" lvl="1" indent="-457200">
+              <a:buFont typeface="Arial" panose="020B0604020202020204" pitchFamily="34" charset="0"/>
+              <a:buChar char="•"/>
+            </a:pPr>
+            <a:r>
+              <a:rPr lang="ru-RU" sz="2800" dirty="0"/>
+              <a:t>Один из соседей не имеет непронумерованных соседей кроме текущей вершины</a:t>
+            </a:r>
+            <a:r>
+              <a:rPr lang="ru-RU" sz="2800" dirty="0" smtClean="0"/>
+              <a:t>.</a:t>
+            </a:r>
+            <a:endParaRPr lang="ru-RU" sz="2800" dirty="0"/>
+          </a:p>
+        </p:txBody>
+      </p:sp>
+      <p:sp>
+        <p:nvSpPr>
+          <p:cNvPr id="4" name="TextBox 3"/>
+          <p:cNvSpPr txBox="1"/>
+          <p:nvPr/>
+        </p:nvSpPr>
+        <p:spPr>
+          <a:xfrm>
+            <a:off x="517554" y="622980"/>
+            <a:ext cx="6689652" cy="954107"/>
+          </a:xfrm>
+          <a:prstGeom prst="rect">
+            <a:avLst/>
+          </a:prstGeom>
+          <a:noFill/>
+        </p:spPr>
+        <p:txBody>
+          <a:bodyPr wrap="none" rtlCol="0">
+            <a:spAutoFit/>
+          </a:bodyPr>
+          <a:lstStyle/>
+          <a:p>
+            <a:r>
+              <a:rPr lang="ru-RU" sz="2800" dirty="0">
+                <a:solidFill>
+                  <a:schemeClr val="accent1">
+                    <a:lumMod val="50000"/>
+                  </a:schemeClr>
+                </a:solidFill>
                 <a:latin typeface="Calibri" panose="020F0502020204030204" pitchFamily="34" charset="0"/>
                 <a:ea typeface="Calibri" panose="020F0502020204030204" pitchFamily="34" charset="0"/>
                 <a:cs typeface="Times New Roman" panose="02020603050405020304" pitchFamily="18" charset="0"/>
               </a:rPr>
-            </a:br>
-            <a:r>
-              <a:rPr lang="ru-RU" sz="2800" dirty="0"/>
-              <a:t>Нумеруем смежные вершины от </a:t>
-            </a:r>
-            <a:r>
-              <a:rPr lang="en-US" sz="2800" i="1" dirty="0"/>
-              <a:t>P</a:t>
-            </a:r>
-            <a:r>
-              <a:rPr lang="ru-RU" sz="2800" dirty="0"/>
-              <a:t> по очереди. Есть два случая, когда мы можем однозначно поставить индекс для вершины:</a:t>
-            </a:r>
-          </a:p>
-          <a:p>
-            <a:pPr marL="457200" lvl="0" indent="-457200">
-              <a:buFont typeface="Arial" panose="020B0604020202020204" pitchFamily="34" charset="0"/>
-              <a:buChar char="•"/>
-            </a:pPr>
-            <a:r>
-              <a:rPr lang="ru-RU" sz="2800" dirty="0"/>
-              <a:t>Два и более соседей имеют индекс.</a:t>
-            </a:r>
-          </a:p>
-          <a:p>
-            <a:pPr marL="457200" lvl="0" indent="-457200">
-              <a:buFont typeface="Arial" panose="020B0604020202020204" pitchFamily="34" charset="0"/>
-              <a:buChar char="•"/>
-            </a:pPr>
-            <a:r>
-              <a:rPr lang="ru-RU" sz="2800" dirty="0"/>
-              <a:t>Один из соседей не имеет непронумерованных соседей кроме текущей вершины</a:t>
-            </a:r>
-            <a:r>
-              <a:rPr lang="ru-RU" sz="2800" dirty="0" smtClean="0"/>
-              <a:t>.</a:t>
-            </a:r>
-            <a:endParaRPr lang="ru-RU" sz="2800" dirty="0"/>
+              <a:t>Идея: </a:t>
+            </a:r>
+            <a:r>
+              <a:rPr lang="ru-RU" sz="2800" dirty="0" smtClean="0">
+                <a:solidFill>
+                  <a:schemeClr val="accent1">
+                    <a:lumMod val="50000"/>
+                  </a:schemeClr>
+                </a:solidFill>
+                <a:latin typeface="Calibri" panose="020F0502020204030204" pitchFamily="34" charset="0"/>
+                <a:ea typeface="Calibri" panose="020F0502020204030204" pitchFamily="34" charset="0"/>
+                <a:cs typeface="Times New Roman" panose="02020603050405020304" pitchFamily="18" charset="0"/>
+              </a:rPr>
+              <a:t>Нумеруем однозначно разрешимые</a:t>
+            </a:r>
+          </a:p>
+          <a:p>
+            <a:r>
+              <a:rPr lang="ru-RU" sz="2800" dirty="0" smtClean="0">
+                <a:solidFill>
+                  <a:schemeClr val="accent1">
+                    <a:lumMod val="50000"/>
+                  </a:schemeClr>
+                </a:solidFill>
+                <a:latin typeface="Calibri" panose="020F0502020204030204" pitchFamily="34" charset="0"/>
+                <a:ea typeface="Calibri" panose="020F0502020204030204" pitchFamily="34" charset="0"/>
+                <a:cs typeface="Times New Roman" panose="02020603050405020304" pitchFamily="18" charset="0"/>
+              </a:rPr>
+              <a:t>случаи</a:t>
+            </a:r>
+            <a:endParaRPr lang="ru-RU" sz="2800" dirty="0">
+              <a:solidFill>
+                <a:schemeClr val="accent1">
+                  <a:lumMod val="50000"/>
+                </a:schemeClr>
+              </a:solidFill>
+              <a:latin typeface="Calibri" panose="020F0502020204030204" pitchFamily="34" charset="0"/>
+              <a:ea typeface="Calibri" panose="020F0502020204030204" pitchFamily="34" charset="0"/>
+              <a:cs typeface="Times New Roman" panose="02020603050405020304" pitchFamily="18" charset="0"/>
+            </a:endParaRPr>
           </a:p>
         </p:txBody>
       </p:sp>
@@ -9613,8 +9847,8 @@
         </p:nvSpPr>
         <p:spPr>
           <a:xfrm>
-            <a:off x="271604" y="1080646"/>
-            <a:ext cx="5717716" cy="4832092"/>
+            <a:off x="517554" y="1914316"/>
+            <a:ext cx="5078574" cy="3539430"/>
           </a:xfrm>
           <a:prstGeom prst="rect">
             <a:avLst/>
@@ -9638,73 +9872,170 @@
                 <a:ea typeface="Calibri" panose="020F0502020204030204" pitchFamily="34" charset="0"/>
                 <a:cs typeface="Times New Roman" panose="02020603050405020304" pitchFamily="18" charset="0"/>
               </a:rPr>
-              <a:t>Шаг 4.</a:t>
-            </a:r>
-            <a:r>
-              <a:rPr lang="ru-RU" sz="2800" dirty="0">
+              <a:t>Шаг </a:t>
+            </a:r>
+            <a:r>
+              <a:rPr lang="ru-RU" sz="2800" dirty="0" smtClean="0">
+                <a:solidFill>
+                  <a:schemeClr val="accent1">
+                    <a:lumMod val="50000"/>
+                  </a:schemeClr>
+                </a:solidFill>
                 <a:latin typeface="Calibri" panose="020F0502020204030204" pitchFamily="34" charset="0"/>
                 <a:ea typeface="Calibri" panose="020F0502020204030204" pitchFamily="34" charset="0"/>
                 <a:cs typeface="Times New Roman" panose="02020603050405020304" pitchFamily="18" charset="0"/>
               </a:rPr>
-              <a:t/>
-            </a:r>
-            <a:br>
+              <a:t>4</a:t>
+            </a:r>
+            <a:endParaRPr lang="ru-RU" sz="2800" dirty="0" smtClean="0">
+              <a:latin typeface="Calibri" panose="020F0502020204030204" pitchFamily="34" charset="0"/>
+              <a:ea typeface="Calibri" panose="020F0502020204030204" pitchFamily="34" charset="0"/>
+              <a:cs typeface="Times New Roman" panose="02020603050405020304" pitchFamily="18" charset="0"/>
+            </a:endParaRPr>
+          </a:p>
+          <a:p>
+            <a:pPr marL="457200" lvl="0" indent="-457200">
+              <a:buFont typeface="Arial" panose="020B0604020202020204" pitchFamily="34" charset="0"/>
+              <a:buChar char="•"/>
+            </a:pPr>
+            <a:r>
+              <a:rPr lang="ru-RU" sz="2800" dirty="0" smtClean="0"/>
+              <a:t>Для </a:t>
+            </a:r>
+            <a:r>
+              <a:rPr lang="ru-RU" sz="2800" dirty="0"/>
+              <a:t>остальных вершин </a:t>
+            </a:r>
+            <a:r>
+              <a:rPr lang="ru-RU" sz="2800" dirty="0" smtClean="0"/>
+              <a:t>рекурсивно </a:t>
+            </a:r>
+            <a:r>
+              <a:rPr lang="ru-RU" sz="2800" dirty="0"/>
+              <a:t>перебираем все возможные индексы:</a:t>
+            </a:r>
+          </a:p>
+          <a:p>
+            <a:pPr marL="914400" lvl="1" indent="-457200">
+              <a:buFont typeface="Arial" panose="020B0604020202020204" pitchFamily="34" charset="0"/>
+              <a:buChar char="•"/>
+            </a:pPr>
+            <a:r>
+              <a:rPr lang="ru-RU" sz="2800" dirty="0"/>
+              <a:t>Ставим один из возможных индексов.</a:t>
+            </a:r>
+          </a:p>
+          <a:p>
+            <a:pPr marL="914400" lvl="1" indent="-457200">
+              <a:buFont typeface="Arial" panose="020B0604020202020204" pitchFamily="34" charset="0"/>
+              <a:buChar char="•"/>
+            </a:pPr>
+            <a:r>
+              <a:rPr lang="ru-RU" sz="2800" dirty="0"/>
+              <a:t>Повторяем алгоритм</a:t>
+            </a:r>
+            <a:r>
+              <a:rPr lang="en-US" sz="2800" dirty="0"/>
+              <a:t> </a:t>
+            </a:r>
+            <a:r>
+              <a:rPr lang="ru-RU" sz="2800" dirty="0"/>
+              <a:t>для смежных вершин</a:t>
+            </a:r>
+            <a:r>
+              <a:rPr lang="ru-RU" sz="2800" dirty="0" smtClean="0"/>
+              <a:t>.</a:t>
+            </a:r>
+            <a:endParaRPr lang="ru-RU" sz="2800" dirty="0"/>
+          </a:p>
+        </p:txBody>
+      </p:sp>
+      <p:sp>
+        <p:nvSpPr>
+          <p:cNvPr id="4" name="TextBox 3"/>
+          <p:cNvSpPr txBox="1"/>
+          <p:nvPr/>
+        </p:nvSpPr>
+        <p:spPr>
+          <a:xfrm>
+            <a:off x="517554" y="622980"/>
+            <a:ext cx="6415795" cy="954107"/>
+          </a:xfrm>
+          <a:prstGeom prst="rect">
+            <a:avLst/>
+          </a:prstGeom>
+          <a:noFill/>
+        </p:spPr>
+        <p:txBody>
+          <a:bodyPr wrap="none" rtlCol="0">
+            <a:spAutoFit/>
+          </a:bodyPr>
+          <a:lstStyle/>
+          <a:p>
+            <a:r>
               <a:rPr lang="ru-RU" sz="2800" dirty="0">
+                <a:solidFill>
+                  <a:schemeClr val="accent1">
+                    <a:lumMod val="50000"/>
+                  </a:schemeClr>
+                </a:solidFill>
                 <a:latin typeface="Calibri" panose="020F0502020204030204" pitchFamily="34" charset="0"/>
                 <a:ea typeface="Calibri" panose="020F0502020204030204" pitchFamily="34" charset="0"/>
                 <a:cs typeface="Times New Roman" panose="02020603050405020304" pitchFamily="18" charset="0"/>
               </a:rPr>
-            </a:br>
-            <a:r>
-              <a:rPr lang="ru-RU" sz="2800" dirty="0"/>
-              <a:t>Для остальных вершин </a:t>
-            </a:r>
-            <a:r>
-              <a:rPr lang="ru-RU" sz="2800" dirty="0" smtClean="0"/>
-              <a:t>рекурсивно </a:t>
-            </a:r>
-            <a:r>
-              <a:rPr lang="ru-RU" sz="2800" dirty="0"/>
-              <a:t>перебираем все возможные индексы:</a:t>
-            </a:r>
-          </a:p>
-          <a:p>
-            <a:pPr marL="457200" lvl="0" indent="-457200">
-              <a:buFont typeface="Arial" panose="020B0604020202020204" pitchFamily="34" charset="0"/>
-              <a:buChar char="•"/>
-            </a:pPr>
-            <a:r>
-              <a:rPr lang="ru-RU" sz="2800" dirty="0"/>
-              <a:t>Ставим один из возможных индексов.</a:t>
-            </a:r>
-          </a:p>
-          <a:p>
-            <a:pPr marL="457200" lvl="0" indent="-457200">
-              <a:buFont typeface="Arial" panose="020B0604020202020204" pitchFamily="34" charset="0"/>
-              <a:buChar char="•"/>
-            </a:pPr>
-            <a:r>
-              <a:rPr lang="ru-RU" sz="2800" dirty="0"/>
-              <a:t>Повторяем алгоритм</a:t>
-            </a:r>
-            <a:r>
-              <a:rPr lang="en-US" sz="2800" dirty="0"/>
-              <a:t> </a:t>
-            </a:r>
-            <a:r>
-              <a:rPr lang="ru-RU" sz="2800" dirty="0"/>
-              <a:t>для смежных вершин.</a:t>
-            </a:r>
-          </a:p>
-          <a:p>
-            <a:pPr marL="457200" lvl="0" indent="-457200">
-              <a:buFont typeface="Arial" panose="020B0604020202020204" pitchFamily="34" charset="0"/>
-              <a:buChar char="•"/>
-            </a:pPr>
-            <a:r>
-              <a:rPr lang="ru-RU" sz="2800" dirty="0"/>
-              <a:t>Если не удалось пронумеровать, то возвращаемся, меняем индекс и проходим заново.</a:t>
-            </a:r>
+              <a:t>Идея: </a:t>
+            </a:r>
+            <a:r>
+              <a:rPr lang="ru-RU" sz="2800" dirty="0" smtClean="0">
+                <a:solidFill>
+                  <a:schemeClr val="accent1">
+                    <a:lumMod val="50000"/>
+                  </a:schemeClr>
+                </a:solidFill>
+                <a:latin typeface="Calibri" panose="020F0502020204030204" pitchFamily="34" charset="0"/>
+                <a:ea typeface="Calibri" panose="020F0502020204030204" pitchFamily="34" charset="0"/>
+                <a:cs typeface="Times New Roman" panose="02020603050405020304" pitchFamily="18" charset="0"/>
+              </a:rPr>
+              <a:t>Перебираем варианты нумерации</a:t>
+            </a:r>
+          </a:p>
+          <a:p>
+            <a:r>
+              <a:rPr lang="ru-RU" sz="2800" dirty="0">
+                <a:solidFill>
+                  <a:schemeClr val="accent1">
+                    <a:lumMod val="50000"/>
+                  </a:schemeClr>
+                </a:solidFill>
+                <a:latin typeface="Calibri" panose="020F0502020204030204" pitchFamily="34" charset="0"/>
+                <a:ea typeface="Calibri" panose="020F0502020204030204" pitchFamily="34" charset="0"/>
+                <a:cs typeface="Times New Roman" panose="02020603050405020304" pitchFamily="18" charset="0"/>
+              </a:rPr>
+              <a:t>д</a:t>
+            </a:r>
+            <a:r>
+              <a:rPr lang="ru-RU" sz="2800" dirty="0" smtClean="0">
+                <a:solidFill>
+                  <a:schemeClr val="accent1">
+                    <a:lumMod val="50000"/>
+                  </a:schemeClr>
+                </a:solidFill>
+                <a:latin typeface="Calibri" panose="020F0502020204030204" pitchFamily="34" charset="0"/>
+                <a:ea typeface="Calibri" panose="020F0502020204030204" pitchFamily="34" charset="0"/>
+                <a:cs typeface="Times New Roman" panose="02020603050405020304" pitchFamily="18" charset="0"/>
+              </a:rPr>
+              <a:t>ля неоднозначных случаев</a:t>
+            </a:r>
+            <a:endParaRPr lang="ru-RU" sz="2800" dirty="0">
+              <a:solidFill>
+                <a:schemeClr val="accent1">
+                  <a:lumMod val="50000"/>
+                </a:schemeClr>
+              </a:solidFill>
+              <a:latin typeface="Calibri" panose="020F0502020204030204" pitchFamily="34" charset="0"/>
+              <a:ea typeface="Calibri" panose="020F0502020204030204" pitchFamily="34" charset="0"/>
+              <a:cs typeface="Times New Roman" panose="02020603050405020304" pitchFamily="18" charset="0"/>
+            </a:endParaRPr>
           </a:p>
         </p:txBody>
       </p:sp>
@@ -9795,8 +10126,8 @@
         </p:nvSpPr>
         <p:spPr>
           <a:xfrm>
-            <a:off x="271604" y="1080646"/>
-            <a:ext cx="5717716" cy="4832092"/>
+            <a:off x="517554" y="1886349"/>
+            <a:ext cx="5097434" cy="4832092"/>
           </a:xfrm>
           <a:prstGeom prst="rect">
             <a:avLst/>
@@ -9808,7 +10139,6 @@
           </a:bodyPr>
           <a:lstStyle/>
           <a:p>
-            <a:pPr lvl="0"/>
             <a:r>
               <a:rPr lang="ru-RU" sz="2800" dirty="0" smtClean="0">
                 <a:solidFill>
@@ -9820,69 +10150,171 @@
                 <a:ea typeface="Calibri" panose="020F0502020204030204" pitchFamily="34" charset="0"/>
                 <a:cs typeface="Times New Roman" panose="02020603050405020304" pitchFamily="18" charset="0"/>
               </a:rPr>
-              <a:t>Шаг 4.</a:t>
-            </a:r>
-            <a:r>
-              <a:rPr lang="ru-RU" sz="2800" dirty="0">
+              <a:t>Шаг 4</a:t>
+            </a:r>
+            <a:endParaRPr lang="ru-RU" sz="2800" dirty="0" smtClean="0">
+              <a:latin typeface="Calibri" panose="020F0502020204030204" pitchFamily="34" charset="0"/>
+              <a:ea typeface="Calibri" panose="020F0502020204030204" pitchFamily="34" charset="0"/>
+              <a:cs typeface="Times New Roman" panose="02020603050405020304" pitchFamily="18" charset="0"/>
+            </a:endParaRPr>
+          </a:p>
+          <a:p>
+            <a:pPr marL="457200" indent="-457200">
+              <a:buFont typeface="Arial" panose="020B0604020202020204" pitchFamily="34" charset="0"/>
+              <a:buChar char="•"/>
+            </a:pPr>
+            <a:r>
+              <a:rPr lang="ru-RU" sz="2800" dirty="0" smtClean="0">
                 <a:latin typeface="Calibri" panose="020F0502020204030204" pitchFamily="34" charset="0"/>
                 <a:ea typeface="Calibri" panose="020F0502020204030204" pitchFamily="34" charset="0"/>
                 <a:cs typeface="Times New Roman" panose="02020603050405020304" pitchFamily="18" charset="0"/>
               </a:rPr>
-              <a:t/>
-            </a:r>
-            <a:br>
+              <a:t>Если </a:t>
+            </a:r>
+            <a:r>
+              <a:rPr lang="ru-RU" sz="2800" dirty="0" smtClean="0"/>
+              <a:t>не </a:t>
+            </a:r>
+            <a:r>
+              <a:rPr lang="ru-RU" sz="2800" dirty="0"/>
+              <a:t>удалось </a:t>
+            </a:r>
+            <a:r>
+              <a:rPr lang="ru-RU" sz="2800" dirty="0" smtClean="0"/>
+              <a:t>пронумеровать, то:</a:t>
+            </a:r>
+          </a:p>
+          <a:p>
+            <a:pPr marL="914400" lvl="1" indent="-457200">
+              <a:buFont typeface="Arial" panose="020B0604020202020204" pitchFamily="34" charset="0"/>
+              <a:buChar char="•"/>
+            </a:pPr>
+            <a:r>
+              <a:rPr lang="ru-RU" sz="2800" dirty="0" smtClean="0"/>
+              <a:t>Возвращаемся к предыдущему неоднозначному случаю</a:t>
+            </a:r>
+          </a:p>
+          <a:p>
+            <a:pPr marL="914400" lvl="1" indent="-457200">
+              <a:buFont typeface="Arial" panose="020B0604020202020204" pitchFamily="34" charset="0"/>
+              <a:buChar char="•"/>
+            </a:pPr>
+            <a:r>
+              <a:rPr lang="ru-RU" sz="2800" dirty="0" smtClean="0"/>
+              <a:t>Меняем </a:t>
+            </a:r>
+            <a:r>
+              <a:rPr lang="ru-RU" sz="2800" dirty="0"/>
+              <a:t>индекс </a:t>
+            </a:r>
+            <a:r>
+              <a:rPr lang="ru-RU" sz="2800" dirty="0" smtClean="0"/>
+              <a:t>на следующий возможный</a:t>
+            </a:r>
+          </a:p>
+          <a:p>
+            <a:pPr marL="914400" lvl="1" indent="-457200">
+              <a:buFont typeface="Arial" panose="020B0604020202020204" pitchFamily="34" charset="0"/>
+              <a:buChar char="•"/>
+            </a:pPr>
+            <a:r>
+              <a:rPr lang="ru-RU" sz="2800" dirty="0" smtClean="0"/>
+              <a:t>Запускаем дальнейшую нумерацию</a:t>
+            </a:r>
+            <a:endParaRPr lang="ru-RU" sz="2800" dirty="0"/>
+          </a:p>
+          <a:p>
+            <a:pPr lvl="0"/>
+            <a:endParaRPr lang="ru-RU" sz="2800" dirty="0"/>
+          </a:p>
+        </p:txBody>
+      </p:sp>
+      <p:sp>
+        <p:nvSpPr>
+          <p:cNvPr id="6" name="TextBox 5"/>
+          <p:cNvSpPr txBox="1"/>
+          <p:nvPr/>
+        </p:nvSpPr>
+        <p:spPr>
+          <a:xfrm>
+            <a:off x="517554" y="622980"/>
+            <a:ext cx="6415795" cy="954107"/>
+          </a:xfrm>
+          <a:prstGeom prst="rect">
+            <a:avLst/>
+          </a:prstGeom>
+          <a:noFill/>
+        </p:spPr>
+        <p:txBody>
+          <a:bodyPr wrap="none" rtlCol="0">
+            <a:spAutoFit/>
+          </a:bodyPr>
+          <a:lstStyle/>
+          <a:p>
+            <a:r>
               <a:rPr lang="ru-RU" sz="2800" dirty="0">
+                <a:solidFill>
+                  <a:schemeClr val="accent1">
+                    <a:lumMod val="50000"/>
+                  </a:schemeClr>
+                </a:solidFill>
                 <a:latin typeface="Calibri" panose="020F0502020204030204" pitchFamily="34" charset="0"/>
                 <a:ea typeface="Calibri" panose="020F0502020204030204" pitchFamily="34" charset="0"/>
                 <a:cs typeface="Times New Roman" panose="02020603050405020304" pitchFamily="18" charset="0"/>
               </a:rPr>
-            </a:br>
-            <a:r>
-              <a:rPr lang="ru-RU" sz="2800" dirty="0"/>
-              <a:t>Для остальных вершин рекурсивно перебираем все возможные индексы:</a:t>
-            </a:r>
-          </a:p>
-          <a:p>
-            <a:pPr marL="457200" lvl="0" indent="-457200">
-              <a:buFont typeface="Arial" panose="020B0604020202020204" pitchFamily="34" charset="0"/>
-              <a:buChar char="•"/>
-            </a:pPr>
-            <a:r>
-              <a:rPr lang="ru-RU" sz="2800" dirty="0" smtClean="0"/>
-              <a:t>Ставим </a:t>
-            </a:r>
-            <a:r>
-              <a:rPr lang="ru-RU" sz="2800" dirty="0"/>
-              <a:t>один из возможных индексов.</a:t>
-            </a:r>
-          </a:p>
-          <a:p>
-            <a:pPr marL="457200" lvl="0" indent="-457200">
-              <a:buFont typeface="Arial" panose="020B0604020202020204" pitchFamily="34" charset="0"/>
-              <a:buChar char="•"/>
-            </a:pPr>
-            <a:r>
-              <a:rPr lang="ru-RU" sz="2800" dirty="0"/>
-              <a:t>Повторяем алгоритм</a:t>
-            </a:r>
-            <a:r>
-              <a:rPr lang="en-US" sz="2800" dirty="0"/>
-              <a:t> </a:t>
-            </a:r>
-            <a:r>
-              <a:rPr lang="ru-RU" sz="2800" dirty="0"/>
-              <a:t>для смежных вершин.</a:t>
-            </a:r>
-          </a:p>
-          <a:p>
-            <a:pPr marL="457200" lvl="0" indent="-457200">
-              <a:buFont typeface="Arial" panose="020B0604020202020204" pitchFamily="34" charset="0"/>
-              <a:buChar char="•"/>
-            </a:pPr>
-            <a:r>
-              <a:rPr lang="ru-RU" sz="2800" dirty="0"/>
-              <a:t>Если не удалось пронумеровать, то возвращаемся, меняем индекс и проходим заново.</a:t>
-            </a:r>
+              <a:t>Идея: </a:t>
+            </a:r>
+            <a:r>
+              <a:rPr lang="ru-RU" sz="2800" dirty="0" smtClean="0">
+                <a:solidFill>
+                  <a:schemeClr val="accent1">
+                    <a:lumMod val="50000"/>
+                  </a:schemeClr>
+                </a:solidFill>
+                <a:latin typeface="Calibri" panose="020F0502020204030204" pitchFamily="34" charset="0"/>
+                <a:ea typeface="Calibri" panose="020F0502020204030204" pitchFamily="34" charset="0"/>
+                <a:cs typeface="Times New Roman" panose="02020603050405020304" pitchFamily="18" charset="0"/>
+              </a:rPr>
+              <a:t>Перебираем варианты нумерации</a:t>
+            </a:r>
+          </a:p>
+          <a:p>
+            <a:r>
+              <a:rPr lang="ru-RU" sz="2800" dirty="0">
+                <a:solidFill>
+                  <a:schemeClr val="accent1">
+                    <a:lumMod val="50000"/>
+                  </a:schemeClr>
+                </a:solidFill>
+                <a:latin typeface="Calibri" panose="020F0502020204030204" pitchFamily="34" charset="0"/>
+                <a:ea typeface="Calibri" panose="020F0502020204030204" pitchFamily="34" charset="0"/>
+                <a:cs typeface="Times New Roman" panose="02020603050405020304" pitchFamily="18" charset="0"/>
+              </a:rPr>
+              <a:t>д</a:t>
+            </a:r>
+            <a:r>
+              <a:rPr lang="ru-RU" sz="2800" dirty="0" smtClean="0">
+                <a:solidFill>
+                  <a:schemeClr val="accent1">
+                    <a:lumMod val="50000"/>
+                  </a:schemeClr>
+                </a:solidFill>
+                <a:latin typeface="Calibri" panose="020F0502020204030204" pitchFamily="34" charset="0"/>
+                <a:ea typeface="Calibri" panose="020F0502020204030204" pitchFamily="34" charset="0"/>
+                <a:cs typeface="Times New Roman" panose="02020603050405020304" pitchFamily="18" charset="0"/>
+              </a:rPr>
+              <a:t>ля неоднозначных случаев</a:t>
+            </a:r>
+            <a:endParaRPr lang="ru-RU" sz="2800" dirty="0">
+              <a:solidFill>
+                <a:schemeClr val="accent1">
+                  <a:lumMod val="50000"/>
+                </a:schemeClr>
+              </a:solidFill>
+              <a:latin typeface="Calibri" panose="020F0502020204030204" pitchFamily="34" charset="0"/>
+              <a:ea typeface="Calibri" panose="020F0502020204030204" pitchFamily="34" charset="0"/>
+              <a:cs typeface="Times New Roman" panose="02020603050405020304" pitchFamily="18" charset="0"/>
+            </a:endParaRPr>
           </a:p>
         </p:txBody>
       </p:sp>
@@ -10152,16 +10584,39 @@
           <a:chExt cx="0" cy="0"/>
         </a:xfrm>
       </p:grpSpPr>
+      <p:pic>
+        <p:nvPicPr>
+          <p:cNvPr id="4" name="Рисунок 6"/>
+          <p:cNvPicPr>
+            <a:picLocks noChangeAspect="1"/>
+          </p:cNvPicPr>
+          <p:nvPr/>
+        </p:nvPicPr>
+        <p:blipFill rotWithShape="1">
+          <a:blip r:embed="rId2"/>
+          <a:srcRect t="1070" b="-1"/>
+          <a:stretch/>
+        </p:blipFill>
+        <p:spPr>
+          <a:xfrm>
+            <a:off x="6406773" y="622980"/>
+            <a:ext cx="4947027" cy="5808796"/>
+          </a:xfrm>
+          <a:prstGeom prst="rect">
+            <a:avLst/>
+          </a:prstGeom>
+        </p:spPr>
+      </p:pic>
       <p:sp>
         <p:nvSpPr>
-          <p:cNvPr id="6" name="Прямоугольник 5"/>
+          <p:cNvPr id="5" name="Прямоугольник 4"/>
           <p:cNvSpPr/>
           <p:nvPr/>
         </p:nvSpPr>
         <p:spPr>
           <a:xfrm>
-            <a:off x="276225" y="1066626"/>
-            <a:ext cx="5067300" cy="3985706"/>
+            <a:off x="516513" y="1839887"/>
+            <a:ext cx="5067300" cy="2379498"/>
           </a:xfrm>
           <a:prstGeom prst="rect">
             <a:avLst/>
@@ -10182,87 +10637,6 @@
               </a:spcAft>
             </a:pPr>
             <a:r>
-              <a:rPr lang="ru-RU" sz="2800" dirty="0">
-                <a:latin typeface="Calibri" panose="020F0502020204030204" pitchFamily="34" charset="0"/>
-                <a:ea typeface="Calibri" panose="020F0502020204030204" pitchFamily="34" charset="0"/>
-                <a:cs typeface="Times New Roman" panose="02020603050405020304" pitchFamily="18" charset="0"/>
-              </a:rPr>
-              <a:t>Дан неориентированный помеченный граф </a:t>
-            </a:r>
-            <a:r>
-              <a:rPr lang="en-US" sz="2800" dirty="0">
-                <a:latin typeface="Calibri" panose="020F0502020204030204" pitchFamily="34" charset="0"/>
-                <a:ea typeface="Calibri" panose="020F0502020204030204" pitchFamily="34" charset="0"/>
-                <a:cs typeface="Times New Roman" panose="02020603050405020304" pitchFamily="18" charset="0"/>
-              </a:rPr>
-              <a:t>G</a:t>
-            </a:r>
-            <a:r>
-              <a:rPr lang="ru-RU" sz="2800" dirty="0">
-                <a:latin typeface="Calibri" panose="020F0502020204030204" pitchFamily="34" charset="0"/>
-                <a:ea typeface="Calibri" panose="020F0502020204030204" pitchFamily="34" charset="0"/>
-                <a:cs typeface="Times New Roman" panose="02020603050405020304" pitchFamily="18" charset="0"/>
-              </a:rPr>
-              <a:t>=(</a:t>
-            </a:r>
-            <a:r>
-              <a:rPr lang="en-US" sz="2800" dirty="0">
-                <a:latin typeface="Calibri" panose="020F0502020204030204" pitchFamily="34" charset="0"/>
-                <a:ea typeface="Calibri" panose="020F0502020204030204" pitchFamily="34" charset="0"/>
-                <a:cs typeface="Times New Roman" panose="02020603050405020304" pitchFamily="18" charset="0"/>
-              </a:rPr>
-              <a:t>V</a:t>
-            </a:r>
-            <a:r>
-              <a:rPr lang="ru-RU" sz="2800" dirty="0">
-                <a:latin typeface="Calibri" panose="020F0502020204030204" pitchFamily="34" charset="0"/>
-                <a:ea typeface="Calibri" panose="020F0502020204030204" pitchFamily="34" charset="0"/>
-                <a:cs typeface="Times New Roman" panose="02020603050405020304" pitchFamily="18" charset="0"/>
-              </a:rPr>
-              <a:t>,</a:t>
-            </a:r>
-            <a:r>
-              <a:rPr lang="en-US" sz="2800" dirty="0">
-                <a:latin typeface="Calibri" panose="020F0502020204030204" pitchFamily="34" charset="0"/>
-                <a:ea typeface="Calibri" panose="020F0502020204030204" pitchFamily="34" charset="0"/>
-                <a:cs typeface="Times New Roman" panose="02020603050405020304" pitchFamily="18" charset="0"/>
-              </a:rPr>
-              <a:t>E</a:t>
-            </a:r>
-            <a:r>
-              <a:rPr lang="ru-RU" sz="2800" dirty="0">
-                <a:latin typeface="Calibri" panose="020F0502020204030204" pitchFamily="34" charset="0"/>
-                <a:ea typeface="Calibri" panose="020F0502020204030204" pitchFamily="34" charset="0"/>
-                <a:cs typeface="Times New Roman" panose="02020603050405020304" pitchFamily="18" charset="0"/>
-              </a:rPr>
-              <a:t>).</a:t>
-            </a:r>
-          </a:p>
-          <a:p>
-            <a:pPr>
-              <a:lnSpc>
-                <a:spcPct val="107000"/>
-              </a:lnSpc>
-              <a:spcAft>
-                <a:spcPts val="800"/>
-              </a:spcAft>
-            </a:pPr>
-            <a:endParaRPr lang="ru-RU" sz="2800" dirty="0">
-              <a:latin typeface="Calibri" panose="020F0502020204030204" pitchFamily="34" charset="0"/>
-              <a:ea typeface="Calibri" panose="020F0502020204030204" pitchFamily="34" charset="0"/>
-              <a:cs typeface="Times New Roman" panose="02020603050405020304" pitchFamily="18" charset="0"/>
-            </a:endParaRPr>
-          </a:p>
-          <a:p>
-            <a:pPr>
-              <a:lnSpc>
-                <a:spcPct val="107000"/>
-              </a:lnSpc>
-              <a:spcAft>
-                <a:spcPts val="800"/>
-              </a:spcAft>
-            </a:pPr>
-            <a:r>
               <a:rPr lang="ru-RU" sz="2800" dirty="0" smtClean="0">
                 <a:solidFill>
                   <a:schemeClr val="accent1">
@@ -10273,34 +10647,49 @@
                 <a:ea typeface="Calibri" panose="020F0502020204030204" pitchFamily="34" charset="0"/>
                 <a:cs typeface="Times New Roman" panose="02020603050405020304" pitchFamily="18" charset="0"/>
               </a:rPr>
-              <a:t>Шаг 1.</a:t>
-            </a:r>
-            <a:r>
-              <a:rPr lang="ru-RU" sz="2800" dirty="0" smtClean="0">
-                <a:latin typeface="Calibri" panose="020F0502020204030204" pitchFamily="34" charset="0"/>
-                <a:ea typeface="Calibri" panose="020F0502020204030204" pitchFamily="34" charset="0"/>
-                <a:cs typeface="Times New Roman" panose="02020603050405020304" pitchFamily="18" charset="0"/>
-              </a:rPr>
-              <a:t/>
-            </a:r>
-            <a:br>
-              <a:rPr lang="ru-RU" sz="2800" dirty="0" smtClean="0">
-                <a:latin typeface="Calibri" panose="020F0502020204030204" pitchFamily="34" charset="0"/>
-                <a:ea typeface="Calibri" panose="020F0502020204030204" pitchFamily="34" charset="0"/>
-                <a:cs typeface="Times New Roman" panose="02020603050405020304" pitchFamily="18" charset="0"/>
-              </a:rPr>
-            </a:br>
+              <a:t>Шаг 1</a:t>
+            </a:r>
+            <a:endParaRPr lang="ru-RU" sz="2800" dirty="0" smtClean="0">
+              <a:latin typeface="Calibri" panose="020F0502020204030204" pitchFamily="34" charset="0"/>
+              <a:ea typeface="Calibri" panose="020F0502020204030204" pitchFamily="34" charset="0"/>
+              <a:cs typeface="Times New Roman" panose="02020603050405020304" pitchFamily="18" charset="0"/>
+            </a:endParaRPr>
+          </a:p>
+          <a:p>
+            <a:pPr marL="457200" indent="-457200">
+              <a:spcAft>
+                <a:spcPts val="800"/>
+              </a:spcAft>
+              <a:buFont typeface="Arial" panose="020B0604020202020204" pitchFamily="34" charset="0"/>
+              <a:buChar char="•"/>
+            </a:pPr>
+            <a:r>
+              <a:rPr lang="ru-RU" sz="2800" dirty="0" smtClean="0"/>
+              <a:t>Находим </a:t>
+            </a:r>
             <a:r>
               <a:rPr lang="ru-RU" sz="2800" dirty="0"/>
-              <a:t>Находим вершину старшей степени</a:t>
-            </a:r>
-            <a:r>
-              <a:rPr lang="en-US" sz="2800" dirty="0"/>
+              <a:t>вершину </a:t>
+            </a:r>
+            <a:r>
+              <a:rPr lang="ru-RU" sz="2800" dirty="0" smtClean="0"/>
+              <a:t>старшей степени </a:t>
+            </a:r>
+            <a:r>
+              <a:rPr lang="en-US" sz="2800" dirty="0" smtClean="0"/>
               <a:t>(</a:t>
             </a:r>
             <a:r>
+              <a:rPr lang="ru-RU" sz="2800" dirty="0" smtClean="0"/>
+              <a:t>максимальная </a:t>
+            </a:r>
+            <a:r>
               <a:rPr lang="ru-RU" sz="2800" dirty="0"/>
-              <a:t>максимальная степень – </a:t>
+              <a:t>степень </a:t>
+            </a:r>
+            <a:r>
+              <a:rPr lang="ru-RU" sz="2800" dirty="0" smtClean="0"/>
+              <a:t>– </a:t>
             </a:r>
             <a:r>
               <a:rPr lang="ru-RU" sz="2800" dirty="0" smtClean="0"/>
@@ -10311,8 +10700,16 @@
               <a:t>)</a:t>
             </a:r>
             <a:r>
+              <a:rPr lang="ru-RU" sz="2800" dirty="0" smtClean="0"/>
+              <a:t>, </a:t>
+            </a:r>
+            <a:r>
               <a:rPr lang="ru-RU" sz="2800" dirty="0"/>
-              <a:t>, нумеруем нулевыми значениями. </a:t>
+              <a:t>нумеруем нулевыми значениями</a:t>
+            </a:r>
+            <a:r>
+              <a:rPr lang="ru-RU" sz="2800" dirty="0" smtClean="0"/>
+              <a:t>.</a:t>
             </a:r>
             <a:endParaRPr lang="ru-RU" sz="2800" dirty="0">
               <a:latin typeface="Calibri" panose="020F0502020204030204" pitchFamily="34" charset="0"/>
@@ -10322,30 +10719,82 @@
           </a:p>
         </p:txBody>
       </p:sp>
-      <p:pic>
-        <p:nvPicPr>
-          <p:cNvPr id="4" name="Рисунок 6"/>
-          <p:cNvPicPr>
-            <a:picLocks noChangeAspect="1"/>
-          </p:cNvPicPr>
+      <p:sp>
+        <p:nvSpPr>
+          <p:cNvPr id="7" name="TextBox 6"/>
+          <p:cNvSpPr txBox="1"/>
           <p:nvPr/>
-        </p:nvPicPr>
-        <p:blipFill>
-          <a:blip r:embed="rId2"/>
-          <a:stretch>
-            <a:fillRect/>
-          </a:stretch>
-        </p:blipFill>
+        </p:nvSpPr>
         <p:spPr>
           <a:xfrm>
-            <a:off x="5987218" y="356291"/>
-            <a:ext cx="4943475" cy="5867400"/>
+            <a:off x="517554" y="622980"/>
+            <a:ext cx="5066259" cy="954107"/>
           </a:xfrm>
           <a:prstGeom prst="rect">
             <a:avLst/>
           </a:prstGeom>
+          <a:noFill/>
         </p:spPr>
-      </p:pic>
+        <p:txBody>
+          <a:bodyPr wrap="none" rtlCol="0">
+            <a:spAutoFit/>
+          </a:bodyPr>
+          <a:lstStyle/>
+          <a:p>
+            <a:r>
+              <a:rPr lang="ru-RU" sz="2800" dirty="0">
+                <a:solidFill>
+                  <a:schemeClr val="accent1">
+                    <a:lumMod val="50000"/>
+                  </a:schemeClr>
+                </a:solidFill>
+                <a:latin typeface="Calibri" panose="020F0502020204030204" pitchFamily="34" charset="0"/>
+                <a:ea typeface="Calibri" panose="020F0502020204030204" pitchFamily="34" charset="0"/>
+                <a:cs typeface="Times New Roman" panose="02020603050405020304" pitchFamily="18" charset="0"/>
+              </a:rPr>
+              <a:t>Идея: </a:t>
+            </a:r>
+            <a:r>
+              <a:rPr lang="ru-RU" sz="2800" dirty="0" smtClean="0">
+                <a:solidFill>
+                  <a:schemeClr val="accent1">
+                    <a:lumMod val="50000"/>
+                  </a:schemeClr>
+                </a:solidFill>
+                <a:latin typeface="Calibri" panose="020F0502020204030204" pitchFamily="34" charset="0"/>
+                <a:ea typeface="Calibri" panose="020F0502020204030204" pitchFamily="34" charset="0"/>
+                <a:cs typeface="Times New Roman" panose="02020603050405020304" pitchFamily="18" charset="0"/>
+              </a:rPr>
+              <a:t>Выделяем опорную точку</a:t>
+            </a:r>
+          </a:p>
+          <a:p>
+            <a:r>
+              <a:rPr lang="ru-RU" sz="2800" dirty="0" smtClean="0">
+                <a:solidFill>
+                  <a:schemeClr val="accent1">
+                    <a:lumMod val="50000"/>
+                  </a:schemeClr>
+                </a:solidFill>
+                <a:latin typeface="Calibri" panose="020F0502020204030204" pitchFamily="34" charset="0"/>
+                <a:ea typeface="Calibri" panose="020F0502020204030204" pitchFamily="34" charset="0"/>
+                <a:cs typeface="Times New Roman" panose="02020603050405020304" pitchFamily="18" charset="0"/>
+              </a:rPr>
+              <a:t>через эвристики</a:t>
+            </a:r>
+            <a:endParaRPr lang="ru-RU" sz="2800" dirty="0">
+              <a:solidFill>
+                <a:schemeClr val="accent1">
+                  <a:lumMod val="50000"/>
+                </a:schemeClr>
+              </a:solidFill>
+              <a:latin typeface="Calibri" panose="020F0502020204030204" pitchFamily="34" charset="0"/>
+              <a:ea typeface="Calibri" panose="020F0502020204030204" pitchFamily="34" charset="0"/>
+              <a:cs typeface="Times New Roman" panose="02020603050405020304" pitchFamily="18" charset="0"/>
+            </a:endParaRPr>
+          </a:p>
+        </p:txBody>
+      </p:sp>
     </p:spTree>
     <p:extLst>
       <p:ext uri="{BB962C8B-B14F-4D97-AF65-F5344CB8AC3E}">
@@ -10383,16 +10832,39 @@
           <a:chExt cx="0" cy="0"/>
         </a:xfrm>
       </p:grpSpPr>
+      <p:pic>
+        <p:nvPicPr>
+          <p:cNvPr id="6" name="Рисунок 5"/>
+          <p:cNvPicPr>
+            <a:picLocks noChangeAspect="1"/>
+          </p:cNvPicPr>
+          <p:nvPr/>
+        </p:nvPicPr>
+        <p:blipFill rotWithShape="1">
+          <a:blip r:embed="rId2"/>
+          <a:srcRect t="3108"/>
+          <a:stretch/>
+        </p:blipFill>
+        <p:spPr>
+          <a:xfrm>
+            <a:off x="6565492" y="622980"/>
+            <a:ext cx="4505325" cy="5758860"/>
+          </a:xfrm>
+          <a:prstGeom prst="rect">
+            <a:avLst/>
+          </a:prstGeom>
+        </p:spPr>
+      </p:pic>
       <p:sp>
         <p:nvSpPr>
-          <p:cNvPr id="3" name="Прямоугольник 2"/>
+          <p:cNvPr id="5" name="Прямоугольник 4"/>
           <p:cNvSpPr/>
           <p:nvPr/>
         </p:nvSpPr>
         <p:spPr>
           <a:xfrm>
-            <a:off x="270319" y="1308778"/>
-            <a:ext cx="5543550" cy="4241546"/>
+            <a:off x="443866" y="1847654"/>
+            <a:ext cx="5171122" cy="4708981"/>
           </a:xfrm>
           <a:prstGeom prst="rect">
             <a:avLst/>
@@ -10405,9 +10877,6 @@
           <a:lstStyle/>
           <a:p>
             <a:pPr lvl="0">
-              <a:lnSpc>
-                <a:spcPct val="107000"/>
-              </a:lnSpc>
               <a:spcAft>
                 <a:spcPts val="800"/>
               </a:spcAft>
@@ -10423,124 +10892,253 @@
                 <a:ea typeface="Calibri" panose="020F0502020204030204" pitchFamily="34" charset="0"/>
                 <a:cs typeface="Times New Roman" panose="02020603050405020304" pitchFamily="18" charset="0"/>
               </a:rPr>
-              <a:t>Шаг 2.</a:t>
+              <a:t>Шаг </a:t>
             </a:r>
             <a:r>
               <a:rPr lang="ru-RU" sz="2800" dirty="0" smtClean="0">
+                <a:solidFill>
+                  <a:schemeClr val="accent1">
+                    <a:lumMod val="50000"/>
+                  </a:schemeClr>
+                </a:solidFill>
                 <a:latin typeface="Calibri" panose="020F0502020204030204" pitchFamily="34" charset="0"/>
                 <a:ea typeface="Calibri" panose="020F0502020204030204" pitchFamily="34" charset="0"/>
                 <a:cs typeface="Times New Roman" panose="02020603050405020304" pitchFamily="18" charset="0"/>
               </a:rPr>
-              <a:t/>
-            </a:r>
-            <a:br>
+              <a:t>2</a:t>
+            </a:r>
+            <a:endParaRPr lang="ru-RU" sz="2800" dirty="0" smtClean="0">
+              <a:latin typeface="Calibri" panose="020F0502020204030204" pitchFamily="34" charset="0"/>
+              <a:ea typeface="Calibri" panose="020F0502020204030204" pitchFamily="34" charset="0"/>
+              <a:cs typeface="Times New Roman" panose="02020603050405020304" pitchFamily="18" charset="0"/>
+            </a:endParaRPr>
+          </a:p>
+          <a:p>
+            <a:pPr marL="457200" lvl="0" indent="-457200">
+              <a:spcAft>
+                <a:spcPts val="800"/>
+              </a:spcAft>
+              <a:buFont typeface="Arial" panose="020B0604020202020204" pitchFamily="34" charset="0"/>
+              <a:buChar char="•"/>
+            </a:pPr>
+            <a:r>
               <a:rPr lang="ru-RU" sz="2800" dirty="0" smtClean="0">
+                <a:ea typeface="Calibri" panose="020F0502020204030204" pitchFamily="34" charset="0"/>
+                <a:cs typeface="Times New Roman" panose="02020603050405020304" pitchFamily="18" charset="0"/>
+              </a:rPr>
+              <a:t>Нумеруем </a:t>
+            </a:r>
+            <a:r>
+              <a:rPr lang="ru-RU" sz="2800" dirty="0" smtClean="0">
+                <a:ea typeface="Calibri" panose="020F0502020204030204" pitchFamily="34" charset="0"/>
+                <a:cs typeface="Times New Roman" panose="02020603050405020304" pitchFamily="18" charset="0"/>
+              </a:rPr>
+              <a:t>смежные вершины </a:t>
+            </a:r>
+            <a:r>
+              <a:rPr lang="ru-RU" sz="2800" i="1" dirty="0" smtClean="0">
+                <a:ea typeface="Calibri" panose="020F0502020204030204" pitchFamily="34" charset="0"/>
+                <a:cs typeface="Times New Roman" panose="02020603050405020304" pitchFamily="18" charset="0"/>
+              </a:rPr>
+              <a:t>(</a:t>
+            </a:r>
+            <a:r>
+              <a:rPr lang="en-US" sz="2800" i="1" dirty="0" smtClean="0">
+                <a:ea typeface="Calibri" panose="020F0502020204030204" pitchFamily="34" charset="0"/>
+                <a:cs typeface="Times New Roman" panose="02020603050405020304" pitchFamily="18" charset="0"/>
+              </a:rPr>
+              <a:t>P</a:t>
+            </a:r>
+            <a:r>
+              <a:rPr lang="ru-RU" sz="2800" i="1" dirty="0" smtClean="0">
+                <a:ea typeface="Calibri" panose="020F0502020204030204" pitchFamily="34" charset="0"/>
+                <a:cs typeface="Times New Roman" panose="02020603050405020304" pitchFamily="18" charset="0"/>
+              </a:rPr>
+              <a:t>)</a:t>
+            </a:r>
+            <a:r>
+              <a:rPr lang="ru-RU" sz="2800" dirty="0" smtClean="0">
+                <a:ea typeface="Calibri" panose="020F0502020204030204" pitchFamily="34" charset="0"/>
+                <a:cs typeface="Times New Roman" panose="02020603050405020304" pitchFamily="18" charset="0"/>
+              </a:rPr>
+              <a:t> </a:t>
+            </a:r>
+            <a:r>
+              <a:rPr lang="ru-RU" sz="2800" dirty="0">
+                <a:ea typeface="Calibri" panose="020F0502020204030204" pitchFamily="34" charset="0"/>
+                <a:cs typeface="Times New Roman" panose="02020603050405020304" pitchFamily="18" charset="0"/>
+              </a:rPr>
+              <a:t>по очереди. </a:t>
+            </a:r>
+            <a:endParaRPr lang="ru-RU" sz="2800" dirty="0" smtClean="0">
+              <a:ea typeface="Calibri" panose="020F0502020204030204" pitchFamily="34" charset="0"/>
+              <a:cs typeface="Times New Roman" panose="02020603050405020304" pitchFamily="18" charset="0"/>
+            </a:endParaRPr>
+          </a:p>
+          <a:p>
+            <a:pPr marL="457200" lvl="0" indent="-457200">
+              <a:spcAft>
+                <a:spcPts val="800"/>
+              </a:spcAft>
+              <a:buFont typeface="Arial" panose="020B0604020202020204" pitchFamily="34" charset="0"/>
+              <a:buChar char="•"/>
+            </a:pPr>
+            <a:r>
+              <a:rPr lang="ru-RU" sz="2800" dirty="0" smtClean="0">
+                <a:ea typeface="Calibri" panose="020F0502020204030204" pitchFamily="34" charset="0"/>
+                <a:cs typeface="Times New Roman" panose="02020603050405020304" pitchFamily="18" charset="0"/>
+              </a:rPr>
+              <a:t>Если </a:t>
+            </a:r>
+            <a:r>
+              <a:rPr lang="ru-RU" sz="2800" dirty="0">
+                <a:ea typeface="Calibri" panose="020F0502020204030204" pitchFamily="34" charset="0"/>
+                <a:cs typeface="Times New Roman" panose="02020603050405020304" pitchFamily="18" charset="0"/>
+              </a:rPr>
+              <a:t>дальнейшая нумерация не удалась, то пробуем поменять координаты вершин местами и запустить нумерацию заново. </a:t>
+            </a:r>
+            <a:endParaRPr lang="ru-RU" sz="2800" dirty="0" smtClean="0">
+              <a:ea typeface="Calibri" panose="020F0502020204030204" pitchFamily="34" charset="0"/>
+              <a:cs typeface="Times New Roman" panose="02020603050405020304" pitchFamily="18" charset="0"/>
+            </a:endParaRPr>
+          </a:p>
+          <a:p>
+            <a:pPr marL="457200" lvl="0" indent="-457200">
+              <a:spcAft>
+                <a:spcPts val="800"/>
+              </a:spcAft>
+              <a:buFont typeface="Arial" panose="020B0604020202020204" pitchFamily="34" charset="0"/>
+              <a:buChar char="•"/>
+            </a:pPr>
+            <a:r>
+              <a:rPr lang="ru-RU" sz="2800" dirty="0">
+                <a:ea typeface="Calibri" panose="020F0502020204030204" pitchFamily="34" charset="0"/>
+                <a:cs typeface="Times New Roman" panose="02020603050405020304" pitchFamily="18" charset="0"/>
+              </a:rPr>
+              <a:t>Д</a:t>
+            </a:r>
+            <a:r>
+              <a:rPr lang="ru-RU" sz="2800" dirty="0" smtClean="0">
+                <a:ea typeface="Calibri" panose="020F0502020204030204" pitchFamily="34" charset="0"/>
+                <a:cs typeface="Times New Roman" panose="02020603050405020304" pitchFamily="18" charset="0"/>
+              </a:rPr>
+              <a:t>о</a:t>
+            </a:r>
+            <a:r>
+              <a:rPr lang="en-US" sz="2800" dirty="0" smtClean="0">
+                <a:ea typeface="Calibri" panose="020F0502020204030204" pitchFamily="34" charset="0"/>
+                <a:cs typeface="Times New Roman" panose="02020603050405020304" pitchFamily="18" charset="0"/>
+              </a:rPr>
+              <a:t> </a:t>
+            </a:r>
+            <a:r>
+              <a:rPr lang="ru-RU" sz="2800" dirty="0" smtClean="0">
+                <a:ea typeface="Calibri" panose="020F0502020204030204" pitchFamily="34" charset="0"/>
+                <a:cs typeface="Times New Roman" panose="02020603050405020304" pitchFamily="18" charset="0"/>
+              </a:rPr>
+              <a:t>720 </a:t>
+            </a:r>
+            <a:r>
+              <a:rPr lang="ru-RU" sz="2800" dirty="0">
+                <a:ea typeface="Calibri" panose="020F0502020204030204" pitchFamily="34" charset="0"/>
+                <a:cs typeface="Times New Roman" panose="02020603050405020304" pitchFamily="18" charset="0"/>
+              </a:rPr>
+              <a:t>вариантов нумераций </a:t>
+            </a:r>
+            <a:r>
+              <a:rPr lang="en-US" sz="2800" i="1" dirty="0">
+                <a:ea typeface="Calibri" panose="020F0502020204030204" pitchFamily="34" charset="0"/>
+                <a:cs typeface="Times New Roman" panose="02020603050405020304" pitchFamily="18" charset="0"/>
+              </a:rPr>
+              <a:t>P</a:t>
+            </a:r>
+            <a:r>
+              <a:rPr lang="ru-RU" sz="2800" dirty="0" smtClean="0">
+                <a:ea typeface="Calibri" panose="020F0502020204030204" pitchFamily="34" charset="0"/>
+                <a:cs typeface="Times New Roman" panose="02020603050405020304" pitchFamily="18" charset="0"/>
+              </a:rPr>
+              <a:t>.</a:t>
+            </a:r>
+            <a:r>
+              <a:rPr lang="ru-RU" sz="2800" dirty="0" smtClean="0"/>
+              <a:t> </a:t>
+            </a:r>
+            <a:endParaRPr lang="ru-RU" sz="2800" dirty="0">
+              <a:ea typeface="Calibri" panose="020F0502020204030204" pitchFamily="34" charset="0"/>
+              <a:cs typeface="Times New Roman" panose="02020603050405020304" pitchFamily="18" charset="0"/>
+            </a:endParaRPr>
+          </a:p>
+        </p:txBody>
+      </p:sp>
+      <p:sp>
+        <p:nvSpPr>
+          <p:cNvPr id="7" name="TextBox 6"/>
+          <p:cNvSpPr txBox="1"/>
+          <p:nvPr/>
+        </p:nvSpPr>
+        <p:spPr>
+          <a:xfrm>
+            <a:off x="517554" y="622980"/>
+            <a:ext cx="6047938" cy="954107"/>
+          </a:xfrm>
+          <a:prstGeom prst="rect">
+            <a:avLst/>
+          </a:prstGeom>
+          <a:noFill/>
+        </p:spPr>
+        <p:txBody>
+          <a:bodyPr wrap="none" rtlCol="0">
+            <a:spAutoFit/>
+          </a:bodyPr>
+          <a:lstStyle/>
+          <a:p>
+            <a:r>
+              <a:rPr lang="ru-RU" sz="2800" dirty="0">
+                <a:solidFill>
+                  <a:schemeClr val="accent1">
+                    <a:lumMod val="50000"/>
+                  </a:schemeClr>
+                </a:solidFill>
                 <a:latin typeface="Calibri" panose="020F0502020204030204" pitchFamily="34" charset="0"/>
                 <a:ea typeface="Calibri" panose="020F0502020204030204" pitchFamily="34" charset="0"/>
                 <a:cs typeface="Times New Roman" panose="02020603050405020304" pitchFamily="18" charset="0"/>
               </a:rPr>
-            </a:br>
-            <a:r>
-              <a:rPr lang="ru-RU" sz="2800" dirty="0">
+              <a:t>Идея: </a:t>
+            </a:r>
+            <a:r>
+              <a:rPr lang="ru-RU" sz="2800" dirty="0" smtClean="0">
+                <a:solidFill>
+                  <a:schemeClr val="accent1">
+                    <a:lumMod val="50000"/>
+                  </a:schemeClr>
+                </a:solidFill>
                 <a:latin typeface="Calibri" panose="020F0502020204030204" pitchFamily="34" charset="0"/>
                 <a:ea typeface="Calibri" panose="020F0502020204030204" pitchFamily="34" charset="0"/>
                 <a:cs typeface="Times New Roman" panose="02020603050405020304" pitchFamily="18" charset="0"/>
               </a:rPr>
-              <a:t>Нумеруем смежные вершины </a:t>
-            </a:r>
-            <a:r>
-              <a:rPr lang="ru-RU" sz="2800" i="1" dirty="0">
+              <a:t>Пытаемся задать координатную</a:t>
+            </a:r>
+          </a:p>
+          <a:p>
+            <a:r>
+              <a:rPr lang="ru-RU" sz="2800" dirty="0" smtClean="0">
+                <a:solidFill>
+                  <a:schemeClr val="accent1">
+                    <a:lumMod val="50000"/>
+                  </a:schemeClr>
+                </a:solidFill>
                 <a:latin typeface="Calibri" panose="020F0502020204030204" pitchFamily="34" charset="0"/>
                 <a:ea typeface="Calibri" panose="020F0502020204030204" pitchFamily="34" charset="0"/>
                 <a:cs typeface="Times New Roman" panose="02020603050405020304" pitchFamily="18" charset="0"/>
               </a:rPr>
-              <a:t>(</a:t>
-            </a:r>
-            <a:r>
-              <a:rPr lang="en-US" sz="2800" i="1" dirty="0">
-                <a:latin typeface="Calibri" panose="020F0502020204030204" pitchFamily="34" charset="0"/>
-                <a:ea typeface="Calibri" panose="020F0502020204030204" pitchFamily="34" charset="0"/>
-                <a:cs typeface="Times New Roman" panose="02020603050405020304" pitchFamily="18" charset="0"/>
-              </a:rPr>
-              <a:t>P</a:t>
-            </a:r>
-            <a:r>
-              <a:rPr lang="ru-RU" sz="2800" i="1" dirty="0">
-                <a:latin typeface="Calibri" panose="020F0502020204030204" pitchFamily="34" charset="0"/>
-                <a:ea typeface="Calibri" panose="020F0502020204030204" pitchFamily="34" charset="0"/>
-                <a:cs typeface="Times New Roman" panose="02020603050405020304" pitchFamily="18" charset="0"/>
-              </a:rPr>
-              <a:t>)</a:t>
-            </a:r>
-            <a:r>
-              <a:rPr lang="ru-RU" sz="2800" dirty="0">
-                <a:latin typeface="Calibri" panose="020F0502020204030204" pitchFamily="34" charset="0"/>
-                <a:ea typeface="Calibri" panose="020F0502020204030204" pitchFamily="34" charset="0"/>
-                <a:cs typeface="Times New Roman" panose="02020603050405020304" pitchFamily="18" charset="0"/>
-              </a:rPr>
-              <a:t> по очереди. Если дальнейшая нумерация не удалась, то пробуем поменять координаты вершин местами и запустить нумерацию заново. Для </a:t>
-            </a:r>
-            <a:r>
-              <a:rPr lang="ru-RU" sz="2800" dirty="0" smtClean="0">
-                <a:latin typeface="Calibri" panose="020F0502020204030204" pitchFamily="34" charset="0"/>
-                <a:ea typeface="Calibri" panose="020F0502020204030204" pitchFamily="34" charset="0"/>
-                <a:cs typeface="Times New Roman" panose="02020603050405020304" pitchFamily="18" charset="0"/>
-              </a:rPr>
-              <a:t>3-хмерного </a:t>
-            </a:r>
-            <a:r>
-              <a:rPr lang="ru-RU" sz="2800" dirty="0">
-                <a:latin typeface="Calibri" panose="020F0502020204030204" pitchFamily="34" charset="0"/>
-                <a:ea typeface="Calibri" panose="020F0502020204030204" pitchFamily="34" charset="0"/>
-                <a:cs typeface="Times New Roman" panose="02020603050405020304" pitchFamily="18" charset="0"/>
-              </a:rPr>
-              <a:t>случая будет до</a:t>
-            </a:r>
-            <a:r>
-              <a:rPr lang="en-US" sz="2800" dirty="0">
-                <a:latin typeface="Calibri" panose="020F0502020204030204" pitchFamily="34" charset="0"/>
-                <a:ea typeface="Calibri" panose="020F0502020204030204" pitchFamily="34" charset="0"/>
-                <a:cs typeface="Times New Roman" panose="02020603050405020304" pitchFamily="18" charset="0"/>
-              </a:rPr>
-              <a:t> </a:t>
-            </a:r>
-            <a:r>
-              <a:rPr lang="ru-RU" sz="2800" dirty="0" smtClean="0">
-                <a:latin typeface="Calibri" panose="020F0502020204030204" pitchFamily="34" charset="0"/>
-                <a:ea typeface="Calibri" panose="020F0502020204030204" pitchFamily="34" charset="0"/>
-                <a:cs typeface="Times New Roman" panose="02020603050405020304" pitchFamily="18" charset="0"/>
-              </a:rPr>
-              <a:t>720 </a:t>
-            </a:r>
-            <a:r>
-              <a:rPr lang="ru-RU" sz="2800" dirty="0">
-                <a:latin typeface="Calibri" panose="020F0502020204030204" pitchFamily="34" charset="0"/>
-                <a:ea typeface="Calibri" panose="020F0502020204030204" pitchFamily="34" charset="0"/>
-                <a:cs typeface="Times New Roman" panose="02020603050405020304" pitchFamily="18" charset="0"/>
-              </a:rPr>
-              <a:t>вариантов нумераций </a:t>
-            </a:r>
-            <a:r>
-              <a:rPr lang="en-US" sz="2800" i="1" dirty="0">
-                <a:latin typeface="Calibri" panose="020F0502020204030204" pitchFamily="34" charset="0"/>
-                <a:ea typeface="Calibri" panose="020F0502020204030204" pitchFamily="34" charset="0"/>
-                <a:cs typeface="Times New Roman" panose="02020603050405020304" pitchFamily="18" charset="0"/>
-              </a:rPr>
-              <a:t>P</a:t>
-            </a:r>
-            <a:r>
-              <a:rPr lang="ru-RU" sz="2800" dirty="0">
-                <a:latin typeface="Calibri" panose="020F0502020204030204" pitchFamily="34" charset="0"/>
-                <a:ea typeface="Calibri" panose="020F0502020204030204" pitchFamily="34" charset="0"/>
-                <a:cs typeface="Times New Roman" panose="02020603050405020304" pitchFamily="18" charset="0"/>
-              </a:rPr>
-              <a:t>.</a:t>
-            </a:r>
-            <a:r>
-              <a:rPr lang="ru-RU" sz="2800" dirty="0"/>
-              <a:t> </a:t>
+              <a:t>систему</a:t>
             </a:r>
             <a:endParaRPr lang="ru-RU" sz="2800" dirty="0">
+              <a:solidFill>
+                <a:schemeClr val="accent1">
+                  <a:lumMod val="50000"/>
+                </a:schemeClr>
+              </a:solidFill>
               <a:latin typeface="Calibri" panose="020F0502020204030204" pitchFamily="34" charset="0"/>
               <a:ea typeface="Calibri" panose="020F0502020204030204" pitchFamily="34" charset="0"/>
               <a:cs typeface="Times New Roman" panose="02020603050405020304" pitchFamily="18" charset="0"/>
@@ -10548,30 +11146,6 @@
           </a:p>
         </p:txBody>
       </p:sp>
-      <p:pic>
-        <p:nvPicPr>
-          <p:cNvPr id="6" name="Рисунок 5"/>
-          <p:cNvPicPr>
-            <a:picLocks noChangeAspect="1"/>
-          </p:cNvPicPr>
-          <p:nvPr/>
-        </p:nvPicPr>
-        <p:blipFill>
-          <a:blip r:embed="rId2"/>
-          <a:stretch>
-            <a:fillRect/>
-          </a:stretch>
-        </p:blipFill>
-        <p:spPr>
-          <a:xfrm>
-            <a:off x="6165913" y="219456"/>
-            <a:ext cx="4505325" cy="5943600"/>
-          </a:xfrm>
-          <a:prstGeom prst="rect">
-            <a:avLst/>
-          </a:prstGeom>
-        </p:spPr>
-      </p:pic>
     </p:spTree>
     <p:extLst>
       <p:ext uri="{BB962C8B-B14F-4D97-AF65-F5344CB8AC3E}">
@@ -10609,16 +11183,39 @@
           <a:chExt cx="0" cy="0"/>
         </a:xfrm>
       </p:grpSpPr>
+      <p:pic>
+        <p:nvPicPr>
+          <p:cNvPr id="4" name="Рисунок 3"/>
+          <p:cNvPicPr>
+            <a:picLocks noChangeAspect="1"/>
+          </p:cNvPicPr>
+          <p:nvPr/>
+        </p:nvPicPr>
+        <p:blipFill rotWithShape="1">
+          <a:blip r:embed="rId2"/>
+          <a:srcRect t="2898"/>
+          <a:stretch/>
+        </p:blipFill>
+        <p:spPr>
+          <a:xfrm>
+            <a:off x="6250305" y="622980"/>
+            <a:ext cx="5372100" cy="5678850"/>
+          </a:xfrm>
+          <a:prstGeom prst="rect">
+            <a:avLst/>
+          </a:prstGeom>
+        </p:spPr>
+      </p:pic>
       <p:sp>
         <p:nvSpPr>
-          <p:cNvPr id="2" name="Прямоугольник 1"/>
+          <p:cNvPr id="6" name="Прямоугольник 5"/>
           <p:cNvSpPr/>
           <p:nvPr/>
         </p:nvSpPr>
         <p:spPr>
           <a:xfrm>
-            <a:off x="226337" y="984175"/>
-            <a:ext cx="5688688" cy="4401205"/>
+            <a:off x="517554" y="1870544"/>
+            <a:ext cx="5413972" cy="4832092"/>
           </a:xfrm>
           <a:prstGeom prst="rect">
             <a:avLst/>
@@ -10641,82 +11238,167 @@
                 <a:ea typeface="Calibri" panose="020F0502020204030204" pitchFamily="34" charset="0"/>
                 <a:cs typeface="Times New Roman" panose="02020603050405020304" pitchFamily="18" charset="0"/>
               </a:rPr>
-              <a:t>Шаг 3.</a:t>
+              <a:t>Шаг </a:t>
             </a:r>
             <a:r>
               <a:rPr lang="ru-RU" sz="2800" dirty="0" smtClean="0">
+                <a:solidFill>
+                  <a:schemeClr val="accent1">
+                    <a:lumMod val="50000"/>
+                  </a:schemeClr>
+                </a:solidFill>
                 <a:latin typeface="Calibri" panose="020F0502020204030204" pitchFamily="34" charset="0"/>
                 <a:ea typeface="Calibri" panose="020F0502020204030204" pitchFamily="34" charset="0"/>
                 <a:cs typeface="Times New Roman" panose="02020603050405020304" pitchFamily="18" charset="0"/>
               </a:rPr>
-              <a:t/>
-            </a:r>
-            <a:br>
-              <a:rPr lang="ru-RU" sz="2800" dirty="0" smtClean="0">
+              <a:t>3</a:t>
+            </a:r>
+            <a:endParaRPr lang="ru-RU" sz="2800" dirty="0" smtClean="0">
+              <a:latin typeface="Calibri" panose="020F0502020204030204" pitchFamily="34" charset="0"/>
+              <a:ea typeface="Calibri" panose="020F0502020204030204" pitchFamily="34" charset="0"/>
+              <a:cs typeface="Times New Roman" panose="02020603050405020304" pitchFamily="18" charset="0"/>
+            </a:endParaRPr>
+          </a:p>
+          <a:p>
+            <a:pPr marL="457200" indent="-457200">
+              <a:buFont typeface="Arial" panose="020B0604020202020204" pitchFamily="34" charset="0"/>
+              <a:buChar char="•"/>
+            </a:pPr>
+            <a:r>
+              <a:rPr lang="ru-RU" sz="2800" dirty="0" smtClean="0"/>
+              <a:t>Нумеруем </a:t>
+            </a:r>
+            <a:r>
+              <a:rPr lang="ru-RU" sz="2800" dirty="0"/>
+              <a:t>смежные вершины от </a:t>
+            </a:r>
+            <a:r>
+              <a:rPr lang="en-US" sz="2800" i="1" dirty="0"/>
+              <a:t>P</a:t>
+            </a:r>
+            <a:r>
+              <a:rPr lang="ru-RU" sz="2800" dirty="0"/>
+              <a:t> по </a:t>
+            </a:r>
+            <a:r>
+              <a:rPr lang="ru-RU" sz="2800" dirty="0" smtClean="0"/>
+              <a:t>очереди.</a:t>
+            </a:r>
+          </a:p>
+          <a:p>
+            <a:pPr marL="457200" indent="-457200">
+              <a:buFont typeface="Arial" panose="020B0604020202020204" pitchFamily="34" charset="0"/>
+              <a:buChar char="•"/>
+            </a:pPr>
+            <a:r>
+              <a:rPr lang="ru-RU" sz="2800" dirty="0" smtClean="0"/>
+              <a:t>Однозначно разрешимые случаи:</a:t>
+            </a:r>
+            <a:endParaRPr lang="ru-RU" sz="2800" dirty="0"/>
+          </a:p>
+          <a:p>
+            <a:pPr marL="914400" lvl="1" indent="-457200">
+              <a:buFont typeface="Arial" panose="020B0604020202020204" pitchFamily="34" charset="0"/>
+              <a:buChar char="•"/>
+            </a:pPr>
+            <a:r>
+              <a:rPr lang="ru-RU" sz="2800" dirty="0"/>
+              <a:t>Два и более соседей имеют индекс.</a:t>
+            </a:r>
+          </a:p>
+          <a:p>
+            <a:pPr marL="914400" lvl="1" indent="-457200">
+              <a:buFont typeface="Arial" panose="020B0604020202020204" pitchFamily="34" charset="0"/>
+              <a:buChar char="•"/>
+            </a:pPr>
+            <a:r>
+              <a:rPr lang="ru-RU" sz="2800" dirty="0"/>
+              <a:t>Один из соседей не имеет непронумерованных соседей кроме текущей вершины</a:t>
+            </a:r>
+            <a:r>
+              <a:rPr lang="ru-RU" sz="2800" dirty="0" smtClean="0"/>
+              <a:t>.</a:t>
+            </a:r>
+            <a:endParaRPr lang="ru-RU" sz="2800" dirty="0"/>
+          </a:p>
+        </p:txBody>
+      </p:sp>
+      <p:sp>
+        <p:nvSpPr>
+          <p:cNvPr id="7" name="TextBox 6"/>
+          <p:cNvSpPr txBox="1"/>
+          <p:nvPr/>
+        </p:nvSpPr>
+        <p:spPr>
+          <a:xfrm>
+            <a:off x="517554" y="622980"/>
+            <a:ext cx="6689652" cy="954107"/>
+          </a:xfrm>
+          <a:prstGeom prst="rect">
+            <a:avLst/>
+          </a:prstGeom>
+          <a:noFill/>
+        </p:spPr>
+        <p:txBody>
+          <a:bodyPr wrap="none" rtlCol="0">
+            <a:spAutoFit/>
+          </a:bodyPr>
+          <a:lstStyle/>
+          <a:p>
+            <a:r>
+              <a:rPr lang="ru-RU" sz="2800" dirty="0">
+                <a:solidFill>
+                  <a:schemeClr val="accent1">
+                    <a:lumMod val="50000"/>
+                  </a:schemeClr>
+                </a:solidFill>
                 <a:latin typeface="Calibri" panose="020F0502020204030204" pitchFamily="34" charset="0"/>
                 <a:ea typeface="Calibri" panose="020F0502020204030204" pitchFamily="34" charset="0"/>
                 <a:cs typeface="Times New Roman" panose="02020603050405020304" pitchFamily="18" charset="0"/>
               </a:rPr>
-            </a:br>
-            <a:r>
-              <a:rPr lang="ru-RU" sz="2800" dirty="0"/>
-              <a:t>Нумеруем смежные вершины от </a:t>
-            </a:r>
-            <a:r>
-              <a:rPr lang="en-US" sz="2800" i="1" dirty="0"/>
-              <a:t>P</a:t>
-            </a:r>
-            <a:r>
-              <a:rPr lang="ru-RU" sz="2800" dirty="0"/>
-              <a:t> по очереди. Есть два случая, когда мы можем однозначно поставить индекс для вершины:</a:t>
-            </a:r>
-          </a:p>
-          <a:p>
-            <a:pPr marL="457200" lvl="0" indent="-457200">
-              <a:buFont typeface="Arial" panose="020B0604020202020204" pitchFamily="34" charset="0"/>
-              <a:buChar char="•"/>
-            </a:pPr>
-            <a:r>
-              <a:rPr lang="ru-RU" sz="2800" dirty="0"/>
-              <a:t>Два и более соседей имеют индекс.</a:t>
-            </a:r>
-          </a:p>
-          <a:p>
-            <a:pPr marL="457200" lvl="0" indent="-457200">
-              <a:buFont typeface="Arial" panose="020B0604020202020204" pitchFamily="34" charset="0"/>
-              <a:buChar char="•"/>
-            </a:pPr>
-            <a:r>
-              <a:rPr lang="ru-RU" sz="2800" dirty="0"/>
-              <a:t>Один из соседей не имеет непронумерованных соседей кроме текущей вершины.</a:t>
-            </a:r>
+              <a:t>Идея: </a:t>
+            </a:r>
+            <a:r>
+              <a:rPr lang="ru-RU" sz="2800" dirty="0" smtClean="0">
+                <a:solidFill>
+                  <a:schemeClr val="accent1">
+                    <a:lumMod val="50000"/>
+                  </a:schemeClr>
+                </a:solidFill>
+                <a:latin typeface="Calibri" panose="020F0502020204030204" pitchFamily="34" charset="0"/>
+                <a:ea typeface="Calibri" panose="020F0502020204030204" pitchFamily="34" charset="0"/>
+                <a:cs typeface="Times New Roman" panose="02020603050405020304" pitchFamily="18" charset="0"/>
+              </a:rPr>
+              <a:t>Нумеруем однозначно разрешимые</a:t>
+            </a:r>
+          </a:p>
+          <a:p>
+            <a:r>
+              <a:rPr lang="ru-RU" sz="2800" dirty="0" smtClean="0">
+                <a:solidFill>
+                  <a:schemeClr val="accent1">
+                    <a:lumMod val="50000"/>
+                  </a:schemeClr>
+                </a:solidFill>
+                <a:latin typeface="Calibri" panose="020F0502020204030204" pitchFamily="34" charset="0"/>
+                <a:ea typeface="Calibri" panose="020F0502020204030204" pitchFamily="34" charset="0"/>
+                <a:cs typeface="Times New Roman" panose="02020603050405020304" pitchFamily="18" charset="0"/>
+              </a:rPr>
+              <a:t>случаи</a:t>
+            </a:r>
+            <a:endParaRPr lang="ru-RU" sz="2800" dirty="0">
+              <a:solidFill>
+                <a:schemeClr val="accent1">
+                  <a:lumMod val="50000"/>
+                </a:schemeClr>
+              </a:solidFill>
+              <a:latin typeface="Calibri" panose="020F0502020204030204" pitchFamily="34" charset="0"/>
+              <a:ea typeface="Calibri" panose="020F0502020204030204" pitchFamily="34" charset="0"/>
+              <a:cs typeface="Times New Roman" panose="02020603050405020304" pitchFamily="18" charset="0"/>
+            </a:endParaRPr>
           </a:p>
         </p:txBody>
       </p:sp>
-      <p:pic>
-        <p:nvPicPr>
-          <p:cNvPr id="4" name="Рисунок 3"/>
-          <p:cNvPicPr>
-            <a:picLocks noChangeAspect="1"/>
-          </p:cNvPicPr>
-          <p:nvPr/>
-        </p:nvPicPr>
-        <p:blipFill>
-          <a:blip r:embed="rId2"/>
-          <a:stretch>
-            <a:fillRect/>
-          </a:stretch>
-        </p:blipFill>
-        <p:spPr>
-          <a:xfrm>
-            <a:off x="5915025" y="565173"/>
-            <a:ext cx="5372100" cy="5848350"/>
-          </a:xfrm>
-          <a:prstGeom prst="rect">
-            <a:avLst/>
-          </a:prstGeom>
-        </p:spPr>
-      </p:pic>
     </p:spTree>
     <p:extLst>
       <p:ext uri="{BB962C8B-B14F-4D97-AF65-F5344CB8AC3E}">
@@ -10841,105 +11523,6 @@
           <a:chExt cx="0" cy="0"/>
         </a:xfrm>
       </p:grpSpPr>
-      <p:sp>
-        <p:nvSpPr>
-          <p:cNvPr id="2" name="Прямоугольник 1"/>
-          <p:cNvSpPr/>
-          <p:nvPr/>
-        </p:nvSpPr>
-        <p:spPr>
-          <a:xfrm>
-            <a:off x="235391" y="1080646"/>
-            <a:ext cx="5844464" cy="4832092"/>
-          </a:xfrm>
-          <a:prstGeom prst="rect">
-            <a:avLst/>
-          </a:prstGeom>
-        </p:spPr>
-        <p:txBody>
-          <a:bodyPr wrap="square">
-            <a:spAutoFit/>
-          </a:bodyPr>
-          <a:lstStyle/>
-          <a:p>
-            <a:pPr lvl="0"/>
-            <a:r>
-              <a:rPr lang="ru-RU" sz="2800" dirty="0" smtClean="0">
-                <a:solidFill>
-                  <a:schemeClr val="accent1">
-                    <a:lumMod val="50000"/>
-                  </a:schemeClr>
-                </a:solidFill>
-                <a:latin typeface="Calibri" panose="020F0502020204030204" pitchFamily="34" charset="0"/>
-                <a:ea typeface="Calibri" panose="020F0502020204030204" pitchFamily="34" charset="0"/>
-                <a:cs typeface="Times New Roman" panose="02020603050405020304" pitchFamily="18" charset="0"/>
-              </a:rPr>
-              <a:t>Шаг 4.</a:t>
-            </a:r>
-            <a:r>
-              <a:rPr lang="ru-RU" sz="2800" dirty="0">
-                <a:latin typeface="Calibri" panose="020F0502020204030204" pitchFamily="34" charset="0"/>
-                <a:ea typeface="Calibri" panose="020F0502020204030204" pitchFamily="34" charset="0"/>
-                <a:cs typeface="Times New Roman" panose="02020603050405020304" pitchFamily="18" charset="0"/>
-              </a:rPr>
-              <a:t/>
-            </a:r>
-            <a:br>
-              <a:rPr lang="ru-RU" sz="2800" dirty="0">
-                <a:latin typeface="Calibri" panose="020F0502020204030204" pitchFamily="34" charset="0"/>
-                <a:ea typeface="Calibri" panose="020F0502020204030204" pitchFamily="34" charset="0"/>
-                <a:cs typeface="Times New Roman" panose="02020603050405020304" pitchFamily="18" charset="0"/>
-              </a:rPr>
-            </a:br>
-            <a:r>
-              <a:rPr lang="ru-RU" sz="2800" dirty="0" smtClean="0"/>
-              <a:t>Для остальных вершин рекурсивно </a:t>
-            </a:r>
-            <a:r>
-              <a:rPr lang="ru-RU" sz="2800" dirty="0"/>
-              <a:t>перебираем все возможные индексы:</a:t>
-            </a:r>
-          </a:p>
-          <a:p>
-            <a:pPr marL="457200" lvl="0" indent="-457200">
-              <a:buFont typeface="Arial" panose="020B0604020202020204" pitchFamily="34" charset="0"/>
-              <a:buChar char="•"/>
-            </a:pPr>
-            <a:r>
-              <a:rPr lang="ru-RU" sz="2800" dirty="0"/>
-              <a:t>Ставим один из возможных индексов.</a:t>
-            </a:r>
-          </a:p>
-          <a:p>
-            <a:pPr marL="457200" lvl="0" indent="-457200">
-              <a:buFont typeface="Arial" panose="020B0604020202020204" pitchFamily="34" charset="0"/>
-              <a:buChar char="•"/>
-            </a:pPr>
-            <a:r>
-              <a:rPr lang="ru-RU" sz="2800" dirty="0"/>
-              <a:t>Повторяем алгоритм</a:t>
-            </a:r>
-            <a:r>
-              <a:rPr lang="en-US" sz="2800" dirty="0"/>
-              <a:t> </a:t>
-            </a:r>
-            <a:r>
-              <a:rPr lang="ru-RU" sz="2800" dirty="0"/>
-              <a:t>для смежных вершин.</a:t>
-            </a:r>
-          </a:p>
-          <a:p>
-            <a:pPr marL="457200" lvl="0" indent="-457200">
-              <a:buFont typeface="Arial" panose="020B0604020202020204" pitchFamily="34" charset="0"/>
-              <a:buChar char="•"/>
-            </a:pPr>
-            <a:r>
-              <a:rPr lang="ru-RU" sz="2800" dirty="0"/>
-              <a:t>Если не удалось пронумеровать, то возвращаемся, меняем индекс и проходим заново.</a:t>
-            </a:r>
-          </a:p>
-        </p:txBody>
-      </p:sp>
       <p:pic>
         <p:nvPicPr>
           <p:cNvPr id="3" name="Рисунок 2"/>
@@ -10956,7 +11539,7 @@
         </p:blipFill>
         <p:spPr>
           <a:xfrm>
-            <a:off x="6552057" y="708505"/>
+            <a:off x="6323457" y="622980"/>
             <a:ext cx="5086350" cy="5800725"/>
           </a:xfrm>
           <a:prstGeom prst="rect">
@@ -10964,6 +11547,206 @@
           </a:prstGeom>
         </p:spPr>
       </p:pic>
+      <p:sp>
+        <p:nvSpPr>
+          <p:cNvPr id="5" name="Прямоугольник 4"/>
+          <p:cNvSpPr/>
+          <p:nvPr/>
+        </p:nvSpPr>
+        <p:spPr>
+          <a:xfrm>
+            <a:off x="517554" y="1914316"/>
+            <a:ext cx="5078574" cy="3539430"/>
+          </a:xfrm>
+          <a:prstGeom prst="rect">
+            <a:avLst/>
+          </a:prstGeom>
+        </p:spPr>
+        <p:txBody>
+          <a:bodyPr wrap="square">
+            <a:spAutoFit/>
+          </a:bodyPr>
+          <a:lstStyle/>
+          <a:p>
+            <a:pPr lvl="0"/>
+            <a:r>
+              <a:rPr lang="ru-RU" sz="2800" dirty="0" smtClean="0">
+                <a:solidFill>
+                  <a:schemeClr val="accent1">
+                    <a:lumMod val="50000"/>
+                  </a:schemeClr>
+                </a:solidFill>
+                <a:latin typeface="Calibri" panose="020F0502020204030204" pitchFamily="34" charset="0"/>
+                <a:ea typeface="Calibri" panose="020F0502020204030204" pitchFamily="34" charset="0"/>
+                <a:cs typeface="Times New Roman" panose="02020603050405020304" pitchFamily="18" charset="0"/>
+              </a:rPr>
+              <a:t>Шаг </a:t>
+            </a:r>
+            <a:r>
+              <a:rPr lang="ru-RU" sz="2800" dirty="0" smtClean="0">
+                <a:solidFill>
+                  <a:schemeClr val="accent1">
+                    <a:lumMod val="50000"/>
+                  </a:schemeClr>
+                </a:solidFill>
+                <a:latin typeface="Calibri" panose="020F0502020204030204" pitchFamily="34" charset="0"/>
+                <a:ea typeface="Calibri" panose="020F0502020204030204" pitchFamily="34" charset="0"/>
+                <a:cs typeface="Times New Roman" panose="02020603050405020304" pitchFamily="18" charset="0"/>
+              </a:rPr>
+              <a:t>4</a:t>
+            </a:r>
+            <a:endParaRPr lang="ru-RU" sz="2800" dirty="0" smtClean="0">
+              <a:latin typeface="Calibri" panose="020F0502020204030204" pitchFamily="34" charset="0"/>
+              <a:ea typeface="Calibri" panose="020F0502020204030204" pitchFamily="34" charset="0"/>
+              <a:cs typeface="Times New Roman" panose="02020603050405020304" pitchFamily="18" charset="0"/>
+            </a:endParaRPr>
+          </a:p>
+          <a:p>
+            <a:pPr marL="457200" lvl="0" indent="-457200">
+              <a:buFont typeface="Arial" panose="020B0604020202020204" pitchFamily="34" charset="0"/>
+              <a:buChar char="•"/>
+            </a:pPr>
+            <a:r>
+              <a:rPr lang="ru-RU" sz="2800" dirty="0" smtClean="0"/>
+              <a:t>Для </a:t>
+            </a:r>
+            <a:r>
+              <a:rPr lang="ru-RU" sz="2800" dirty="0"/>
+              <a:t>остальных вершин </a:t>
+            </a:r>
+            <a:r>
+              <a:rPr lang="ru-RU" sz="2800" dirty="0" smtClean="0"/>
+              <a:t>рекурсивно </a:t>
+            </a:r>
+            <a:r>
+              <a:rPr lang="ru-RU" sz="2800" dirty="0"/>
+              <a:t>перебираем все возможные индексы:</a:t>
+            </a:r>
+          </a:p>
+          <a:p>
+            <a:pPr marL="914400" lvl="1" indent="-457200">
+              <a:buFont typeface="Arial" panose="020B0604020202020204" pitchFamily="34" charset="0"/>
+              <a:buChar char="•"/>
+            </a:pPr>
+            <a:r>
+              <a:rPr lang="ru-RU" sz="2800" dirty="0"/>
+              <a:t>Ставим один из возможных индексов.</a:t>
+            </a:r>
+          </a:p>
+          <a:p>
+            <a:pPr marL="914400" lvl="1" indent="-457200">
+              <a:buFont typeface="Arial" panose="020B0604020202020204" pitchFamily="34" charset="0"/>
+              <a:buChar char="•"/>
+            </a:pPr>
+            <a:r>
+              <a:rPr lang="ru-RU" sz="2800" dirty="0"/>
+              <a:t>Повторяем алгоритм</a:t>
+            </a:r>
+            <a:r>
+              <a:rPr lang="en-US" sz="2800" dirty="0"/>
+              <a:t> </a:t>
+            </a:r>
+            <a:r>
+              <a:rPr lang="ru-RU" sz="2800" dirty="0"/>
+              <a:t>для смежных вершин</a:t>
+            </a:r>
+            <a:r>
+              <a:rPr lang="ru-RU" sz="2800" dirty="0" smtClean="0"/>
+              <a:t>.</a:t>
+            </a:r>
+            <a:endParaRPr lang="ru-RU" sz="2800" dirty="0"/>
+          </a:p>
+        </p:txBody>
+      </p:sp>
+      <p:sp>
+        <p:nvSpPr>
+          <p:cNvPr id="6" name="TextBox 5"/>
+          <p:cNvSpPr txBox="1"/>
+          <p:nvPr/>
+        </p:nvSpPr>
+        <p:spPr>
+          <a:xfrm>
+            <a:off x="517554" y="622980"/>
+            <a:ext cx="6415795" cy="954107"/>
+          </a:xfrm>
+          <a:prstGeom prst="rect">
+            <a:avLst/>
+          </a:prstGeom>
+          <a:noFill/>
+        </p:spPr>
+        <p:txBody>
+          <a:bodyPr wrap="none" rtlCol="0">
+            <a:spAutoFit/>
+          </a:bodyPr>
+          <a:lstStyle/>
+          <a:p>
+            <a:r>
+              <a:rPr lang="ru-RU" sz="2800" dirty="0">
+                <a:solidFill>
+                  <a:schemeClr val="accent1">
+                    <a:lumMod val="50000"/>
+                  </a:schemeClr>
+                </a:solidFill>
+                <a:latin typeface="Calibri" panose="020F0502020204030204" pitchFamily="34" charset="0"/>
+                <a:ea typeface="Calibri" panose="020F0502020204030204" pitchFamily="34" charset="0"/>
+                <a:cs typeface="Times New Roman" panose="02020603050405020304" pitchFamily="18" charset="0"/>
+              </a:rPr>
+              <a:t>Идея: </a:t>
+            </a:r>
+            <a:r>
+              <a:rPr lang="ru-RU" sz="2800" dirty="0" smtClean="0">
+                <a:solidFill>
+                  <a:schemeClr val="accent1">
+                    <a:lumMod val="50000"/>
+                  </a:schemeClr>
+                </a:solidFill>
+                <a:latin typeface="Calibri" panose="020F0502020204030204" pitchFamily="34" charset="0"/>
+                <a:ea typeface="Calibri" panose="020F0502020204030204" pitchFamily="34" charset="0"/>
+                <a:cs typeface="Times New Roman" panose="02020603050405020304" pitchFamily="18" charset="0"/>
+              </a:rPr>
+              <a:t>Перебираем варианты нумерации</a:t>
+            </a:r>
+          </a:p>
+          <a:p>
+            <a:r>
+              <a:rPr lang="ru-RU" sz="2800" dirty="0">
+                <a:solidFill>
+                  <a:schemeClr val="accent1">
+                    <a:lumMod val="50000"/>
+                  </a:schemeClr>
+                </a:solidFill>
+                <a:latin typeface="Calibri" panose="020F0502020204030204" pitchFamily="34" charset="0"/>
+                <a:ea typeface="Calibri" panose="020F0502020204030204" pitchFamily="34" charset="0"/>
+                <a:cs typeface="Times New Roman" panose="02020603050405020304" pitchFamily="18" charset="0"/>
+              </a:rPr>
+              <a:t>д</a:t>
+            </a:r>
+            <a:r>
+              <a:rPr lang="ru-RU" sz="2800" dirty="0" smtClean="0">
+                <a:solidFill>
+                  <a:schemeClr val="accent1">
+                    <a:lumMod val="50000"/>
+                  </a:schemeClr>
+                </a:solidFill>
+                <a:latin typeface="Calibri" panose="020F0502020204030204" pitchFamily="34" charset="0"/>
+                <a:ea typeface="Calibri" panose="020F0502020204030204" pitchFamily="34" charset="0"/>
+                <a:cs typeface="Times New Roman" panose="02020603050405020304" pitchFamily="18" charset="0"/>
+              </a:rPr>
+              <a:t>ля неоднозначных случаев</a:t>
+            </a:r>
+            <a:endParaRPr lang="ru-RU" sz="2800" dirty="0">
+              <a:solidFill>
+                <a:schemeClr val="accent1">
+                  <a:lumMod val="50000"/>
+                </a:schemeClr>
+              </a:solidFill>
+              <a:latin typeface="Calibri" panose="020F0502020204030204" pitchFamily="34" charset="0"/>
+              <a:ea typeface="Calibri" panose="020F0502020204030204" pitchFamily="34" charset="0"/>
+              <a:cs typeface="Times New Roman" panose="02020603050405020304" pitchFamily="18" charset="0"/>
+            </a:endParaRPr>
+          </a:p>
+        </p:txBody>
+      </p:sp>
     </p:spTree>
     <p:extLst>
       <p:ext uri="{BB962C8B-B14F-4D97-AF65-F5344CB8AC3E}">
@@ -10985,6 +11768,267 @@
 </file>
 
 <file path=ppt/slides/slide31.xml><?xml version="1.0" encoding="utf-8"?>
+<p:sld xmlns:a="http://schemas.openxmlformats.org/drawingml/2006/main" xmlns:r="http://schemas.openxmlformats.org/officeDocument/2006/relationships" xmlns:p="http://schemas.openxmlformats.org/presentationml/2006/main">
+  <p:cSld>
+    <p:spTree>
+      <p:nvGrpSpPr>
+        <p:cNvPr id="1" name=""/>
+        <p:cNvGrpSpPr/>
+        <p:nvPr/>
+      </p:nvGrpSpPr>
+      <p:grpSpPr>
+        <a:xfrm>
+          <a:off x="0" y="0"/>
+          <a:ext cx="0" cy="0"/>
+          <a:chOff x="0" y="0"/>
+          <a:chExt cx="0" cy="0"/>
+        </a:xfrm>
+      </p:grpSpPr>
+      <p:pic>
+        <p:nvPicPr>
+          <p:cNvPr id="3" name="Рисунок 2"/>
+          <p:cNvPicPr>
+            <a:picLocks noChangeAspect="1"/>
+          </p:cNvPicPr>
+          <p:nvPr/>
+        </p:nvPicPr>
+        <p:blipFill>
+          <a:blip r:embed="rId2"/>
+          <a:stretch>
+            <a:fillRect/>
+          </a:stretch>
+        </p:blipFill>
+        <p:spPr>
+          <a:xfrm>
+            <a:off x="6323457" y="622980"/>
+            <a:ext cx="5086350" cy="5800725"/>
+          </a:xfrm>
+          <a:prstGeom prst="rect">
+            <a:avLst/>
+          </a:prstGeom>
+        </p:spPr>
+      </p:pic>
+      <p:sp>
+        <p:nvSpPr>
+          <p:cNvPr id="7" name="Прямоугольник 1"/>
+          <p:cNvSpPr/>
+          <p:nvPr/>
+        </p:nvSpPr>
+        <p:spPr>
+          <a:xfrm>
+            <a:off x="517554" y="1886349"/>
+            <a:ext cx="5097434" cy="4832092"/>
+          </a:xfrm>
+          <a:prstGeom prst="rect">
+            <a:avLst/>
+          </a:prstGeom>
+        </p:spPr>
+        <p:txBody>
+          <a:bodyPr wrap="square">
+            <a:spAutoFit/>
+          </a:bodyPr>
+          <a:lstStyle/>
+          <a:p>
+            <a:r>
+              <a:rPr lang="ru-RU" sz="2800" dirty="0" smtClean="0">
+                <a:solidFill>
+                  <a:schemeClr val="accent1">
+                    <a:lumMod val="50000"/>
+                  </a:schemeClr>
+                </a:solidFill>
+                <a:latin typeface="Calibri" panose="020F0502020204030204" pitchFamily="34" charset="0"/>
+                <a:ea typeface="Calibri" panose="020F0502020204030204" pitchFamily="34" charset="0"/>
+                <a:cs typeface="Times New Roman" panose="02020603050405020304" pitchFamily="18" charset="0"/>
+              </a:rPr>
+              <a:t>Шаг 4</a:t>
+            </a:r>
+            <a:endParaRPr lang="ru-RU" sz="2800" dirty="0" smtClean="0">
+              <a:latin typeface="Calibri" panose="020F0502020204030204" pitchFamily="34" charset="0"/>
+              <a:ea typeface="Calibri" panose="020F0502020204030204" pitchFamily="34" charset="0"/>
+              <a:cs typeface="Times New Roman" panose="02020603050405020304" pitchFamily="18" charset="0"/>
+            </a:endParaRPr>
+          </a:p>
+          <a:p>
+            <a:pPr marL="457200" indent="-457200">
+              <a:buFont typeface="Arial" panose="020B0604020202020204" pitchFamily="34" charset="0"/>
+              <a:buChar char="•"/>
+            </a:pPr>
+            <a:r>
+              <a:rPr lang="ru-RU" sz="2800" dirty="0" smtClean="0">
+                <a:latin typeface="Calibri" panose="020F0502020204030204" pitchFamily="34" charset="0"/>
+                <a:ea typeface="Calibri" panose="020F0502020204030204" pitchFamily="34" charset="0"/>
+                <a:cs typeface="Times New Roman" panose="02020603050405020304" pitchFamily="18" charset="0"/>
+              </a:rPr>
+              <a:t>Если </a:t>
+            </a:r>
+            <a:r>
+              <a:rPr lang="ru-RU" sz="2800" dirty="0" smtClean="0"/>
+              <a:t>не </a:t>
+            </a:r>
+            <a:r>
+              <a:rPr lang="ru-RU" sz="2800" dirty="0"/>
+              <a:t>удалось </a:t>
+            </a:r>
+            <a:r>
+              <a:rPr lang="ru-RU" sz="2800" dirty="0" smtClean="0"/>
+              <a:t>пронумеровать, то:</a:t>
+            </a:r>
+          </a:p>
+          <a:p>
+            <a:pPr marL="914400" lvl="1" indent="-457200">
+              <a:buFont typeface="Arial" panose="020B0604020202020204" pitchFamily="34" charset="0"/>
+              <a:buChar char="•"/>
+            </a:pPr>
+            <a:r>
+              <a:rPr lang="ru-RU" sz="2800" dirty="0" smtClean="0"/>
+              <a:t>Возвращаемся к предыдущему неоднозначному случаю</a:t>
+            </a:r>
+          </a:p>
+          <a:p>
+            <a:pPr marL="914400" lvl="1" indent="-457200">
+              <a:buFont typeface="Arial" panose="020B0604020202020204" pitchFamily="34" charset="0"/>
+              <a:buChar char="•"/>
+            </a:pPr>
+            <a:r>
+              <a:rPr lang="ru-RU" sz="2800" dirty="0" smtClean="0"/>
+              <a:t>Меняем </a:t>
+            </a:r>
+            <a:r>
+              <a:rPr lang="ru-RU" sz="2800" dirty="0"/>
+              <a:t>индекс </a:t>
+            </a:r>
+            <a:r>
+              <a:rPr lang="ru-RU" sz="2800" dirty="0" smtClean="0"/>
+              <a:t>на следующий возможный</a:t>
+            </a:r>
+          </a:p>
+          <a:p>
+            <a:pPr marL="914400" lvl="1" indent="-457200">
+              <a:buFont typeface="Arial" panose="020B0604020202020204" pitchFamily="34" charset="0"/>
+              <a:buChar char="•"/>
+            </a:pPr>
+            <a:r>
+              <a:rPr lang="ru-RU" sz="2800" dirty="0" smtClean="0"/>
+              <a:t>Запускаем дальнейшую нумерацию</a:t>
+            </a:r>
+            <a:endParaRPr lang="ru-RU" sz="2800" dirty="0"/>
+          </a:p>
+          <a:p>
+            <a:pPr lvl="0"/>
+            <a:endParaRPr lang="ru-RU" sz="2800" dirty="0"/>
+          </a:p>
+        </p:txBody>
+      </p:sp>
+      <p:sp>
+        <p:nvSpPr>
+          <p:cNvPr id="8" name="TextBox 7"/>
+          <p:cNvSpPr txBox="1"/>
+          <p:nvPr/>
+        </p:nvSpPr>
+        <p:spPr>
+          <a:xfrm>
+            <a:off x="517554" y="622980"/>
+            <a:ext cx="6415795" cy="954107"/>
+          </a:xfrm>
+          <a:prstGeom prst="rect">
+            <a:avLst/>
+          </a:prstGeom>
+          <a:noFill/>
+        </p:spPr>
+        <p:txBody>
+          <a:bodyPr wrap="none" rtlCol="0">
+            <a:spAutoFit/>
+          </a:bodyPr>
+          <a:lstStyle/>
+          <a:p>
+            <a:r>
+              <a:rPr lang="ru-RU" sz="2800" dirty="0">
+                <a:solidFill>
+                  <a:schemeClr val="accent1">
+                    <a:lumMod val="50000"/>
+                  </a:schemeClr>
+                </a:solidFill>
+                <a:latin typeface="Calibri" panose="020F0502020204030204" pitchFamily="34" charset="0"/>
+                <a:ea typeface="Calibri" panose="020F0502020204030204" pitchFamily="34" charset="0"/>
+                <a:cs typeface="Times New Roman" panose="02020603050405020304" pitchFamily="18" charset="0"/>
+              </a:rPr>
+              <a:t>Идея: </a:t>
+            </a:r>
+            <a:r>
+              <a:rPr lang="ru-RU" sz="2800" dirty="0" smtClean="0">
+                <a:solidFill>
+                  <a:schemeClr val="accent1">
+                    <a:lumMod val="50000"/>
+                  </a:schemeClr>
+                </a:solidFill>
+                <a:latin typeface="Calibri" panose="020F0502020204030204" pitchFamily="34" charset="0"/>
+                <a:ea typeface="Calibri" panose="020F0502020204030204" pitchFamily="34" charset="0"/>
+                <a:cs typeface="Times New Roman" panose="02020603050405020304" pitchFamily="18" charset="0"/>
+              </a:rPr>
+              <a:t>Перебираем варианты нумерации</a:t>
+            </a:r>
+          </a:p>
+          <a:p>
+            <a:r>
+              <a:rPr lang="ru-RU" sz="2800" dirty="0">
+                <a:solidFill>
+                  <a:schemeClr val="accent1">
+                    <a:lumMod val="50000"/>
+                  </a:schemeClr>
+                </a:solidFill>
+                <a:latin typeface="Calibri" panose="020F0502020204030204" pitchFamily="34" charset="0"/>
+                <a:ea typeface="Calibri" panose="020F0502020204030204" pitchFamily="34" charset="0"/>
+                <a:cs typeface="Times New Roman" panose="02020603050405020304" pitchFamily="18" charset="0"/>
+              </a:rPr>
+              <a:t>д</a:t>
+            </a:r>
+            <a:r>
+              <a:rPr lang="ru-RU" sz="2800" dirty="0" smtClean="0">
+                <a:solidFill>
+                  <a:schemeClr val="accent1">
+                    <a:lumMod val="50000"/>
+                  </a:schemeClr>
+                </a:solidFill>
+                <a:latin typeface="Calibri" panose="020F0502020204030204" pitchFamily="34" charset="0"/>
+                <a:ea typeface="Calibri" panose="020F0502020204030204" pitchFamily="34" charset="0"/>
+                <a:cs typeface="Times New Roman" panose="02020603050405020304" pitchFamily="18" charset="0"/>
+              </a:rPr>
+              <a:t>ля неоднозначных случаев</a:t>
+            </a:r>
+            <a:endParaRPr lang="ru-RU" sz="2800" dirty="0">
+              <a:solidFill>
+                <a:schemeClr val="accent1">
+                  <a:lumMod val="50000"/>
+                </a:schemeClr>
+              </a:solidFill>
+              <a:latin typeface="Calibri" panose="020F0502020204030204" pitchFamily="34" charset="0"/>
+              <a:ea typeface="Calibri" panose="020F0502020204030204" pitchFamily="34" charset="0"/>
+              <a:cs typeface="Times New Roman" panose="02020603050405020304" pitchFamily="18" charset="0"/>
+            </a:endParaRPr>
+          </a:p>
+        </p:txBody>
+      </p:sp>
+    </p:spTree>
+    <p:extLst>
+      <p:ext uri="{BB962C8B-B14F-4D97-AF65-F5344CB8AC3E}">
+        <p14:creationId xmlns:p14="http://schemas.microsoft.com/office/powerpoint/2010/main" val="1153994347"/>
+      </p:ext>
+    </p:extLst>
+  </p:cSld>
+  <p:clrMapOvr>
+    <a:masterClrMapping/>
+  </p:clrMapOvr>
+  <p:timing>
+    <p:tnLst>
+      <p:par>
+        <p:cTn id="1" dur="indefinite" restart="never" nodeType="tmRoot"/>
+      </p:par>
+    </p:tnLst>
+  </p:timing>
+</p:sld>
+</file>
+
+<file path=ppt/slides/slide32.xml><?xml version="1.0" encoding="utf-8"?>
 <p:sld xmlns:a="http://schemas.openxmlformats.org/drawingml/2006/main" xmlns:r="http://schemas.openxmlformats.org/officeDocument/2006/relationships" xmlns:p="http://schemas.openxmlformats.org/presentationml/2006/main">
   <p:cSld>
     <p:spTree>
@@ -11083,7 +12127,7 @@
 </p:sld>
 </file>
 
-<file path=ppt/slides/slide32.xml><?xml version="1.0" encoding="utf-8"?>
+<file path=ppt/slides/slide33.xml><?xml version="1.0" encoding="utf-8"?>
 <p:sld xmlns:a="http://schemas.openxmlformats.org/drawingml/2006/main" xmlns:r="http://schemas.openxmlformats.org/officeDocument/2006/relationships" xmlns:p="http://schemas.openxmlformats.org/presentationml/2006/main">
   <p:cSld>
     <p:spTree>
@@ -11302,7 +12346,7 @@
 </p:sld>
 </file>
 
-<file path=ppt/slides/slide33.xml><?xml version="1.0" encoding="utf-8"?>
+<file path=ppt/slides/slide34.xml><?xml version="1.0" encoding="utf-8"?>
 <p:sld xmlns:a="http://schemas.openxmlformats.org/drawingml/2006/main" xmlns:r="http://schemas.openxmlformats.org/officeDocument/2006/relationships" xmlns:p="http://schemas.openxmlformats.org/presentationml/2006/main">
   <p:cSld>
     <p:spTree>
@@ -11461,7 +12505,7 @@
 </p:sld>
 </file>
 
-<file path=ppt/slides/slide34.xml><?xml version="1.0" encoding="utf-8"?>
+<file path=ppt/slides/slide35.xml><?xml version="1.0" encoding="utf-8"?>
 <p:sld xmlns:a="http://schemas.openxmlformats.org/drawingml/2006/main" xmlns:r="http://schemas.openxmlformats.org/officeDocument/2006/relationships" xmlns:p="http://schemas.openxmlformats.org/presentationml/2006/main">
   <p:cSld>
     <p:spTree>
@@ -11620,7 +12664,7 @@
 </p:sld>
 </file>
 
-<file path=ppt/slides/slide35.xml><?xml version="1.0" encoding="utf-8"?>
+<file path=ppt/slides/slide36.xml><?xml version="1.0" encoding="utf-8"?>
 <p:sld xmlns:a="http://schemas.openxmlformats.org/drawingml/2006/main" xmlns:r="http://schemas.openxmlformats.org/officeDocument/2006/relationships" xmlns:p="http://schemas.openxmlformats.org/presentationml/2006/main">
   <p:cSld>
     <p:spTree>
@@ -11773,7 +12817,7 @@
 </p:sld>
 </file>
 
-<file path=ppt/slides/slide36.xml><?xml version="1.0" encoding="utf-8"?>
+<file path=ppt/slides/slide37.xml><?xml version="1.0" encoding="utf-8"?>
 <p:sld xmlns:a="http://schemas.openxmlformats.org/drawingml/2006/main" xmlns:r="http://schemas.openxmlformats.org/officeDocument/2006/relationships" xmlns:p="http://schemas.openxmlformats.org/presentationml/2006/main">
   <p:cSld>
     <p:spTree>
@@ -11926,7 +12970,7 @@
 </p:sld>
 </file>
 
-<file path=ppt/slides/slide37.xml><?xml version="1.0" encoding="utf-8"?>
+<file path=ppt/slides/slide38.xml><?xml version="1.0" encoding="utf-8"?>
 <p:sld xmlns:a="http://schemas.openxmlformats.org/drawingml/2006/main" xmlns:r="http://schemas.openxmlformats.org/officeDocument/2006/relationships" xmlns:p="http://schemas.openxmlformats.org/presentationml/2006/main">
   <p:cSld>
     <p:spTree>
@@ -15380,7 +16424,7 @@
 </p:sld>
 </file>
 
-<file path=ppt/slides/slide38.xml><?xml version="1.0" encoding="utf-8"?>
+<file path=ppt/slides/slide39.xml><?xml version="1.0" encoding="utf-8"?>
 <p:sld xmlns:a="http://schemas.openxmlformats.org/drawingml/2006/main" xmlns:r="http://schemas.openxmlformats.org/officeDocument/2006/relationships" xmlns:p="http://schemas.openxmlformats.org/presentationml/2006/main">
   <p:cSld>
     <p:spTree>
@@ -19870,105 +20914,6 @@
     <p:extLst>
       <p:ext uri="{BB962C8B-B14F-4D97-AF65-F5344CB8AC3E}">
         <p14:creationId xmlns:p14="http://schemas.microsoft.com/office/powerpoint/2010/main" val="3123212971"/>
-      </p:ext>
-    </p:extLst>
-  </p:cSld>
-  <p:clrMapOvr>
-    <a:masterClrMapping/>
-  </p:clrMapOvr>
-  <p:timing>
-    <p:tnLst>
-      <p:par>
-        <p:cTn id="1" dur="indefinite" restart="never" nodeType="tmRoot"/>
-      </p:par>
-    </p:tnLst>
-  </p:timing>
-</p:sld>
-</file>
-
-<file path=ppt/slides/slide39.xml><?xml version="1.0" encoding="utf-8"?>
-<p:sld xmlns:a="http://schemas.openxmlformats.org/drawingml/2006/main" xmlns:r="http://schemas.openxmlformats.org/officeDocument/2006/relationships" xmlns:p="http://schemas.openxmlformats.org/presentationml/2006/main">
-  <p:cSld>
-    <p:spTree>
-      <p:nvGrpSpPr>
-        <p:cNvPr id="1" name=""/>
-        <p:cNvGrpSpPr/>
-        <p:nvPr/>
-      </p:nvGrpSpPr>
-      <p:grpSpPr>
-        <a:xfrm>
-          <a:off x="0" y="0"/>
-          <a:ext cx="0" cy="0"/>
-          <a:chOff x="0" y="0"/>
-          <a:chExt cx="0" cy="0"/>
-        </a:xfrm>
-      </p:grpSpPr>
-      <p:sp>
-        <p:nvSpPr>
-          <p:cNvPr id="2" name="Заголовок 1"/>
-          <p:cNvSpPr txBox="1">
-            <a:spLocks/>
-          </p:cNvSpPr>
-          <p:nvPr/>
-        </p:nvSpPr>
-        <p:spPr>
-          <a:xfrm>
-            <a:off x="1" y="970683"/>
-            <a:ext cx="12087224" cy="4544292"/>
-          </a:xfrm>
-          <a:prstGeom prst="rect">
-            <a:avLst/>
-          </a:prstGeom>
-        </p:spPr>
-        <p:txBody>
-          <a:bodyPr vert="horz" lIns="91440" tIns="45720" rIns="91440" bIns="45720" rtlCol="0" anchor="ctr">
-            <a:noAutofit/>
-          </a:bodyPr>
-          <a:lstStyle>
-            <a:lvl1pPr algn="l" defTabSz="914400" rtl="0" eaLnBrk="1" latinLnBrk="0" hangingPunct="1">
-              <a:lnSpc>
-                <a:spcPct val="90000"/>
-              </a:lnSpc>
-              <a:spcBef>
-                <a:spcPct val="0"/>
-              </a:spcBef>
-              <a:buNone/>
-              <a:defRPr sz="4400" kern="1200">
-                <a:solidFill>
-                  <a:schemeClr val="tx1"/>
-                </a:solidFill>
-                <a:latin typeface="+mj-lt"/>
-                <a:ea typeface="+mj-ea"/>
-                <a:cs typeface="+mj-cs"/>
-              </a:defRPr>
-            </a:lvl1pPr>
-          </a:lstStyle>
-          <a:p>
-            <a:pPr algn="ctr"/>
-            <a:r>
-              <a:rPr lang="ru-RU" sz="7200" dirty="0" smtClean="0">
-                <a:solidFill>
-                  <a:schemeClr val="accent1">
-                    <a:lumMod val="50000"/>
-                  </a:schemeClr>
-                </a:solidFill>
-              </a:rPr>
-              <a:t>Характеристики приложения</a:t>
-            </a:r>
-            <a:endParaRPr lang="ru-RU" sz="7200" dirty="0">
-              <a:solidFill>
-                <a:schemeClr val="accent1">
-                  <a:lumMod val="50000"/>
-                </a:schemeClr>
-              </a:solidFill>
-            </a:endParaRPr>
-          </a:p>
-        </p:txBody>
-      </p:sp>
-    </p:spTree>
-    <p:extLst>
-      <p:ext uri="{BB962C8B-B14F-4D97-AF65-F5344CB8AC3E}">
-        <p14:creationId xmlns:p14="http://schemas.microsoft.com/office/powerpoint/2010/main" val="2398216839"/>
       </p:ext>
     </p:extLst>
   </p:cSld>
@@ -20091,6 +21036,105 @@
       </p:grpSpPr>
       <p:sp>
         <p:nvSpPr>
+          <p:cNvPr id="2" name="Заголовок 1"/>
+          <p:cNvSpPr txBox="1">
+            <a:spLocks/>
+          </p:cNvSpPr>
+          <p:nvPr/>
+        </p:nvSpPr>
+        <p:spPr>
+          <a:xfrm>
+            <a:off x="1" y="970683"/>
+            <a:ext cx="12087224" cy="4544292"/>
+          </a:xfrm>
+          <a:prstGeom prst="rect">
+            <a:avLst/>
+          </a:prstGeom>
+        </p:spPr>
+        <p:txBody>
+          <a:bodyPr vert="horz" lIns="91440" tIns="45720" rIns="91440" bIns="45720" rtlCol="0" anchor="ctr">
+            <a:noAutofit/>
+          </a:bodyPr>
+          <a:lstStyle>
+            <a:lvl1pPr algn="l" defTabSz="914400" rtl="0" eaLnBrk="1" latinLnBrk="0" hangingPunct="1">
+              <a:lnSpc>
+                <a:spcPct val="90000"/>
+              </a:lnSpc>
+              <a:spcBef>
+                <a:spcPct val="0"/>
+              </a:spcBef>
+              <a:buNone/>
+              <a:defRPr sz="4400" kern="1200">
+                <a:solidFill>
+                  <a:schemeClr val="tx1"/>
+                </a:solidFill>
+                <a:latin typeface="+mj-lt"/>
+                <a:ea typeface="+mj-ea"/>
+                <a:cs typeface="+mj-cs"/>
+              </a:defRPr>
+            </a:lvl1pPr>
+          </a:lstStyle>
+          <a:p>
+            <a:pPr algn="ctr"/>
+            <a:r>
+              <a:rPr lang="ru-RU" sz="7200" dirty="0" smtClean="0">
+                <a:solidFill>
+                  <a:schemeClr val="accent1">
+                    <a:lumMod val="50000"/>
+                  </a:schemeClr>
+                </a:solidFill>
+              </a:rPr>
+              <a:t>Характеристики приложения</a:t>
+            </a:r>
+            <a:endParaRPr lang="ru-RU" sz="7200" dirty="0">
+              <a:solidFill>
+                <a:schemeClr val="accent1">
+                  <a:lumMod val="50000"/>
+                </a:schemeClr>
+              </a:solidFill>
+            </a:endParaRPr>
+          </a:p>
+        </p:txBody>
+      </p:sp>
+    </p:spTree>
+    <p:extLst>
+      <p:ext uri="{BB962C8B-B14F-4D97-AF65-F5344CB8AC3E}">
+        <p14:creationId xmlns:p14="http://schemas.microsoft.com/office/powerpoint/2010/main" val="2398216839"/>
+      </p:ext>
+    </p:extLst>
+  </p:cSld>
+  <p:clrMapOvr>
+    <a:masterClrMapping/>
+  </p:clrMapOvr>
+  <p:timing>
+    <p:tnLst>
+      <p:par>
+        <p:cTn id="1" dur="indefinite" restart="never" nodeType="tmRoot"/>
+      </p:par>
+    </p:tnLst>
+  </p:timing>
+</p:sld>
+</file>
+
+<file path=ppt/slides/slide41.xml><?xml version="1.0" encoding="utf-8"?>
+<p:sld xmlns:a="http://schemas.openxmlformats.org/drawingml/2006/main" xmlns:r="http://schemas.openxmlformats.org/officeDocument/2006/relationships" xmlns:p="http://schemas.openxmlformats.org/presentationml/2006/main">
+  <p:cSld>
+    <p:spTree>
+      <p:nvGrpSpPr>
+        <p:cNvPr id="1" name=""/>
+        <p:cNvGrpSpPr/>
+        <p:nvPr/>
+      </p:nvGrpSpPr>
+      <p:grpSpPr>
+        <a:xfrm>
+          <a:off x="0" y="0"/>
+          <a:ext cx="0" cy="0"/>
+          <a:chOff x="0" y="0"/>
+          <a:chExt cx="0" cy="0"/>
+        </a:xfrm>
+      </p:grpSpPr>
+      <p:sp>
+        <p:nvSpPr>
           <p:cNvPr id="4" name="Прямоугольник 3"/>
           <p:cNvSpPr/>
           <p:nvPr/>
@@ -20287,7 +21331,7 @@
 </p:sld>
 </file>
 
-<file path=ppt/slides/slide41.xml><?xml version="1.0" encoding="utf-8"?>
+<file path=ppt/slides/slide42.xml><?xml version="1.0" encoding="utf-8"?>
 <p:sld xmlns:a="http://schemas.openxmlformats.org/drawingml/2006/main" xmlns:r="http://schemas.openxmlformats.org/officeDocument/2006/relationships" xmlns:p="http://schemas.openxmlformats.org/presentationml/2006/main">
   <p:cSld>
     <p:spTree>
@@ -20386,7 +21430,7 @@
 </p:sld>
 </file>
 
-<file path=ppt/slides/slide42.xml><?xml version="1.0" encoding="utf-8"?>
+<file path=ppt/slides/slide43.xml><?xml version="1.0" encoding="utf-8"?>
 <p:sld xmlns:a="http://schemas.openxmlformats.org/drawingml/2006/main" xmlns:r="http://schemas.openxmlformats.org/officeDocument/2006/relationships" xmlns:p="http://schemas.openxmlformats.org/presentationml/2006/main">
   <p:cSld>
     <p:spTree>
@@ -20423,7 +21467,7 @@
 </p:sld>
 </file>
 
-<file path=ppt/slides/slide43.xml><?xml version="1.0" encoding="utf-8"?>
+<file path=ppt/slides/slide44.xml><?xml version="1.0" encoding="utf-8"?>
 <p:sld xmlns:a="http://schemas.openxmlformats.org/drawingml/2006/main" xmlns:r="http://schemas.openxmlformats.org/officeDocument/2006/relationships" xmlns:p="http://schemas.openxmlformats.org/presentationml/2006/main">
   <p:cSld>
     <p:spTree>

</xml_diff>

<commit_message>
Step 4 -> Step 5
</commit_message>
<xml_diff>
--- a/docs/Презентация v0.8.1.pptx
+++ b/docs/Презентация v0.8.1.pptx
@@ -4675,11 +4675,7 @@
             </a:pPr>
             <a:r>
               <a:rPr lang="ru-RU" sz="2800" dirty="0" smtClean="0"/>
-              <a:t>Индексы регулярной сетки </a:t>
-            </a:r>
-            <a:r>
-              <a:rPr lang="ru-RU" sz="2800" dirty="0" smtClean="0"/>
-              <a:t>определенной размерности</a:t>
+              <a:t>Индексы регулярной сетки определенной размерности</a:t>
             </a:r>
           </a:p>
           <a:p>
@@ -8594,16 +8590,6 @@
               </a:rPr>
               <a:t>Идея: Проверить, что граф - линейный</a:t>
             </a:r>
-            <a:endParaRPr lang="ru-RU" sz="2800" dirty="0">
-              <a:solidFill>
-                <a:schemeClr val="accent1">
-                  <a:lumMod val="50000"/>
-                </a:schemeClr>
-              </a:solidFill>
-              <a:latin typeface="Calibri" panose="020F0502020204030204" pitchFamily="34" charset="0"/>
-              <a:ea typeface="Calibri" panose="020F0502020204030204" pitchFamily="34" charset="0"/>
-              <a:cs typeface="Times New Roman" panose="02020603050405020304" pitchFamily="18" charset="0"/>
-            </a:endParaRPr>
           </a:p>
         </p:txBody>
       </p:sp>
@@ -9227,20 +9213,7 @@
                 <a:ea typeface="Calibri" panose="020F0502020204030204" pitchFamily="34" charset="0"/>
                 <a:cs typeface="Times New Roman" panose="02020603050405020304" pitchFamily="18" charset="0"/>
               </a:rPr>
-              <a:t>Шаг </a:t>
-            </a:r>
-            <a:r>
-              <a:rPr lang="ru-RU" sz="2800" dirty="0" smtClean="0">
-                <a:solidFill>
-                  <a:schemeClr val="accent1">
-                    <a:lumMod val="50000"/>
-                  </a:schemeClr>
-                </a:solidFill>
-                <a:latin typeface="Calibri" panose="020F0502020204030204" pitchFamily="34" charset="0"/>
-                <a:ea typeface="Calibri" panose="020F0502020204030204" pitchFamily="34" charset="0"/>
-                <a:cs typeface="Times New Roman" panose="02020603050405020304" pitchFamily="18" charset="0"/>
-              </a:rPr>
-              <a:t>2</a:t>
+              <a:t>Шаг 2</a:t>
             </a:r>
             <a:endParaRPr lang="ru-RU" sz="2800" dirty="0" smtClean="0">
               <a:latin typeface="Calibri" panose="020F0502020204030204" pitchFamily="34" charset="0"/>
@@ -9261,14 +9234,7 @@
                 <a:ea typeface="Calibri" panose="020F0502020204030204" pitchFamily="34" charset="0"/>
                 <a:cs typeface="Times New Roman" panose="02020603050405020304" pitchFamily="18" charset="0"/>
               </a:rPr>
-              <a:t>Нумеруем </a:t>
-            </a:r>
-            <a:r>
-              <a:rPr lang="ru-RU" sz="2800" dirty="0" smtClean="0">
-                <a:ea typeface="Calibri" panose="020F0502020204030204" pitchFamily="34" charset="0"/>
-                <a:cs typeface="Times New Roman" panose="02020603050405020304" pitchFamily="18" charset="0"/>
-              </a:rPr>
-              <a:t>смежные вершины </a:t>
+              <a:t>Нумеруем смежные вершины </a:t>
             </a:r>
             <a:r>
               <a:rPr lang="ru-RU" sz="2800" i="1" dirty="0" smtClean="0">
@@ -9364,14 +9330,7 @@
                 <a:ea typeface="Calibri" panose="020F0502020204030204" pitchFamily="34" charset="0"/>
                 <a:cs typeface="Times New Roman" panose="02020603050405020304" pitchFamily="18" charset="0"/>
               </a:rPr>
-              <a:t> </a:t>
-            </a:r>
-            <a:r>
-              <a:rPr lang="en-US" sz="2800" dirty="0" smtClean="0">
-                <a:ea typeface="Calibri" panose="020F0502020204030204" pitchFamily="34" charset="0"/>
-                <a:cs typeface="Times New Roman" panose="02020603050405020304" pitchFamily="18" charset="0"/>
-              </a:rPr>
-              <a:t>24</a:t>
+              <a:t> 24</a:t>
             </a:r>
             <a:r>
               <a:rPr lang="ru-RU" sz="2800" dirty="0" smtClean="0">
@@ -9599,20 +9558,7 @@
                 <a:ea typeface="Calibri" panose="020F0502020204030204" pitchFamily="34" charset="0"/>
                 <a:cs typeface="Times New Roman" panose="02020603050405020304" pitchFamily="18" charset="0"/>
               </a:rPr>
-              <a:t>Шаг </a:t>
-            </a:r>
-            <a:r>
-              <a:rPr lang="ru-RU" sz="2800" dirty="0" smtClean="0">
-                <a:solidFill>
-                  <a:schemeClr val="accent1">
-                    <a:lumMod val="50000"/>
-                  </a:schemeClr>
-                </a:solidFill>
-                <a:latin typeface="Calibri" panose="020F0502020204030204" pitchFamily="34" charset="0"/>
-                <a:ea typeface="Calibri" panose="020F0502020204030204" pitchFamily="34" charset="0"/>
-                <a:cs typeface="Times New Roman" panose="02020603050405020304" pitchFamily="18" charset="0"/>
-              </a:rPr>
-              <a:t>3</a:t>
+              <a:t>Шаг 3</a:t>
             </a:r>
             <a:endParaRPr lang="ru-RU" sz="2800" dirty="0" smtClean="0">
               <a:latin typeface="Calibri" panose="020F0502020204030204" pitchFamily="34" charset="0"/>
@@ -9872,20 +9818,7 @@
                 <a:ea typeface="Calibri" panose="020F0502020204030204" pitchFamily="34" charset="0"/>
                 <a:cs typeface="Times New Roman" panose="02020603050405020304" pitchFamily="18" charset="0"/>
               </a:rPr>
-              <a:t>Шаг </a:t>
-            </a:r>
-            <a:r>
-              <a:rPr lang="ru-RU" sz="2800" dirty="0" smtClean="0">
-                <a:solidFill>
-                  <a:schemeClr val="accent1">
-                    <a:lumMod val="50000"/>
-                  </a:schemeClr>
-                </a:solidFill>
-                <a:latin typeface="Calibri" panose="020F0502020204030204" pitchFamily="34" charset="0"/>
-                <a:ea typeface="Calibri" panose="020F0502020204030204" pitchFamily="34" charset="0"/>
-                <a:cs typeface="Times New Roman" panose="02020603050405020304" pitchFamily="18" charset="0"/>
-              </a:rPr>
-              <a:t>4</a:t>
+              <a:t>Шаг 4</a:t>
             </a:r>
             <a:endParaRPr lang="ru-RU" sz="2800" dirty="0" smtClean="0">
               <a:latin typeface="Calibri" panose="020F0502020204030204" pitchFamily="34" charset="0"/>
@@ -10150,7 +10083,20 @@
                 <a:ea typeface="Calibri" panose="020F0502020204030204" pitchFamily="34" charset="0"/>
                 <a:cs typeface="Times New Roman" panose="02020603050405020304" pitchFamily="18" charset="0"/>
               </a:rPr>
-              <a:t>Шаг 4</a:t>
+              <a:t>Шаг </a:t>
+            </a:r>
+            <a:r>
+              <a:rPr lang="ru-RU" sz="2800" dirty="0" smtClean="0">
+                <a:solidFill>
+                  <a:schemeClr val="accent1">
+                    <a:lumMod val="50000"/>
+                  </a:schemeClr>
+                </a:solidFill>
+                <a:latin typeface="Calibri" panose="020F0502020204030204" pitchFamily="34" charset="0"/>
+                <a:ea typeface="Calibri" panose="020F0502020204030204" pitchFamily="34" charset="0"/>
+                <a:cs typeface="Times New Roman" panose="02020603050405020304" pitchFamily="18" charset="0"/>
+              </a:rPr>
+              <a:t>5</a:t>
             </a:r>
             <a:endParaRPr lang="ru-RU" sz="2800" dirty="0" smtClean="0">
               <a:latin typeface="Calibri" panose="020F0502020204030204" pitchFamily="34" charset="0"/>
@@ -10689,11 +10635,7 @@
             </a:r>
             <a:r>
               <a:rPr lang="ru-RU" sz="2800" dirty="0" smtClean="0"/>
-              <a:t>– </a:t>
-            </a:r>
-            <a:r>
-              <a:rPr lang="ru-RU" sz="2800" dirty="0" smtClean="0"/>
-              <a:t>6</a:t>
+              <a:t>– 6</a:t>
             </a:r>
             <a:r>
               <a:rPr lang="en-US" sz="2800" dirty="0" smtClean="0"/>
@@ -10892,20 +10834,7 @@
                 <a:ea typeface="Calibri" panose="020F0502020204030204" pitchFamily="34" charset="0"/>
                 <a:cs typeface="Times New Roman" panose="02020603050405020304" pitchFamily="18" charset="0"/>
               </a:rPr>
-              <a:t>Шаг </a:t>
-            </a:r>
-            <a:r>
-              <a:rPr lang="ru-RU" sz="2800" dirty="0" smtClean="0">
-                <a:solidFill>
-                  <a:schemeClr val="accent1">
-                    <a:lumMod val="50000"/>
-                  </a:schemeClr>
-                </a:solidFill>
-                <a:latin typeface="Calibri" panose="020F0502020204030204" pitchFamily="34" charset="0"/>
-                <a:ea typeface="Calibri" panose="020F0502020204030204" pitchFamily="34" charset="0"/>
-                <a:cs typeface="Times New Roman" panose="02020603050405020304" pitchFamily="18" charset="0"/>
-              </a:rPr>
-              <a:t>2</a:t>
+              <a:t>Шаг 2</a:t>
             </a:r>
             <a:endParaRPr lang="ru-RU" sz="2800" dirty="0" smtClean="0">
               <a:latin typeface="Calibri" panose="020F0502020204030204" pitchFamily="34" charset="0"/>
@@ -10926,14 +10855,7 @@
                 <a:ea typeface="Calibri" panose="020F0502020204030204" pitchFamily="34" charset="0"/>
                 <a:cs typeface="Times New Roman" panose="02020603050405020304" pitchFamily="18" charset="0"/>
               </a:rPr>
-              <a:t>Нумеруем </a:t>
-            </a:r>
-            <a:r>
-              <a:rPr lang="ru-RU" sz="2800" dirty="0" smtClean="0">
-                <a:ea typeface="Calibri" panose="020F0502020204030204" pitchFamily="34" charset="0"/>
-                <a:cs typeface="Times New Roman" panose="02020603050405020304" pitchFamily="18" charset="0"/>
-              </a:rPr>
-              <a:t>смежные вершины </a:t>
+              <a:t>Нумеруем смежные вершины </a:t>
             </a:r>
             <a:r>
               <a:rPr lang="ru-RU" sz="2800" i="1" dirty="0" smtClean="0">
@@ -11238,20 +11160,7 @@
                 <a:ea typeface="Calibri" panose="020F0502020204030204" pitchFamily="34" charset="0"/>
                 <a:cs typeface="Times New Roman" panose="02020603050405020304" pitchFamily="18" charset="0"/>
               </a:rPr>
-              <a:t>Шаг </a:t>
-            </a:r>
-            <a:r>
-              <a:rPr lang="ru-RU" sz="2800" dirty="0" smtClean="0">
-                <a:solidFill>
-                  <a:schemeClr val="accent1">
-                    <a:lumMod val="50000"/>
-                  </a:schemeClr>
-                </a:solidFill>
-                <a:latin typeface="Calibri" panose="020F0502020204030204" pitchFamily="34" charset="0"/>
-                <a:ea typeface="Calibri" panose="020F0502020204030204" pitchFamily="34" charset="0"/>
-                <a:cs typeface="Times New Roman" panose="02020603050405020304" pitchFamily="18" charset="0"/>
-              </a:rPr>
-              <a:t>3</a:t>
+              <a:t>Шаг 3</a:t>
             </a:r>
             <a:endParaRPr lang="ru-RU" sz="2800" dirty="0" smtClean="0">
               <a:latin typeface="Calibri" panose="020F0502020204030204" pitchFamily="34" charset="0"/>
@@ -11580,20 +11489,7 @@
                 <a:ea typeface="Calibri" panose="020F0502020204030204" pitchFamily="34" charset="0"/>
                 <a:cs typeface="Times New Roman" panose="02020603050405020304" pitchFamily="18" charset="0"/>
               </a:rPr>
-              <a:t>Шаг </a:t>
-            </a:r>
-            <a:r>
-              <a:rPr lang="ru-RU" sz="2800" dirty="0" smtClean="0">
-                <a:solidFill>
-                  <a:schemeClr val="accent1">
-                    <a:lumMod val="50000"/>
-                  </a:schemeClr>
-                </a:solidFill>
-                <a:latin typeface="Calibri" panose="020F0502020204030204" pitchFamily="34" charset="0"/>
-                <a:ea typeface="Calibri" panose="020F0502020204030204" pitchFamily="34" charset="0"/>
-                <a:cs typeface="Times New Roman" panose="02020603050405020304" pitchFamily="18" charset="0"/>
-              </a:rPr>
-              <a:t>4</a:t>
+              <a:t>Шаг 4</a:t>
             </a:r>
             <a:endParaRPr lang="ru-RU" sz="2800" dirty="0" smtClean="0">
               <a:latin typeface="Calibri" panose="020F0502020204030204" pitchFamily="34" charset="0"/>
@@ -11840,7 +11736,20 @@
                 <a:ea typeface="Calibri" panose="020F0502020204030204" pitchFamily="34" charset="0"/>
                 <a:cs typeface="Times New Roman" panose="02020603050405020304" pitchFamily="18" charset="0"/>
               </a:rPr>
-              <a:t>Шаг 4</a:t>
+              <a:t>Шаг </a:t>
+            </a:r>
+            <a:r>
+              <a:rPr lang="ru-RU" sz="2800" dirty="0" smtClean="0">
+                <a:solidFill>
+                  <a:schemeClr val="accent1">
+                    <a:lumMod val="50000"/>
+                  </a:schemeClr>
+                </a:solidFill>
+                <a:latin typeface="Calibri" panose="020F0502020204030204" pitchFamily="34" charset="0"/>
+                <a:ea typeface="Calibri" panose="020F0502020204030204" pitchFamily="34" charset="0"/>
+                <a:cs typeface="Times New Roman" panose="02020603050405020304" pitchFamily="18" charset="0"/>
+              </a:rPr>
+              <a:t>5</a:t>
             </a:r>
             <a:endParaRPr lang="ru-RU" sz="2800" dirty="0" smtClean="0">
               <a:latin typeface="Calibri" panose="020F0502020204030204" pitchFamily="34" charset="0"/>

</xml_diff>